<commit_message>
Pequena correção no arquivo submetido na seção de casos de uso
</commit_message>
<xml_diff>
--- a/mono/Defesa TCC - DashGen.pptx
+++ b/mono/Defesa TCC - DashGen.pptx
@@ -323,7 +323,7 @@
           <a:p>
             <a:fld id="{2E700DB3-DBF0-4086-B675-117E7A9610B8}" type="datetimeFigureOut">
               <a:rPr lang="pt-BR" smtClean="0"/>
-              <a:t>26/02/2020</a:t>
+              <a:t>29/02/2020</a:t>
             </a:fld>
             <a:endParaRPr lang="pt-BR"/>
           </a:p>
@@ -523,7 +523,7 @@
           <a:p>
             <a:fld id="{2E700DB3-DBF0-4086-B675-117E7A9610B8}" type="datetimeFigureOut">
               <a:rPr lang="pt-BR" smtClean="0"/>
-              <a:t>26/02/2020</a:t>
+              <a:t>29/02/2020</a:t>
             </a:fld>
             <a:endParaRPr lang="pt-BR"/>
           </a:p>
@@ -698,7 +698,7 @@
           <a:p>
             <a:fld id="{2E700DB3-DBF0-4086-B675-117E7A9610B8}" type="datetimeFigureOut">
               <a:rPr lang="pt-BR" smtClean="0"/>
-              <a:t>26/02/2020</a:t>
+              <a:t>29/02/2020</a:t>
             </a:fld>
             <a:endParaRPr lang="pt-BR"/>
           </a:p>
@@ -863,7 +863,7 @@
           <a:p>
             <a:fld id="{2E700DB3-DBF0-4086-B675-117E7A9610B8}" type="datetimeFigureOut">
               <a:rPr lang="pt-BR" smtClean="0"/>
-              <a:t>26/02/2020</a:t>
+              <a:t>29/02/2020</a:t>
             </a:fld>
             <a:endParaRPr lang="pt-BR"/>
           </a:p>
@@ -1111,7 +1111,7 @@
           <a:p>
             <a:fld id="{2E700DB3-DBF0-4086-B675-117E7A9610B8}" type="datetimeFigureOut">
               <a:rPr lang="pt-BR" smtClean="0"/>
-              <a:t>26/02/2020</a:t>
+              <a:t>29/02/2020</a:t>
             </a:fld>
             <a:endParaRPr lang="pt-BR"/>
           </a:p>
@@ -1429,7 +1429,7 @@
           <a:p>
             <a:fld id="{2E700DB3-DBF0-4086-B675-117E7A9610B8}" type="datetimeFigureOut">
               <a:rPr lang="pt-BR" smtClean="0"/>
-              <a:t>26/02/2020</a:t>
+              <a:t>29/02/2020</a:t>
             </a:fld>
             <a:endParaRPr lang="pt-BR"/>
           </a:p>
@@ -1895,7 +1895,7 @@
           <a:p>
             <a:fld id="{2E700DB3-DBF0-4086-B675-117E7A9610B8}" type="datetimeFigureOut">
               <a:rPr lang="pt-BR" smtClean="0"/>
-              <a:t>26/02/2020</a:t>
+              <a:t>29/02/2020</a:t>
             </a:fld>
             <a:endParaRPr lang="pt-BR"/>
           </a:p>
@@ -2043,7 +2043,7 @@
           <a:p>
             <a:fld id="{2E700DB3-DBF0-4086-B675-117E7A9610B8}" type="datetimeFigureOut">
               <a:rPr lang="pt-BR" smtClean="0"/>
-              <a:t>26/02/2020</a:t>
+              <a:t>29/02/2020</a:t>
             </a:fld>
             <a:endParaRPr lang="pt-BR"/>
           </a:p>
@@ -2133,7 +2133,7 @@
           <a:p>
             <a:fld id="{2E700DB3-DBF0-4086-B675-117E7A9610B8}" type="datetimeFigureOut">
               <a:rPr lang="pt-BR" smtClean="0"/>
-              <a:t>26/02/2020</a:t>
+              <a:t>29/02/2020</a:t>
             </a:fld>
             <a:endParaRPr lang="pt-BR"/>
           </a:p>
@@ -2407,7 +2407,7 @@
           <a:p>
             <a:fld id="{2E700DB3-DBF0-4086-B675-117E7A9610B8}" type="datetimeFigureOut">
               <a:rPr lang="pt-BR" smtClean="0"/>
-              <a:t>26/02/2020</a:t>
+              <a:t>29/02/2020</a:t>
             </a:fld>
             <a:endParaRPr lang="pt-BR"/>
           </a:p>
@@ -2712,7 +2712,7 @@
           <a:p>
             <a:fld id="{2E700DB3-DBF0-4086-B675-117E7A9610B8}" type="datetimeFigureOut">
               <a:rPr lang="pt-BR" smtClean="0"/>
-              <a:t>26/02/2020</a:t>
+              <a:t>29/02/2020</a:t>
             </a:fld>
             <a:endParaRPr lang="pt-BR"/>
           </a:p>
@@ -3010,7 +3010,7 @@
           <a:p>
             <a:fld id="{2E700DB3-DBF0-4086-B675-117E7A9610B8}" type="datetimeFigureOut">
               <a:rPr lang="pt-BR" smtClean="0"/>
-              <a:t>26/02/2020</a:t>
+              <a:t>29/02/2020</a:t>
             </a:fld>
             <a:endParaRPr lang="pt-BR"/>
           </a:p>
@@ -8135,11 +8135,7 @@
             </a:r>
             <a:r>
               <a:rPr lang="pt-BR" dirty="0" smtClean="0"/>
-              <a:t>Java</a:t>
-            </a:r>
-            <a:r>
-              <a:rPr lang="pt-BR" dirty="0" smtClean="0"/>
-              <a:t>;</a:t>
+              <a:t>Java;</a:t>
             </a:r>
           </a:p>
           <a:p>
@@ -8999,7 +8995,6 @@
               <a:rPr lang="pt-BR" dirty="0" smtClean="0"/>
               <a:t>Macros / Aninhamento de Gabaritos</a:t>
             </a:r>
-            <a:endParaRPr lang="pt-BR" dirty="0" smtClean="0"/>
           </a:p>
         </p:txBody>
       </p:sp>
@@ -12299,10 +12294,6 @@
               <a:rPr lang="pt-BR" dirty="0" smtClean="0"/>
               <a:t>Desenvolvimento da Aplicação</a:t>
             </a:r>
-            <a:r>
-              <a:rPr lang="pt-BR" dirty="0" smtClean="0"/>
-              <a:t/>
-            </a:r>
             <a:br>
               <a:rPr lang="pt-BR" dirty="0" smtClean="0"/>
             </a:br>
@@ -12580,10 +12571,6 @@
               <a:rPr lang="pt-BR" dirty="0" smtClean="0"/>
               <a:t>Desenvolvimento da Aplicação</a:t>
             </a:r>
-            <a:r>
-              <a:rPr lang="pt-BR" dirty="0" smtClean="0"/>
-              <a:t/>
-            </a:r>
             <a:br>
               <a:rPr lang="pt-BR" dirty="0" smtClean="0"/>
             </a:br>
@@ -13362,7 +13349,6 @@
               <a:rPr lang="pt-BR" sz="3100" dirty="0"/>
               <a:t>Dataset</a:t>
             </a:r>
-            <a:endParaRPr lang="pt-BR" sz="3100" dirty="0"/>
           </a:p>
         </p:txBody>
       </p:sp>
@@ -13695,7 +13681,6 @@
               <a:rPr lang="pt-BR" sz="3100" dirty="0"/>
               <a:t>Dataset</a:t>
             </a:r>
-            <a:endParaRPr lang="pt-BR" sz="3100" dirty="0"/>
           </a:p>
         </p:txBody>
       </p:sp>
@@ -13898,7 +13883,6 @@
               <a:rPr lang="pt-BR" sz="3100" dirty="0"/>
               <a:t>Dataset</a:t>
             </a:r>
-            <a:endParaRPr lang="pt-BR" sz="3100" dirty="0"/>
           </a:p>
         </p:txBody>
       </p:sp>

</xml_diff>

<commit_message>
Pequena correção no arquivo final
</commit_message>
<xml_diff>
--- a/mono/Defesa TCC - DashGen.pptx
+++ b/mono/Defesa TCC - DashGen.pptx
@@ -30,10 +30,8 @@
     <p:sldId id="278" r:id="rId24"/>
     <p:sldId id="279" r:id="rId25"/>
     <p:sldId id="280" r:id="rId26"/>
-    <p:sldId id="281" r:id="rId27"/>
-    <p:sldId id="282" r:id="rId28"/>
-    <p:sldId id="283" r:id="rId29"/>
-    <p:sldId id="284" r:id="rId30"/>
+    <p:sldId id="282" r:id="rId27"/>
+    <p:sldId id="283" r:id="rId28"/>
   </p:sldIdLst>
   <p:sldSz cx="9144000" cy="6858000" type="screen4x3"/>
   <p:notesSz cx="6858000" cy="9144000"/>
@@ -323,7 +321,7 @@
           <a:p>
             <a:fld id="{2E700DB3-DBF0-4086-B675-117E7A9610B8}" type="datetimeFigureOut">
               <a:rPr lang="pt-BR" smtClean="0"/>
-              <a:t>29/02/2020</a:t>
+              <a:t>01/03/2020</a:t>
             </a:fld>
             <a:endParaRPr lang="pt-BR"/>
           </a:p>
@@ -523,7 +521,7 @@
           <a:p>
             <a:fld id="{2E700DB3-DBF0-4086-B675-117E7A9610B8}" type="datetimeFigureOut">
               <a:rPr lang="pt-BR" smtClean="0"/>
-              <a:t>29/02/2020</a:t>
+              <a:t>01/03/2020</a:t>
             </a:fld>
             <a:endParaRPr lang="pt-BR"/>
           </a:p>
@@ -698,7 +696,7 @@
           <a:p>
             <a:fld id="{2E700DB3-DBF0-4086-B675-117E7A9610B8}" type="datetimeFigureOut">
               <a:rPr lang="pt-BR" smtClean="0"/>
-              <a:t>29/02/2020</a:t>
+              <a:t>01/03/2020</a:t>
             </a:fld>
             <a:endParaRPr lang="pt-BR"/>
           </a:p>
@@ -863,7 +861,7 @@
           <a:p>
             <a:fld id="{2E700DB3-DBF0-4086-B675-117E7A9610B8}" type="datetimeFigureOut">
               <a:rPr lang="pt-BR" smtClean="0"/>
-              <a:t>29/02/2020</a:t>
+              <a:t>01/03/2020</a:t>
             </a:fld>
             <a:endParaRPr lang="pt-BR"/>
           </a:p>
@@ -1111,7 +1109,7 @@
           <a:p>
             <a:fld id="{2E700DB3-DBF0-4086-B675-117E7A9610B8}" type="datetimeFigureOut">
               <a:rPr lang="pt-BR" smtClean="0"/>
-              <a:t>29/02/2020</a:t>
+              <a:t>01/03/2020</a:t>
             </a:fld>
             <a:endParaRPr lang="pt-BR"/>
           </a:p>
@@ -1429,7 +1427,7 @@
           <a:p>
             <a:fld id="{2E700DB3-DBF0-4086-B675-117E7A9610B8}" type="datetimeFigureOut">
               <a:rPr lang="pt-BR" smtClean="0"/>
-              <a:t>29/02/2020</a:t>
+              <a:t>01/03/2020</a:t>
             </a:fld>
             <a:endParaRPr lang="pt-BR"/>
           </a:p>
@@ -1895,7 +1893,7 @@
           <a:p>
             <a:fld id="{2E700DB3-DBF0-4086-B675-117E7A9610B8}" type="datetimeFigureOut">
               <a:rPr lang="pt-BR" smtClean="0"/>
-              <a:t>29/02/2020</a:t>
+              <a:t>01/03/2020</a:t>
             </a:fld>
             <a:endParaRPr lang="pt-BR"/>
           </a:p>
@@ -2043,7 +2041,7 @@
           <a:p>
             <a:fld id="{2E700DB3-DBF0-4086-B675-117E7A9610B8}" type="datetimeFigureOut">
               <a:rPr lang="pt-BR" smtClean="0"/>
-              <a:t>29/02/2020</a:t>
+              <a:t>01/03/2020</a:t>
             </a:fld>
             <a:endParaRPr lang="pt-BR"/>
           </a:p>
@@ -2133,7 +2131,7 @@
           <a:p>
             <a:fld id="{2E700DB3-DBF0-4086-B675-117E7A9610B8}" type="datetimeFigureOut">
               <a:rPr lang="pt-BR" smtClean="0"/>
-              <a:t>29/02/2020</a:t>
+              <a:t>01/03/2020</a:t>
             </a:fld>
             <a:endParaRPr lang="pt-BR"/>
           </a:p>
@@ -2407,7 +2405,7 @@
           <a:p>
             <a:fld id="{2E700DB3-DBF0-4086-B675-117E7A9610B8}" type="datetimeFigureOut">
               <a:rPr lang="pt-BR" smtClean="0"/>
-              <a:t>29/02/2020</a:t>
+              <a:t>01/03/2020</a:t>
             </a:fld>
             <a:endParaRPr lang="pt-BR"/>
           </a:p>
@@ -2712,7 +2710,7 @@
           <a:p>
             <a:fld id="{2E700DB3-DBF0-4086-B675-117E7A9610B8}" type="datetimeFigureOut">
               <a:rPr lang="pt-BR" smtClean="0"/>
-              <a:t>29/02/2020</a:t>
+              <a:t>01/03/2020</a:t>
             </a:fld>
             <a:endParaRPr lang="pt-BR"/>
           </a:p>
@@ -3010,7 +3008,7 @@
           <a:p>
             <a:fld id="{2E700DB3-DBF0-4086-B675-117E7A9610B8}" type="datetimeFigureOut">
               <a:rPr lang="pt-BR" smtClean="0"/>
-              <a:t>29/02/2020</a:t>
+              <a:t>01/03/2020</a:t>
             </a:fld>
             <a:endParaRPr lang="pt-BR"/>
           </a:p>
@@ -8563,7 +8561,19 @@
             </a:r>
             <a:r>
               <a:rPr lang="pt-BR" sz="2800" b="1" dirty="0" smtClean="0"/>
-              <a:t>Podem a engenharia de software baseada em reuso e a programação generativa ajudar a diminuir o esforço repetitivo de gerar esses quadros?</a:t>
+              <a:t>Usando engenharia de software </a:t>
+            </a:r>
+            <a:r>
+              <a:rPr lang="pt-BR" sz="2800" b="1" dirty="0" smtClean="0"/>
+              <a:t>baseada em reuso e a programação generativa </a:t>
+            </a:r>
+            <a:r>
+              <a:rPr lang="pt-BR" sz="2800" b="1" dirty="0" smtClean="0"/>
+              <a:t>é possível ajudar </a:t>
+            </a:r>
+            <a:r>
+              <a:rPr lang="pt-BR" sz="2800" b="1" dirty="0" smtClean="0"/>
+              <a:t>a diminuir o esforço repetitivo de gerar esses quadros?</a:t>
             </a:r>
             <a:endParaRPr lang="pt-BR" sz="2800" b="1" dirty="0"/>
           </a:p>
@@ -13098,70 +13108,73 @@
             </a:br>
             <a:r>
               <a:rPr lang="pt-BR" sz="3100" dirty="0" smtClean="0"/>
-              <a:t>Dashboard</a:t>
-            </a:r>
-            <a:endParaRPr lang="pt-BR" dirty="0"/>
+              <a:t>Classe </a:t>
+            </a:r>
+            <a:r>
+              <a:rPr lang="pt-BR" sz="3100" dirty="0"/>
+              <a:t>Dataset</a:t>
+            </a:r>
           </a:p>
         </p:txBody>
       </p:sp>
-      <p:pic>
-        <p:nvPicPr>
-          <p:cNvPr id="4098" name="Picture 2"/>
-          <p:cNvPicPr>
-            <a:picLocks noChangeAspect="1" noChangeArrowheads="1"/>
-          </p:cNvPicPr>
+      <p:sp>
+        <p:nvSpPr>
+          <p:cNvPr id="3" name="CaixaDeTexto 2"/>
+          <p:cNvSpPr txBox="1"/>
           <p:nvPr/>
-        </p:nvPicPr>
-        <p:blipFill>
-          <a:blip r:embed="rId2">
-            <a:extLst>
-              <a:ext uri="{28A0092B-C50C-407E-A947-70E740481C1C}">
-                <a14:useLocalDpi xmlns:a14="http://schemas.microsoft.com/office/drawing/2010/main" val="0"/>
-              </a:ext>
-            </a:extLst>
-          </a:blip>
-          <a:srcRect/>
-          <a:stretch>
-            <a:fillRect/>
-          </a:stretch>
-        </p:blipFill>
-        <p:spPr bwMode="auto">
+        </p:nvSpPr>
+        <p:spPr>
           <a:xfrm>
-            <a:off x="712944" y="1700808"/>
-            <a:ext cx="7488832" cy="4792203"/>
+            <a:off x="683568" y="2132856"/>
+            <a:ext cx="7776864" cy="4031873"/>
           </a:xfrm>
           <a:prstGeom prst="rect">
             <a:avLst/>
           </a:prstGeom>
           <a:noFill/>
-          <a:ln>
-            <a:noFill/>
-          </a:ln>
-          <a:extLst>
-            <a:ext uri="{909E8E84-426E-40DD-AFC4-6F175D3DCCD1}">
-              <a14:hiddenFill xmlns:a14="http://schemas.microsoft.com/office/drawing/2010/main">
-                <a:solidFill>
-                  <a:schemeClr val="accent1"/>
-                </a:solidFill>
-              </a14:hiddenFill>
-            </a:ext>
-            <a:ext uri="{91240B29-F687-4F45-9708-019B960494DF}">
-              <a14:hiddenLine xmlns:a14="http://schemas.microsoft.com/office/drawing/2010/main" w="9525">
-                <a:solidFill>
-                  <a:schemeClr val="tx1"/>
-                </a:solidFill>
-                <a:miter lim="800000"/>
-                <a:headEnd/>
-                <a:tailEnd/>
-              </a14:hiddenLine>
-            </a:ext>
-          </a:extLst>
         </p:spPr>
-      </p:pic>
+        <p:txBody>
+          <a:bodyPr wrap="square" rtlCol="0">
+            <a:spAutoFit/>
+          </a:bodyPr>
+          <a:lstStyle/>
+          <a:p>
+            <a:pPr marL="285750" indent="-285750">
+              <a:buFont typeface="Arial" panose="020B0604020202020204" pitchFamily="34" charset="0"/>
+              <a:buChar char="•"/>
+            </a:pPr>
+            <a:r>
+              <a:rPr lang="pt-BR" sz="3200" dirty="0" smtClean="0"/>
+              <a:t>Objeto concreto para representação do Arquivo CSV para o DashGen</a:t>
+            </a:r>
+          </a:p>
+          <a:p>
+            <a:pPr marL="285750" indent="-285750">
+              <a:buFont typeface="Arial" panose="020B0604020202020204" pitchFamily="34" charset="0"/>
+              <a:buChar char="•"/>
+            </a:pPr>
+            <a:r>
+              <a:rPr lang="pt-BR" sz="3200" dirty="0" smtClean="0"/>
+              <a:t>Uso da Apache Commons CSV para manipulação dos atributos e dados contidos no arquivo CSV</a:t>
+            </a:r>
+          </a:p>
+          <a:p>
+            <a:pPr marL="285750" indent="-285750">
+              <a:buFont typeface="Arial" panose="020B0604020202020204" pitchFamily="34" charset="0"/>
+              <a:buChar char="•"/>
+            </a:pPr>
+            <a:r>
+              <a:rPr lang="pt-BR" sz="3200" dirty="0" smtClean="0"/>
+              <a:t>Possui lógica de teste por força bruta para identificação dos atributos numéricos</a:t>
+            </a:r>
+            <a:endParaRPr lang="pt-BR" sz="3200" dirty="0"/>
+          </a:p>
+        </p:txBody>
+      </p:sp>
     </p:spTree>
     <p:extLst>
       <p:ext uri="{BB962C8B-B14F-4D97-AF65-F5344CB8AC3E}">
-        <p14:creationId xmlns:p14="http://schemas.microsoft.com/office/powerpoint/2010/main" val="1160373565"/>
+        <p14:creationId xmlns:p14="http://schemas.microsoft.com/office/powerpoint/2010/main" val="1719666060"/>
       </p:ext>
     </p:extLst>
   </p:cSld>
@@ -13189,7 +13202,7 @@
                             </p:stCondLst>
                             <p:childTnLst>
                               <p:par>
-                                <p:cTn id="5" presetID="53" presetClass="entr" presetSubtype="16" fill="hold" nodeType="clickEffect">
+                                <p:cTn id="5" presetID="10" presetClass="entr" presetSubtype="0" fill="hold" nodeType="clickEffect">
                                   <p:stCondLst>
                                     <p:cond delay="0"/>
                                   </p:stCondLst>
@@ -13202,7 +13215,11 @@
                                           </p:stCondLst>
                                         </p:cTn>
                                         <p:tgtEl>
-                                          <p:spTgt spid="4098"/>
+                                          <p:spTgt spid="3">
+                                            <p:txEl>
+                                              <p:pRg st="0" end="0"/>
+                                            </p:txEl>
+                                          </p:spTgt>
                                         </p:tgtEl>
                                         <p:attrNameLst>
                                           <p:attrName>style.visibility</p:attrName>
@@ -13212,57 +13229,137 @@
                                         <p:strVal val="visible"/>
                                       </p:to>
                                     </p:set>
-                                    <p:anim calcmode="lin" valueType="num">
-                                      <p:cBhvr>
-                                        <p:cTn id="7" dur="500" fill="hold"/>
-                                        <p:tgtEl>
-                                          <p:spTgt spid="4098"/>
+                                    <p:animEffect transition="in" filter="fade">
+                                      <p:cBhvr>
+                                        <p:cTn id="7" dur="500"/>
+                                        <p:tgtEl>
+                                          <p:spTgt spid="3">
+                                            <p:txEl>
+                                              <p:pRg st="0" end="0"/>
+                                            </p:txEl>
+                                          </p:spTgt>
+                                        </p:tgtEl>
+                                      </p:cBhvr>
+                                    </p:animEffect>
+                                  </p:childTnLst>
+                                </p:cTn>
+                              </p:par>
+                            </p:childTnLst>
+                          </p:cTn>
+                        </p:par>
+                      </p:childTnLst>
+                    </p:cTn>
+                  </p:par>
+                  <p:par>
+                    <p:cTn id="8" fill="hold">
+                      <p:stCondLst>
+                        <p:cond delay="indefinite"/>
+                      </p:stCondLst>
+                      <p:childTnLst>
+                        <p:par>
+                          <p:cTn id="9" fill="hold">
+                            <p:stCondLst>
+                              <p:cond delay="0"/>
+                            </p:stCondLst>
+                            <p:childTnLst>
+                              <p:par>
+                                <p:cTn id="10" presetID="10" presetClass="entr" presetSubtype="0" fill="hold" nodeType="clickEffect">
+                                  <p:stCondLst>
+                                    <p:cond delay="0"/>
+                                  </p:stCondLst>
+                                  <p:childTnLst>
+                                    <p:set>
+                                      <p:cBhvr>
+                                        <p:cTn id="11" dur="1" fill="hold">
+                                          <p:stCondLst>
+                                            <p:cond delay="0"/>
+                                          </p:stCondLst>
+                                        </p:cTn>
+                                        <p:tgtEl>
+                                          <p:spTgt spid="3">
+                                            <p:txEl>
+                                              <p:pRg st="1" end="1"/>
+                                            </p:txEl>
+                                          </p:spTgt>
                                         </p:tgtEl>
                                         <p:attrNameLst>
-                                          <p:attrName>ppt_w</p:attrName>
+                                          <p:attrName>style.visibility</p:attrName>
                                         </p:attrNameLst>
                                       </p:cBhvr>
-                                      <p:tavLst>
-                                        <p:tav tm="0">
-                                          <p:val>
-                                            <p:fltVal val="0"/>
-                                          </p:val>
-                                        </p:tav>
-                                        <p:tav tm="100000">
-                                          <p:val>
-                                            <p:strVal val="#ppt_w"/>
-                                          </p:val>
-                                        </p:tav>
-                                      </p:tavLst>
-                                    </p:anim>
-                                    <p:anim calcmode="lin" valueType="num">
-                                      <p:cBhvr>
-                                        <p:cTn id="8" dur="500" fill="hold"/>
-                                        <p:tgtEl>
-                                          <p:spTgt spid="4098"/>
+                                      <p:to>
+                                        <p:strVal val="visible"/>
+                                      </p:to>
+                                    </p:set>
+                                    <p:animEffect transition="in" filter="fade">
+                                      <p:cBhvr>
+                                        <p:cTn id="12" dur="500"/>
+                                        <p:tgtEl>
+                                          <p:spTgt spid="3">
+                                            <p:txEl>
+                                              <p:pRg st="1" end="1"/>
+                                            </p:txEl>
+                                          </p:spTgt>
+                                        </p:tgtEl>
+                                      </p:cBhvr>
+                                    </p:animEffect>
+                                  </p:childTnLst>
+                                </p:cTn>
+                              </p:par>
+                            </p:childTnLst>
+                          </p:cTn>
+                        </p:par>
+                      </p:childTnLst>
+                    </p:cTn>
+                  </p:par>
+                  <p:par>
+                    <p:cTn id="13" fill="hold">
+                      <p:stCondLst>
+                        <p:cond delay="indefinite"/>
+                      </p:stCondLst>
+                      <p:childTnLst>
+                        <p:par>
+                          <p:cTn id="14" fill="hold">
+                            <p:stCondLst>
+                              <p:cond delay="0"/>
+                            </p:stCondLst>
+                            <p:childTnLst>
+                              <p:par>
+                                <p:cTn id="15" presetID="10" presetClass="entr" presetSubtype="0" fill="hold" nodeType="clickEffect">
+                                  <p:stCondLst>
+                                    <p:cond delay="0"/>
+                                  </p:stCondLst>
+                                  <p:childTnLst>
+                                    <p:set>
+                                      <p:cBhvr>
+                                        <p:cTn id="16" dur="1" fill="hold">
+                                          <p:stCondLst>
+                                            <p:cond delay="0"/>
+                                          </p:stCondLst>
+                                        </p:cTn>
+                                        <p:tgtEl>
+                                          <p:spTgt spid="3">
+                                            <p:txEl>
+                                              <p:pRg st="2" end="2"/>
+                                            </p:txEl>
+                                          </p:spTgt>
                                         </p:tgtEl>
                                         <p:attrNameLst>
-                                          <p:attrName>ppt_h</p:attrName>
+                                          <p:attrName>style.visibility</p:attrName>
                                         </p:attrNameLst>
                                       </p:cBhvr>
-                                      <p:tavLst>
-                                        <p:tav tm="0">
-                                          <p:val>
-                                            <p:fltVal val="0"/>
-                                          </p:val>
-                                        </p:tav>
-                                        <p:tav tm="100000">
-                                          <p:val>
-                                            <p:strVal val="#ppt_h"/>
-                                          </p:val>
-                                        </p:tav>
-                                      </p:tavLst>
-                                    </p:anim>
+                                      <p:to>
+                                        <p:strVal val="visible"/>
+                                      </p:to>
+                                    </p:set>
                                     <p:animEffect transition="in" filter="fade">
                                       <p:cBhvr>
-                                        <p:cTn id="9" dur="500"/>
-                                        <p:tgtEl>
-                                          <p:spTgt spid="4098"/>
+                                        <p:cTn id="17" dur="500"/>
+                                        <p:tgtEl>
+                                          <p:spTgt spid="3">
+                                            <p:txEl>
+                                              <p:pRg st="2" end="2"/>
+                                            </p:txEl>
+                                          </p:spTgt>
                                         </p:tgtEl>
                                       </p:cBhvr>
                                     </p:animEffect>
@@ -13352,338 +13449,6 @@
           </a:p>
         </p:txBody>
       </p:sp>
-      <p:sp>
-        <p:nvSpPr>
-          <p:cNvPr id="3" name="CaixaDeTexto 2"/>
-          <p:cNvSpPr txBox="1"/>
-          <p:nvPr/>
-        </p:nvSpPr>
-        <p:spPr>
-          <a:xfrm>
-            <a:off x="683568" y="2132856"/>
-            <a:ext cx="7776864" cy="4031873"/>
-          </a:xfrm>
-          <a:prstGeom prst="rect">
-            <a:avLst/>
-          </a:prstGeom>
-          <a:noFill/>
-        </p:spPr>
-        <p:txBody>
-          <a:bodyPr wrap="square" rtlCol="0">
-            <a:spAutoFit/>
-          </a:bodyPr>
-          <a:lstStyle/>
-          <a:p>
-            <a:pPr marL="285750" indent="-285750">
-              <a:buFont typeface="Arial" panose="020B0604020202020204" pitchFamily="34" charset="0"/>
-              <a:buChar char="•"/>
-            </a:pPr>
-            <a:r>
-              <a:rPr lang="pt-BR" sz="3200" dirty="0" smtClean="0"/>
-              <a:t>Objeto concreto para representação do Arquivo CSV para o DashGen</a:t>
-            </a:r>
-          </a:p>
-          <a:p>
-            <a:pPr marL="285750" indent="-285750">
-              <a:buFont typeface="Arial" panose="020B0604020202020204" pitchFamily="34" charset="0"/>
-              <a:buChar char="•"/>
-            </a:pPr>
-            <a:r>
-              <a:rPr lang="pt-BR" sz="3200" dirty="0" smtClean="0"/>
-              <a:t>Uso da Apache Commons CSV para manipulação dos atributos e dados contidos no arquivo CSV</a:t>
-            </a:r>
-          </a:p>
-          <a:p>
-            <a:pPr marL="285750" indent="-285750">
-              <a:buFont typeface="Arial" panose="020B0604020202020204" pitchFamily="34" charset="0"/>
-              <a:buChar char="•"/>
-            </a:pPr>
-            <a:r>
-              <a:rPr lang="pt-BR" sz="3200" dirty="0" smtClean="0"/>
-              <a:t>Possui lógica de teste por força bruta para identificação dos atributos numéricos</a:t>
-            </a:r>
-            <a:endParaRPr lang="pt-BR" sz="3200" dirty="0"/>
-          </a:p>
-        </p:txBody>
-      </p:sp>
-    </p:spTree>
-    <p:extLst>
-      <p:ext uri="{BB962C8B-B14F-4D97-AF65-F5344CB8AC3E}">
-        <p14:creationId xmlns:p14="http://schemas.microsoft.com/office/powerpoint/2010/main" val="1719666060"/>
-      </p:ext>
-    </p:extLst>
-  </p:cSld>
-  <p:clrMapOvr>
-    <a:masterClrMapping/>
-  </p:clrMapOvr>
-  <p:timing>
-    <p:tnLst>
-      <p:par>
-        <p:cTn id="1" dur="indefinite" restart="never" nodeType="tmRoot">
-          <p:childTnLst>
-            <p:seq concurrent="1" nextAc="seek">
-              <p:cTn id="2" dur="indefinite" nodeType="mainSeq">
-                <p:childTnLst>
-                  <p:par>
-                    <p:cTn id="3" fill="hold">
-                      <p:stCondLst>
-                        <p:cond delay="indefinite"/>
-                      </p:stCondLst>
-                      <p:childTnLst>
-                        <p:par>
-                          <p:cTn id="4" fill="hold">
-                            <p:stCondLst>
-                              <p:cond delay="0"/>
-                            </p:stCondLst>
-                            <p:childTnLst>
-                              <p:par>
-                                <p:cTn id="5" presetID="10" presetClass="entr" presetSubtype="0" fill="hold" nodeType="clickEffect">
-                                  <p:stCondLst>
-                                    <p:cond delay="0"/>
-                                  </p:stCondLst>
-                                  <p:childTnLst>
-                                    <p:set>
-                                      <p:cBhvr>
-                                        <p:cTn id="6" dur="1" fill="hold">
-                                          <p:stCondLst>
-                                            <p:cond delay="0"/>
-                                          </p:stCondLst>
-                                        </p:cTn>
-                                        <p:tgtEl>
-                                          <p:spTgt spid="3">
-                                            <p:txEl>
-                                              <p:pRg st="0" end="0"/>
-                                            </p:txEl>
-                                          </p:spTgt>
-                                        </p:tgtEl>
-                                        <p:attrNameLst>
-                                          <p:attrName>style.visibility</p:attrName>
-                                        </p:attrNameLst>
-                                      </p:cBhvr>
-                                      <p:to>
-                                        <p:strVal val="visible"/>
-                                      </p:to>
-                                    </p:set>
-                                    <p:animEffect transition="in" filter="fade">
-                                      <p:cBhvr>
-                                        <p:cTn id="7" dur="500"/>
-                                        <p:tgtEl>
-                                          <p:spTgt spid="3">
-                                            <p:txEl>
-                                              <p:pRg st="0" end="0"/>
-                                            </p:txEl>
-                                          </p:spTgt>
-                                        </p:tgtEl>
-                                      </p:cBhvr>
-                                    </p:animEffect>
-                                  </p:childTnLst>
-                                </p:cTn>
-                              </p:par>
-                            </p:childTnLst>
-                          </p:cTn>
-                        </p:par>
-                      </p:childTnLst>
-                    </p:cTn>
-                  </p:par>
-                  <p:par>
-                    <p:cTn id="8" fill="hold">
-                      <p:stCondLst>
-                        <p:cond delay="indefinite"/>
-                      </p:stCondLst>
-                      <p:childTnLst>
-                        <p:par>
-                          <p:cTn id="9" fill="hold">
-                            <p:stCondLst>
-                              <p:cond delay="0"/>
-                            </p:stCondLst>
-                            <p:childTnLst>
-                              <p:par>
-                                <p:cTn id="10" presetID="10" presetClass="entr" presetSubtype="0" fill="hold" nodeType="clickEffect">
-                                  <p:stCondLst>
-                                    <p:cond delay="0"/>
-                                  </p:stCondLst>
-                                  <p:childTnLst>
-                                    <p:set>
-                                      <p:cBhvr>
-                                        <p:cTn id="11" dur="1" fill="hold">
-                                          <p:stCondLst>
-                                            <p:cond delay="0"/>
-                                          </p:stCondLst>
-                                        </p:cTn>
-                                        <p:tgtEl>
-                                          <p:spTgt spid="3">
-                                            <p:txEl>
-                                              <p:pRg st="1" end="1"/>
-                                            </p:txEl>
-                                          </p:spTgt>
-                                        </p:tgtEl>
-                                        <p:attrNameLst>
-                                          <p:attrName>style.visibility</p:attrName>
-                                        </p:attrNameLst>
-                                      </p:cBhvr>
-                                      <p:to>
-                                        <p:strVal val="visible"/>
-                                      </p:to>
-                                    </p:set>
-                                    <p:animEffect transition="in" filter="fade">
-                                      <p:cBhvr>
-                                        <p:cTn id="12" dur="500"/>
-                                        <p:tgtEl>
-                                          <p:spTgt spid="3">
-                                            <p:txEl>
-                                              <p:pRg st="1" end="1"/>
-                                            </p:txEl>
-                                          </p:spTgt>
-                                        </p:tgtEl>
-                                      </p:cBhvr>
-                                    </p:animEffect>
-                                  </p:childTnLst>
-                                </p:cTn>
-                              </p:par>
-                            </p:childTnLst>
-                          </p:cTn>
-                        </p:par>
-                      </p:childTnLst>
-                    </p:cTn>
-                  </p:par>
-                  <p:par>
-                    <p:cTn id="13" fill="hold">
-                      <p:stCondLst>
-                        <p:cond delay="indefinite"/>
-                      </p:stCondLst>
-                      <p:childTnLst>
-                        <p:par>
-                          <p:cTn id="14" fill="hold">
-                            <p:stCondLst>
-                              <p:cond delay="0"/>
-                            </p:stCondLst>
-                            <p:childTnLst>
-                              <p:par>
-                                <p:cTn id="15" presetID="10" presetClass="entr" presetSubtype="0" fill="hold" nodeType="clickEffect">
-                                  <p:stCondLst>
-                                    <p:cond delay="0"/>
-                                  </p:stCondLst>
-                                  <p:childTnLst>
-                                    <p:set>
-                                      <p:cBhvr>
-                                        <p:cTn id="16" dur="1" fill="hold">
-                                          <p:stCondLst>
-                                            <p:cond delay="0"/>
-                                          </p:stCondLst>
-                                        </p:cTn>
-                                        <p:tgtEl>
-                                          <p:spTgt spid="3">
-                                            <p:txEl>
-                                              <p:pRg st="2" end="2"/>
-                                            </p:txEl>
-                                          </p:spTgt>
-                                        </p:tgtEl>
-                                        <p:attrNameLst>
-                                          <p:attrName>style.visibility</p:attrName>
-                                        </p:attrNameLst>
-                                      </p:cBhvr>
-                                      <p:to>
-                                        <p:strVal val="visible"/>
-                                      </p:to>
-                                    </p:set>
-                                    <p:animEffect transition="in" filter="fade">
-                                      <p:cBhvr>
-                                        <p:cTn id="17" dur="500"/>
-                                        <p:tgtEl>
-                                          <p:spTgt spid="3">
-                                            <p:txEl>
-                                              <p:pRg st="2" end="2"/>
-                                            </p:txEl>
-                                          </p:spTgt>
-                                        </p:tgtEl>
-                                      </p:cBhvr>
-                                    </p:animEffect>
-                                  </p:childTnLst>
-                                </p:cTn>
-                              </p:par>
-                            </p:childTnLst>
-                          </p:cTn>
-                        </p:par>
-                      </p:childTnLst>
-                    </p:cTn>
-                  </p:par>
-                </p:childTnLst>
-              </p:cTn>
-              <p:prevCondLst>
-                <p:cond evt="onPrev" delay="0">
-                  <p:tgtEl>
-                    <p:sldTgt/>
-                  </p:tgtEl>
-                </p:cond>
-              </p:prevCondLst>
-              <p:nextCondLst>
-                <p:cond evt="onNext" delay="0">
-                  <p:tgtEl>
-                    <p:sldTgt/>
-                  </p:tgtEl>
-                </p:cond>
-              </p:nextCondLst>
-            </p:seq>
-          </p:childTnLst>
-        </p:cTn>
-      </p:par>
-    </p:tnLst>
-  </p:timing>
-</p:sld>
-</file>
-
-<file path=ppt/slides/slide28.xml><?xml version="1.0" encoding="utf-8"?>
-<p:sld xmlns:a="http://schemas.openxmlformats.org/drawingml/2006/main" xmlns:r="http://schemas.openxmlformats.org/officeDocument/2006/relationships" xmlns:p="http://schemas.openxmlformats.org/presentationml/2006/main">
-  <p:cSld>
-    <p:spTree>
-      <p:nvGrpSpPr>
-        <p:cNvPr id="1" name=""/>
-        <p:cNvGrpSpPr/>
-        <p:nvPr/>
-      </p:nvGrpSpPr>
-      <p:grpSpPr>
-        <a:xfrm>
-          <a:off x="0" y="0"/>
-          <a:ext cx="0" cy="0"/>
-          <a:chOff x="0" y="0"/>
-          <a:chExt cx="0" cy="0"/>
-        </a:xfrm>
-      </p:grpSpPr>
-      <p:sp>
-        <p:nvSpPr>
-          <p:cNvPr id="2" name="Título 1"/>
-          <p:cNvSpPr>
-            <a:spLocks noGrp="1"/>
-          </p:cNvSpPr>
-          <p:nvPr>
-            <p:ph type="title"/>
-          </p:nvPr>
-        </p:nvSpPr>
-        <p:spPr/>
-        <p:txBody>
-          <a:bodyPr>
-            <a:normAutofit fontScale="90000"/>
-          </a:bodyPr>
-          <a:lstStyle/>
-          <a:p>
-            <a:r>
-              <a:rPr lang="pt-BR" dirty="0"/>
-              <a:t>Desenvolvimento da Aplicação</a:t>
-            </a:r>
-            <a:br>
-              <a:rPr lang="pt-BR" dirty="0"/>
-            </a:br>
-            <a:r>
-              <a:rPr lang="pt-BR" sz="3100" dirty="0" smtClean="0"/>
-              <a:t>Modelo </a:t>
-            </a:r>
-            <a:r>
-              <a:rPr lang="pt-BR" sz="3100" dirty="0"/>
-              <a:t>Dataset</a:t>
-            </a:r>
-          </a:p>
-        </p:txBody>
-      </p:sp>
       <p:pic>
         <p:nvPicPr>
           <p:cNvPr id="5123" name="Picture 3"/>
@@ -13742,208 +13507,6 @@
     <p:extLst>
       <p:ext uri="{BB962C8B-B14F-4D97-AF65-F5344CB8AC3E}">
         <p14:creationId xmlns:p14="http://schemas.microsoft.com/office/powerpoint/2010/main" val="596928897"/>
-      </p:ext>
-    </p:extLst>
-  </p:cSld>
-  <p:clrMapOvr>
-    <a:masterClrMapping/>
-  </p:clrMapOvr>
-  <p:timing>
-    <p:tnLst>
-      <p:par>
-        <p:cTn id="1" dur="indefinite" restart="never" nodeType="tmRoot">
-          <p:childTnLst>
-            <p:seq concurrent="1" nextAc="seek">
-              <p:cTn id="2" dur="indefinite" nodeType="mainSeq">
-                <p:childTnLst>
-                  <p:par>
-                    <p:cTn id="3" fill="hold">
-                      <p:stCondLst>
-                        <p:cond delay="indefinite"/>
-                      </p:stCondLst>
-                      <p:childTnLst>
-                        <p:par>
-                          <p:cTn id="4" fill="hold">
-                            <p:stCondLst>
-                              <p:cond delay="0"/>
-                            </p:stCondLst>
-                            <p:childTnLst>
-                              <p:par>
-                                <p:cTn id="5" presetID="6" presetClass="entr" presetSubtype="32" fill="hold" nodeType="clickEffect">
-                                  <p:stCondLst>
-                                    <p:cond delay="0"/>
-                                  </p:stCondLst>
-                                  <p:childTnLst>
-                                    <p:set>
-                                      <p:cBhvr>
-                                        <p:cTn id="6" dur="1" fill="hold">
-                                          <p:stCondLst>
-                                            <p:cond delay="0"/>
-                                          </p:stCondLst>
-                                        </p:cTn>
-                                        <p:tgtEl>
-                                          <p:spTgt spid="5123"/>
-                                        </p:tgtEl>
-                                        <p:attrNameLst>
-                                          <p:attrName>style.visibility</p:attrName>
-                                        </p:attrNameLst>
-                                      </p:cBhvr>
-                                      <p:to>
-                                        <p:strVal val="visible"/>
-                                      </p:to>
-                                    </p:set>
-                                    <p:animEffect transition="in" filter="circle(out)">
-                                      <p:cBhvr>
-                                        <p:cTn id="7" dur="2000"/>
-                                        <p:tgtEl>
-                                          <p:spTgt spid="5123"/>
-                                        </p:tgtEl>
-                                      </p:cBhvr>
-                                    </p:animEffect>
-                                  </p:childTnLst>
-                                </p:cTn>
-                              </p:par>
-                            </p:childTnLst>
-                          </p:cTn>
-                        </p:par>
-                      </p:childTnLst>
-                    </p:cTn>
-                  </p:par>
-                </p:childTnLst>
-              </p:cTn>
-              <p:prevCondLst>
-                <p:cond evt="onPrev" delay="0">
-                  <p:tgtEl>
-                    <p:sldTgt/>
-                  </p:tgtEl>
-                </p:cond>
-              </p:prevCondLst>
-              <p:nextCondLst>
-                <p:cond evt="onNext" delay="0">
-                  <p:tgtEl>
-                    <p:sldTgt/>
-                  </p:tgtEl>
-                </p:cond>
-              </p:nextCondLst>
-            </p:seq>
-          </p:childTnLst>
-        </p:cTn>
-      </p:par>
-    </p:tnLst>
-  </p:timing>
-</p:sld>
-</file>
-
-<file path=ppt/slides/slide29.xml><?xml version="1.0" encoding="utf-8"?>
-<p:sld xmlns:a="http://schemas.openxmlformats.org/drawingml/2006/main" xmlns:r="http://schemas.openxmlformats.org/officeDocument/2006/relationships" xmlns:p="http://schemas.openxmlformats.org/presentationml/2006/main">
-  <p:cSld>
-    <p:spTree>
-      <p:nvGrpSpPr>
-        <p:cNvPr id="1" name=""/>
-        <p:cNvGrpSpPr/>
-        <p:nvPr/>
-      </p:nvGrpSpPr>
-      <p:grpSpPr>
-        <a:xfrm>
-          <a:off x="0" y="0"/>
-          <a:ext cx="0" cy="0"/>
-          <a:chOff x="0" y="0"/>
-          <a:chExt cx="0" cy="0"/>
-        </a:xfrm>
-      </p:grpSpPr>
-      <p:sp>
-        <p:nvSpPr>
-          <p:cNvPr id="2" name="Título 1"/>
-          <p:cNvSpPr>
-            <a:spLocks noGrp="1"/>
-          </p:cNvSpPr>
-          <p:nvPr>
-            <p:ph type="title"/>
-          </p:nvPr>
-        </p:nvSpPr>
-        <p:spPr/>
-        <p:txBody>
-          <a:bodyPr>
-            <a:normAutofit fontScale="90000"/>
-          </a:bodyPr>
-          <a:lstStyle/>
-          <a:p>
-            <a:r>
-              <a:rPr lang="pt-BR" dirty="0"/>
-              <a:t>Desenvolvimento da Aplicação</a:t>
-            </a:r>
-            <a:br>
-              <a:rPr lang="pt-BR" dirty="0"/>
-            </a:br>
-            <a:r>
-              <a:rPr lang="pt-BR" sz="3100" dirty="0" smtClean="0"/>
-              <a:t>Modelo </a:t>
-            </a:r>
-            <a:r>
-              <a:rPr lang="pt-BR" sz="3100" dirty="0"/>
-              <a:t>Dataset</a:t>
-            </a:r>
-          </a:p>
-        </p:txBody>
-      </p:sp>
-      <p:pic>
-        <p:nvPicPr>
-          <p:cNvPr id="5123" name="Picture 3"/>
-          <p:cNvPicPr>
-            <a:picLocks noChangeAspect="1" noChangeArrowheads="1"/>
-          </p:cNvPicPr>
-          <p:nvPr/>
-        </p:nvPicPr>
-        <p:blipFill>
-          <a:blip r:embed="rId2">
-            <a:extLst>
-              <a:ext uri="{28A0092B-C50C-407E-A947-70E740481C1C}">
-                <a14:useLocalDpi xmlns:a14="http://schemas.microsoft.com/office/drawing/2010/main" val="0"/>
-              </a:ext>
-            </a:extLst>
-          </a:blip>
-          <a:srcRect/>
-          <a:stretch>
-            <a:fillRect/>
-          </a:stretch>
-        </p:blipFill>
-        <p:spPr bwMode="auto">
-          <a:xfrm>
-            <a:off x="827584" y="1484784"/>
-            <a:ext cx="7564288" cy="5301288"/>
-          </a:xfrm>
-          <a:prstGeom prst="rect">
-            <a:avLst/>
-          </a:prstGeom>
-          <a:noFill/>
-          <a:ln>
-            <a:noFill/>
-          </a:ln>
-          <a:extLst>
-            <a:ext uri="{909E8E84-426E-40DD-AFC4-6F175D3DCCD1}">
-              <a14:hiddenFill xmlns:a14="http://schemas.microsoft.com/office/drawing/2010/main">
-                <a:solidFill>
-                  <a:schemeClr val="accent1"/>
-                </a:solidFill>
-              </a14:hiddenFill>
-            </a:ext>
-            <a:ext uri="{91240B29-F687-4F45-9708-019B960494DF}">
-              <a14:hiddenLine xmlns:a14="http://schemas.microsoft.com/office/drawing/2010/main" w="9525">
-                <a:solidFill>
-                  <a:schemeClr val="tx1"/>
-                </a:solidFill>
-                <a:miter lim="800000"/>
-                <a:headEnd/>
-                <a:tailEnd/>
-              </a14:hiddenLine>
-            </a:ext>
-          </a:extLst>
-        </p:spPr>
-      </p:pic>
-    </p:spTree>
-    <p:extLst>
-      <p:ext uri="{BB962C8B-B14F-4D97-AF65-F5344CB8AC3E}">
-        <p14:creationId xmlns:p14="http://schemas.microsoft.com/office/powerpoint/2010/main" val="553163415"/>
       </p:ext>
     </p:extLst>
   </p:cSld>

</xml_diff>

<commit_message>
Parcialmente pronto o PPT da apresentação
</commit_message>
<xml_diff>
--- a/mono/Defesa TCC - DashGen.pptx
+++ b/mono/Defesa TCC - DashGen.pptx
@@ -32,6 +32,27 @@
     <p:sldId id="280" r:id="rId26"/>
     <p:sldId id="282" r:id="rId27"/>
     <p:sldId id="283" r:id="rId28"/>
+    <p:sldId id="285" r:id="rId29"/>
+    <p:sldId id="284" r:id="rId30"/>
+    <p:sldId id="286" r:id="rId31"/>
+    <p:sldId id="287" r:id="rId32"/>
+    <p:sldId id="288" r:id="rId33"/>
+    <p:sldId id="289" r:id="rId34"/>
+    <p:sldId id="290" r:id="rId35"/>
+    <p:sldId id="291" r:id="rId36"/>
+    <p:sldId id="292" r:id="rId37"/>
+    <p:sldId id="293" r:id="rId38"/>
+    <p:sldId id="295" r:id="rId39"/>
+    <p:sldId id="294" r:id="rId40"/>
+    <p:sldId id="296" r:id="rId41"/>
+    <p:sldId id="297" r:id="rId42"/>
+    <p:sldId id="298" r:id="rId43"/>
+    <p:sldId id="299" r:id="rId44"/>
+    <p:sldId id="300" r:id="rId45"/>
+    <p:sldId id="301" r:id="rId46"/>
+    <p:sldId id="302" r:id="rId47"/>
+    <p:sldId id="303" r:id="rId48"/>
+    <p:sldId id="304" r:id="rId49"/>
   </p:sldIdLst>
   <p:sldSz cx="9144000" cy="6858000" type="screen4x3"/>
   <p:notesSz cx="6858000" cy="9144000"/>
@@ -5022,7 +5043,7 @@
           <a:lstStyle/>
           <a:p>
             <a:r>
-              <a:rPr lang="pt-BR" sz="3200" dirty="0"/>
+              <a:rPr lang="pt-BR" sz="2800" dirty="0"/>
               <a:t>partes ou componentes de software que têm a função de combinar um ou mais gabaritos com um dado modelo de dados, gerando um ou mais artefatos de saída como resultado de seu processamento(WIKIPEDIA.ORG, 2020). </a:t>
             </a:r>
           </a:p>
@@ -8561,19 +8582,7 @@
             </a:r>
             <a:r>
               <a:rPr lang="pt-BR" sz="2800" b="1" dirty="0" smtClean="0"/>
-              <a:t>Usando engenharia de software </a:t>
-            </a:r>
-            <a:r>
-              <a:rPr lang="pt-BR" sz="2800" b="1" dirty="0" smtClean="0"/>
-              <a:t>baseada em reuso e a programação generativa </a:t>
-            </a:r>
-            <a:r>
-              <a:rPr lang="pt-BR" sz="2800" b="1" dirty="0" smtClean="0"/>
-              <a:t>é possível ajudar </a:t>
-            </a:r>
-            <a:r>
-              <a:rPr lang="pt-BR" sz="2800" b="1" dirty="0" smtClean="0"/>
-              <a:t>a diminuir o esforço repetitivo de gerar esses quadros?</a:t>
+              <a:t>Usando engenharia de software baseada em reuso e a programação generativa é possível ajudar a diminuir o esforço repetitivo de gerar esses quadros?</a:t>
             </a:r>
             <a:endParaRPr lang="pt-BR" sz="2800" b="1" dirty="0"/>
           </a:p>
@@ -13440,7 +13449,7 @@
             </a:br>
             <a:r>
               <a:rPr lang="pt-BR" sz="3100" dirty="0" smtClean="0"/>
-              <a:t>Modelo </a:t>
+              <a:t>Classe </a:t>
             </a:r>
             <a:r>
               <a:rPr lang="pt-BR" sz="3100" dirty="0"/>
@@ -13451,7 +13460,7 @@
       </p:sp>
       <p:pic>
         <p:nvPicPr>
-          <p:cNvPr id="5123" name="Picture 3"/>
+          <p:cNvPr id="1026" name="Picture 2"/>
           <p:cNvPicPr>
             <a:picLocks noChangeAspect="1" noChangeArrowheads="1"/>
           </p:cNvPicPr>
@@ -13472,8 +13481,8 @@
         </p:blipFill>
         <p:spPr bwMode="auto">
           <a:xfrm>
-            <a:off x="827584" y="1484784"/>
-            <a:ext cx="7564288" cy="5301288"/>
+            <a:off x="1331640" y="1642704"/>
+            <a:ext cx="6322318" cy="5046922"/>
           </a:xfrm>
           <a:prstGeom prst="rect">
             <a:avLst/>
@@ -13516,6 +13525,152 @@
   <p:timing>
     <p:tnLst>
       <p:par>
+        <p:cTn id="1" dur="indefinite" restart="never" nodeType="tmRoot"/>
+      </p:par>
+    </p:tnLst>
+  </p:timing>
+</p:sld>
+</file>
+
+<file path=ppt/slides/slide28.xml><?xml version="1.0" encoding="utf-8"?>
+<p:sld xmlns:a="http://schemas.openxmlformats.org/drawingml/2006/main" xmlns:r="http://schemas.openxmlformats.org/officeDocument/2006/relationships" xmlns:p="http://schemas.openxmlformats.org/presentationml/2006/main">
+  <p:cSld>
+    <p:spTree>
+      <p:nvGrpSpPr>
+        <p:cNvPr id="1" name=""/>
+        <p:cNvGrpSpPr/>
+        <p:nvPr/>
+      </p:nvGrpSpPr>
+      <p:grpSpPr>
+        <a:xfrm>
+          <a:off x="0" y="0"/>
+          <a:ext cx="0" cy="0"/>
+          <a:chOff x="0" y="0"/>
+          <a:chExt cx="0" cy="0"/>
+        </a:xfrm>
+      </p:grpSpPr>
+      <p:sp>
+        <p:nvSpPr>
+          <p:cNvPr id="2" name="Título 1"/>
+          <p:cNvSpPr>
+            <a:spLocks noGrp="1"/>
+          </p:cNvSpPr>
+          <p:nvPr>
+            <p:ph type="title"/>
+          </p:nvPr>
+        </p:nvSpPr>
+        <p:spPr/>
+        <p:txBody>
+          <a:bodyPr>
+            <a:normAutofit fontScale="90000"/>
+          </a:bodyPr>
+          <a:lstStyle/>
+          <a:p>
+            <a:r>
+              <a:rPr lang="pt-BR" dirty="0"/>
+              <a:t>Desenvolvimento da Aplicação</a:t>
+            </a:r>
+            <a:br>
+              <a:rPr lang="pt-BR" dirty="0"/>
+            </a:br>
+            <a:r>
+              <a:rPr lang="pt-BR" sz="3100" dirty="0" smtClean="0"/>
+              <a:t>Classe </a:t>
+            </a:r>
+            <a:r>
+              <a:rPr lang="pt-BR" sz="3100" dirty="0" smtClean="0"/>
+              <a:t>Gerador</a:t>
+            </a:r>
+            <a:endParaRPr lang="pt-BR" sz="3100" dirty="0"/>
+          </a:p>
+        </p:txBody>
+      </p:sp>
+      <p:sp>
+        <p:nvSpPr>
+          <p:cNvPr id="3" name="CaixaDeTexto 2"/>
+          <p:cNvSpPr txBox="1"/>
+          <p:nvPr/>
+        </p:nvSpPr>
+        <p:spPr>
+          <a:xfrm>
+            <a:off x="683568" y="2132856"/>
+            <a:ext cx="7776864" cy="3046988"/>
+          </a:xfrm>
+          <a:prstGeom prst="rect">
+            <a:avLst/>
+          </a:prstGeom>
+          <a:noFill/>
+        </p:spPr>
+        <p:txBody>
+          <a:bodyPr wrap="square" rtlCol="0">
+            <a:spAutoFit/>
+          </a:bodyPr>
+          <a:lstStyle/>
+          <a:p>
+            <a:pPr marL="457200" indent="-457200">
+              <a:buFont typeface="Arial" panose="020B0604020202020204" pitchFamily="34" charset="0"/>
+              <a:buChar char="•"/>
+            </a:pPr>
+            <a:r>
+              <a:rPr lang="pt-BR" sz="3200" dirty="0" smtClean="0"/>
+              <a:t>responsável </a:t>
+            </a:r>
+            <a:r>
+              <a:rPr lang="pt-BR" sz="3200" dirty="0"/>
+              <a:t>por operar o Motor de </a:t>
+            </a:r>
+            <a:r>
+              <a:rPr lang="pt-BR" sz="3200" dirty="0" smtClean="0"/>
+              <a:t>Gabaritos Apache </a:t>
+            </a:r>
+            <a:r>
+              <a:rPr lang="pt-BR" sz="3200" dirty="0"/>
+              <a:t>Freemarker. </a:t>
+            </a:r>
+            <a:endParaRPr lang="pt-BR" sz="3200" dirty="0" smtClean="0"/>
+          </a:p>
+          <a:p>
+            <a:pPr marL="457200" indent="-457200">
+              <a:buFont typeface="Arial" panose="020B0604020202020204" pitchFamily="34" charset="0"/>
+              <a:buChar char="•"/>
+            </a:pPr>
+            <a:r>
+              <a:rPr lang="pt-BR" sz="3200" dirty="0" smtClean="0"/>
+              <a:t>Deve </a:t>
+            </a:r>
+            <a:r>
+              <a:rPr lang="pt-BR" sz="3200" dirty="0"/>
+              <a:t>receber como parâmetro de construtor o </a:t>
+            </a:r>
+            <a:r>
+              <a:rPr lang="pt-BR" sz="3200" dirty="0" smtClean="0"/>
+              <a:t>objeto Dashboard </a:t>
+            </a:r>
+            <a:r>
+              <a:rPr lang="pt-BR" sz="3200" dirty="0"/>
+              <a:t>e o descritor File do diretório de destino especificado pelo </a:t>
+            </a:r>
+            <a:r>
+              <a:rPr lang="pt-BR" sz="3200" dirty="0" smtClean="0"/>
+              <a:t>usuário.</a:t>
+            </a:r>
+            <a:endParaRPr lang="pt-BR" sz="3200" dirty="0"/>
+          </a:p>
+        </p:txBody>
+      </p:sp>
+    </p:spTree>
+    <p:extLst>
+      <p:ext uri="{BB962C8B-B14F-4D97-AF65-F5344CB8AC3E}">
+        <p14:creationId xmlns:p14="http://schemas.microsoft.com/office/powerpoint/2010/main" val="2239382176"/>
+      </p:ext>
+    </p:extLst>
+  </p:cSld>
+  <p:clrMapOvr>
+    <a:masterClrMapping/>
+  </p:clrMapOvr>
+  <p:timing>
+    <p:tnLst>
+      <p:par>
         <p:cTn id="1" dur="indefinite" restart="never" nodeType="tmRoot">
           <p:childTnLst>
             <p:seq concurrent="1" nextAc="seek">
@@ -13534,7 +13689,7 @@
                             </p:stCondLst>
                             <p:childTnLst>
                               <p:par>
-                                <p:cTn id="5" presetID="6" presetClass="entr" presetSubtype="32" fill="hold" nodeType="clickEffect">
+                                <p:cTn id="5" presetID="10" presetClass="entr" presetSubtype="0" fill="hold" nodeType="clickEffect">
                                   <p:stCondLst>
                                     <p:cond delay="0"/>
                                   </p:stCondLst>
@@ -13547,7 +13702,11 @@
                                           </p:stCondLst>
                                         </p:cTn>
                                         <p:tgtEl>
-                                          <p:spTgt spid="5123"/>
+                                          <p:spTgt spid="3">
+                                            <p:txEl>
+                                              <p:pRg st="0" end="0"/>
+                                            </p:txEl>
+                                          </p:spTgt>
                                         </p:tgtEl>
                                         <p:attrNameLst>
                                           <p:attrName>style.visibility</p:attrName>
@@ -13557,11 +13716,76 @@
                                         <p:strVal val="visible"/>
                                       </p:to>
                                     </p:set>
-                                    <p:animEffect transition="in" filter="circle(out)">
+                                    <p:animEffect transition="in" filter="fade">
                                       <p:cBhvr>
-                                        <p:cTn id="7" dur="2000"/>
+                                        <p:cTn id="7" dur="500"/>
                                         <p:tgtEl>
-                                          <p:spTgt spid="5123"/>
+                                          <p:spTgt spid="3">
+                                            <p:txEl>
+                                              <p:pRg st="0" end="0"/>
+                                            </p:txEl>
+                                          </p:spTgt>
+                                        </p:tgtEl>
+                                      </p:cBhvr>
+                                    </p:animEffect>
+                                  </p:childTnLst>
+                                </p:cTn>
+                              </p:par>
+                            </p:childTnLst>
+                          </p:cTn>
+                        </p:par>
+                      </p:childTnLst>
+                    </p:cTn>
+                  </p:par>
+                  <p:par>
+                    <p:cTn id="8" fill="hold">
+                      <p:stCondLst>
+                        <p:cond delay="indefinite"/>
+                      </p:stCondLst>
+                      <p:childTnLst>
+                        <p:par>
+                          <p:cTn id="9" fill="hold">
+                            <p:stCondLst>
+                              <p:cond delay="0"/>
+                            </p:stCondLst>
+                            <p:childTnLst>
+                              <p:par>
+                                <p:cTn id="10" presetID="10" presetClass="entr" presetSubtype="0" fill="hold" nodeType="clickEffect">
+                                  <p:stCondLst>
+                                    <p:cond delay="0"/>
+                                  </p:stCondLst>
+                                  <p:childTnLst>
+                                    <p:set>
+                                      <p:cBhvr>
+                                        <p:cTn id="11" dur="1" fill="hold">
+                                          <p:stCondLst>
+                                            <p:cond delay="0"/>
+                                          </p:stCondLst>
+                                        </p:cTn>
+                                        <p:tgtEl>
+                                          <p:spTgt spid="3">
+                                            <p:txEl>
+                                              <p:pRg st="1" end="1"/>
+                                            </p:txEl>
+                                          </p:spTgt>
+                                        </p:tgtEl>
+                                        <p:attrNameLst>
+                                          <p:attrName>style.visibility</p:attrName>
+                                        </p:attrNameLst>
+                                      </p:cBhvr>
+                                      <p:to>
+                                        <p:strVal val="visible"/>
+                                      </p:to>
+                                    </p:set>
+                                    <p:animEffect transition="in" filter="fade">
+                                      <p:cBhvr>
+                                        <p:cTn id="12" dur="500"/>
+                                        <p:tgtEl>
+                                          <p:spTgt spid="3">
+                                            <p:txEl>
+                                              <p:pRg st="1" end="1"/>
+                                            </p:txEl>
+                                          </p:spTgt>
                                         </p:tgtEl>
                                       </p:cBhvr>
                                     </p:animEffect>
@@ -13593,6 +13817,129 @@
             </p:seq>
           </p:childTnLst>
         </p:cTn>
+      </p:par>
+    </p:tnLst>
+  </p:timing>
+</p:sld>
+</file>
+
+<file path=ppt/slides/slide29.xml><?xml version="1.0" encoding="utf-8"?>
+<p:sld xmlns:a="http://schemas.openxmlformats.org/drawingml/2006/main" xmlns:r="http://schemas.openxmlformats.org/officeDocument/2006/relationships" xmlns:p="http://schemas.openxmlformats.org/presentationml/2006/main">
+  <p:cSld>
+    <p:spTree>
+      <p:nvGrpSpPr>
+        <p:cNvPr id="1" name=""/>
+        <p:cNvGrpSpPr/>
+        <p:nvPr/>
+      </p:nvGrpSpPr>
+      <p:grpSpPr>
+        <a:xfrm>
+          <a:off x="0" y="0"/>
+          <a:ext cx="0" cy="0"/>
+          <a:chOff x="0" y="0"/>
+          <a:chExt cx="0" cy="0"/>
+        </a:xfrm>
+      </p:grpSpPr>
+      <p:sp>
+        <p:nvSpPr>
+          <p:cNvPr id="2" name="Título 1"/>
+          <p:cNvSpPr>
+            <a:spLocks noGrp="1"/>
+          </p:cNvSpPr>
+          <p:nvPr>
+            <p:ph type="title"/>
+          </p:nvPr>
+        </p:nvSpPr>
+        <p:spPr/>
+        <p:txBody>
+          <a:bodyPr>
+            <a:normAutofit fontScale="90000"/>
+          </a:bodyPr>
+          <a:lstStyle/>
+          <a:p>
+            <a:r>
+              <a:rPr lang="pt-BR" dirty="0"/>
+              <a:t>Desenvolvimento da Aplicação</a:t>
+            </a:r>
+            <a:br>
+              <a:rPr lang="pt-BR" dirty="0"/>
+            </a:br>
+            <a:r>
+              <a:rPr lang="pt-BR" sz="3100" dirty="0" smtClean="0"/>
+              <a:t>Classe Gerador</a:t>
+            </a:r>
+            <a:endParaRPr lang="pt-BR" sz="3100" dirty="0"/>
+          </a:p>
+        </p:txBody>
+      </p:sp>
+      <p:pic>
+        <p:nvPicPr>
+          <p:cNvPr id="2050" name="Picture 2"/>
+          <p:cNvPicPr>
+            <a:picLocks noChangeAspect="1" noChangeArrowheads="1"/>
+          </p:cNvPicPr>
+          <p:nvPr/>
+        </p:nvPicPr>
+        <p:blipFill>
+          <a:blip r:embed="rId2">
+            <a:extLst>
+              <a:ext uri="{28A0092B-C50C-407E-A947-70E740481C1C}">
+                <a14:useLocalDpi xmlns:a14="http://schemas.microsoft.com/office/drawing/2010/main" val="0"/>
+              </a:ext>
+            </a:extLst>
+          </a:blip>
+          <a:srcRect/>
+          <a:stretch>
+            <a:fillRect/>
+          </a:stretch>
+        </p:blipFill>
+        <p:spPr bwMode="auto">
+          <a:xfrm>
+            <a:off x="270241" y="1765711"/>
+            <a:ext cx="8658225" cy="4810125"/>
+          </a:xfrm>
+          <a:prstGeom prst="rect">
+            <a:avLst/>
+          </a:prstGeom>
+          <a:noFill/>
+          <a:ln>
+            <a:noFill/>
+          </a:ln>
+          <a:extLst>
+            <a:ext uri="{909E8E84-426E-40DD-AFC4-6F175D3DCCD1}">
+              <a14:hiddenFill xmlns:a14="http://schemas.microsoft.com/office/drawing/2010/main">
+                <a:solidFill>
+                  <a:schemeClr val="accent1"/>
+                </a:solidFill>
+              </a14:hiddenFill>
+            </a:ext>
+            <a:ext uri="{91240B29-F687-4F45-9708-019B960494DF}">
+              <a14:hiddenLine xmlns:a14="http://schemas.microsoft.com/office/drawing/2010/main" w="9525">
+                <a:solidFill>
+                  <a:schemeClr val="tx1"/>
+                </a:solidFill>
+                <a:miter lim="800000"/>
+                <a:headEnd/>
+                <a:tailEnd/>
+              </a14:hiddenLine>
+            </a:ext>
+          </a:extLst>
+        </p:spPr>
+      </p:pic>
+    </p:spTree>
+    <p:extLst>
+      <p:ext uri="{BB962C8B-B14F-4D97-AF65-F5344CB8AC3E}">
+        <p14:creationId xmlns:p14="http://schemas.microsoft.com/office/powerpoint/2010/main" val="1782519753"/>
+      </p:ext>
+    </p:extLst>
+  </p:cSld>
+  <p:clrMapOvr>
+    <a:masterClrMapping/>
+  </p:clrMapOvr>
+  <p:timing>
+    <p:tnLst>
+      <p:par>
+        <p:cTn id="1" dur="indefinite" restart="never" nodeType="tmRoot"/>
       </p:par>
     </p:tnLst>
   </p:timing>
@@ -14039,6 +14386,1436 @@
 </p:sld>
 </file>
 
+<file path=ppt/slides/slide30.xml><?xml version="1.0" encoding="utf-8"?>
+<p:sld xmlns:a="http://schemas.openxmlformats.org/drawingml/2006/main" xmlns:r="http://schemas.openxmlformats.org/officeDocument/2006/relationships" xmlns:p="http://schemas.openxmlformats.org/presentationml/2006/main">
+  <p:cSld>
+    <p:spTree>
+      <p:nvGrpSpPr>
+        <p:cNvPr id="1" name=""/>
+        <p:cNvGrpSpPr/>
+        <p:nvPr/>
+      </p:nvGrpSpPr>
+      <p:grpSpPr>
+        <a:xfrm>
+          <a:off x="0" y="0"/>
+          <a:ext cx="0" cy="0"/>
+          <a:chOff x="0" y="0"/>
+          <a:chExt cx="0" cy="0"/>
+        </a:xfrm>
+      </p:grpSpPr>
+      <p:sp>
+        <p:nvSpPr>
+          <p:cNvPr id="2" name="Título 1"/>
+          <p:cNvSpPr>
+            <a:spLocks noGrp="1"/>
+          </p:cNvSpPr>
+          <p:nvPr>
+            <p:ph type="title"/>
+          </p:nvPr>
+        </p:nvSpPr>
+        <p:spPr/>
+        <p:txBody>
+          <a:bodyPr>
+            <a:normAutofit fontScale="90000"/>
+          </a:bodyPr>
+          <a:lstStyle/>
+          <a:p>
+            <a:r>
+              <a:rPr lang="pt-BR" dirty="0"/>
+              <a:t>Desenvolvimento da Aplicação</a:t>
+            </a:r>
+            <a:br>
+              <a:rPr lang="pt-BR" dirty="0"/>
+            </a:br>
+            <a:r>
+              <a:rPr lang="pt-BR" sz="3100" dirty="0" smtClean="0"/>
+              <a:t>Gabarito FTL</a:t>
+            </a:r>
+            <a:endParaRPr lang="pt-BR" sz="3100" dirty="0"/>
+          </a:p>
+        </p:txBody>
+      </p:sp>
+      <p:sp>
+        <p:nvSpPr>
+          <p:cNvPr id="3" name="CaixaDeTexto 2"/>
+          <p:cNvSpPr txBox="1"/>
+          <p:nvPr/>
+        </p:nvSpPr>
+        <p:spPr>
+          <a:xfrm>
+            <a:off x="683568" y="2132856"/>
+            <a:ext cx="7776864" cy="2062103"/>
+          </a:xfrm>
+          <a:prstGeom prst="rect">
+            <a:avLst/>
+          </a:prstGeom>
+          <a:noFill/>
+        </p:spPr>
+        <p:txBody>
+          <a:bodyPr wrap="square" rtlCol="0">
+            <a:spAutoFit/>
+          </a:bodyPr>
+          <a:lstStyle/>
+          <a:p>
+            <a:pPr marL="457200" indent="-457200">
+              <a:buFont typeface="Arial" panose="020B0604020202020204" pitchFamily="34" charset="0"/>
+              <a:buChar char="•"/>
+            </a:pPr>
+            <a:r>
+              <a:rPr lang="pt-BR" sz="3200" dirty="0" smtClean="0"/>
+              <a:t>Arquivo “modelo” de como deve ficar o artefato final.</a:t>
+            </a:r>
+          </a:p>
+          <a:p>
+            <a:pPr marL="457200" indent="-457200">
+              <a:buFont typeface="Arial" panose="020B0604020202020204" pitchFamily="34" charset="0"/>
+              <a:buChar char="•"/>
+            </a:pPr>
+            <a:r>
+              <a:rPr lang="pt-BR" sz="3200" dirty="0" smtClean="0"/>
+              <a:t>Texto fixo entremeado pelas marcações FTL.</a:t>
+            </a:r>
+            <a:endParaRPr lang="pt-BR" sz="3200" dirty="0"/>
+          </a:p>
+        </p:txBody>
+      </p:sp>
+    </p:spTree>
+    <p:extLst>
+      <p:ext uri="{BB962C8B-B14F-4D97-AF65-F5344CB8AC3E}">
+        <p14:creationId xmlns:p14="http://schemas.microsoft.com/office/powerpoint/2010/main" val="1219522875"/>
+      </p:ext>
+    </p:extLst>
+  </p:cSld>
+  <p:clrMapOvr>
+    <a:masterClrMapping/>
+  </p:clrMapOvr>
+  <p:timing>
+    <p:tnLst>
+      <p:par>
+        <p:cTn id="1" dur="indefinite" restart="never" nodeType="tmRoot">
+          <p:childTnLst>
+            <p:seq concurrent="1" nextAc="seek">
+              <p:cTn id="2" dur="indefinite" nodeType="mainSeq">
+                <p:childTnLst>
+                  <p:par>
+                    <p:cTn id="3" fill="hold">
+                      <p:stCondLst>
+                        <p:cond delay="indefinite"/>
+                      </p:stCondLst>
+                      <p:childTnLst>
+                        <p:par>
+                          <p:cTn id="4" fill="hold">
+                            <p:stCondLst>
+                              <p:cond delay="0"/>
+                            </p:stCondLst>
+                            <p:childTnLst>
+                              <p:par>
+                                <p:cTn id="5" presetID="10" presetClass="entr" presetSubtype="0" fill="hold" nodeType="clickEffect">
+                                  <p:stCondLst>
+                                    <p:cond delay="0"/>
+                                  </p:stCondLst>
+                                  <p:childTnLst>
+                                    <p:set>
+                                      <p:cBhvr>
+                                        <p:cTn id="6" dur="1" fill="hold">
+                                          <p:stCondLst>
+                                            <p:cond delay="0"/>
+                                          </p:stCondLst>
+                                        </p:cTn>
+                                        <p:tgtEl>
+                                          <p:spTgt spid="3">
+                                            <p:txEl>
+                                              <p:pRg st="0" end="0"/>
+                                            </p:txEl>
+                                          </p:spTgt>
+                                        </p:tgtEl>
+                                        <p:attrNameLst>
+                                          <p:attrName>style.visibility</p:attrName>
+                                        </p:attrNameLst>
+                                      </p:cBhvr>
+                                      <p:to>
+                                        <p:strVal val="visible"/>
+                                      </p:to>
+                                    </p:set>
+                                    <p:animEffect transition="in" filter="fade">
+                                      <p:cBhvr>
+                                        <p:cTn id="7" dur="500"/>
+                                        <p:tgtEl>
+                                          <p:spTgt spid="3">
+                                            <p:txEl>
+                                              <p:pRg st="0" end="0"/>
+                                            </p:txEl>
+                                          </p:spTgt>
+                                        </p:tgtEl>
+                                      </p:cBhvr>
+                                    </p:animEffect>
+                                  </p:childTnLst>
+                                </p:cTn>
+                              </p:par>
+                            </p:childTnLst>
+                          </p:cTn>
+                        </p:par>
+                      </p:childTnLst>
+                    </p:cTn>
+                  </p:par>
+                  <p:par>
+                    <p:cTn id="8" fill="hold">
+                      <p:stCondLst>
+                        <p:cond delay="indefinite"/>
+                      </p:stCondLst>
+                      <p:childTnLst>
+                        <p:par>
+                          <p:cTn id="9" fill="hold">
+                            <p:stCondLst>
+                              <p:cond delay="0"/>
+                            </p:stCondLst>
+                            <p:childTnLst>
+                              <p:par>
+                                <p:cTn id="10" presetID="10" presetClass="entr" presetSubtype="0" fill="hold" nodeType="clickEffect">
+                                  <p:stCondLst>
+                                    <p:cond delay="0"/>
+                                  </p:stCondLst>
+                                  <p:childTnLst>
+                                    <p:set>
+                                      <p:cBhvr>
+                                        <p:cTn id="11" dur="1" fill="hold">
+                                          <p:stCondLst>
+                                            <p:cond delay="0"/>
+                                          </p:stCondLst>
+                                        </p:cTn>
+                                        <p:tgtEl>
+                                          <p:spTgt spid="3">
+                                            <p:txEl>
+                                              <p:pRg st="1" end="1"/>
+                                            </p:txEl>
+                                          </p:spTgt>
+                                        </p:tgtEl>
+                                        <p:attrNameLst>
+                                          <p:attrName>style.visibility</p:attrName>
+                                        </p:attrNameLst>
+                                      </p:cBhvr>
+                                      <p:to>
+                                        <p:strVal val="visible"/>
+                                      </p:to>
+                                    </p:set>
+                                    <p:animEffect transition="in" filter="fade">
+                                      <p:cBhvr>
+                                        <p:cTn id="12" dur="500"/>
+                                        <p:tgtEl>
+                                          <p:spTgt spid="3">
+                                            <p:txEl>
+                                              <p:pRg st="1" end="1"/>
+                                            </p:txEl>
+                                          </p:spTgt>
+                                        </p:tgtEl>
+                                      </p:cBhvr>
+                                    </p:animEffect>
+                                  </p:childTnLst>
+                                </p:cTn>
+                              </p:par>
+                            </p:childTnLst>
+                          </p:cTn>
+                        </p:par>
+                      </p:childTnLst>
+                    </p:cTn>
+                  </p:par>
+                </p:childTnLst>
+              </p:cTn>
+              <p:prevCondLst>
+                <p:cond evt="onPrev" delay="0">
+                  <p:tgtEl>
+                    <p:sldTgt/>
+                  </p:tgtEl>
+                </p:cond>
+              </p:prevCondLst>
+              <p:nextCondLst>
+                <p:cond evt="onNext" delay="0">
+                  <p:tgtEl>
+                    <p:sldTgt/>
+                  </p:tgtEl>
+                </p:cond>
+              </p:nextCondLst>
+            </p:seq>
+          </p:childTnLst>
+        </p:cTn>
+      </p:par>
+    </p:tnLst>
+  </p:timing>
+</p:sld>
+</file>
+
+<file path=ppt/slides/slide31.xml><?xml version="1.0" encoding="utf-8"?>
+<p:sld xmlns:a="http://schemas.openxmlformats.org/drawingml/2006/main" xmlns:r="http://schemas.openxmlformats.org/officeDocument/2006/relationships" xmlns:p="http://schemas.openxmlformats.org/presentationml/2006/main">
+  <p:cSld>
+    <p:spTree>
+      <p:nvGrpSpPr>
+        <p:cNvPr id="1" name=""/>
+        <p:cNvGrpSpPr/>
+        <p:nvPr/>
+      </p:nvGrpSpPr>
+      <p:grpSpPr>
+        <a:xfrm>
+          <a:off x="0" y="0"/>
+          <a:ext cx="0" cy="0"/>
+          <a:chOff x="0" y="0"/>
+          <a:chExt cx="0" cy="0"/>
+        </a:xfrm>
+      </p:grpSpPr>
+      <p:sp>
+        <p:nvSpPr>
+          <p:cNvPr id="2" name="Título 1"/>
+          <p:cNvSpPr>
+            <a:spLocks noGrp="1"/>
+          </p:cNvSpPr>
+          <p:nvPr>
+            <p:ph type="title"/>
+          </p:nvPr>
+        </p:nvSpPr>
+        <p:spPr/>
+        <p:txBody>
+          <a:bodyPr>
+            <a:normAutofit fontScale="90000"/>
+          </a:bodyPr>
+          <a:lstStyle/>
+          <a:p>
+            <a:r>
+              <a:rPr lang="pt-BR" dirty="0"/>
+              <a:t>Desenvolvimento da Aplicação</a:t>
+            </a:r>
+            <a:br>
+              <a:rPr lang="pt-BR" dirty="0"/>
+            </a:br>
+            <a:r>
+              <a:rPr lang="pt-BR" sz="3100" dirty="0" smtClean="0"/>
+              <a:t>Gabarito FTL – Partes mais importantes</a:t>
+            </a:r>
+            <a:endParaRPr lang="pt-BR" sz="3100" dirty="0"/>
+          </a:p>
+        </p:txBody>
+      </p:sp>
+      <p:pic>
+        <p:nvPicPr>
+          <p:cNvPr id="3074" name="Picture 2"/>
+          <p:cNvPicPr>
+            <a:picLocks noChangeAspect="1" noChangeArrowheads="1"/>
+          </p:cNvPicPr>
+          <p:nvPr/>
+        </p:nvPicPr>
+        <p:blipFill>
+          <a:blip r:embed="rId2">
+            <a:extLst>
+              <a:ext uri="{28A0092B-C50C-407E-A947-70E740481C1C}">
+                <a14:useLocalDpi xmlns:a14="http://schemas.microsoft.com/office/drawing/2010/main" val="0"/>
+              </a:ext>
+            </a:extLst>
+          </a:blip>
+          <a:srcRect/>
+          <a:stretch>
+            <a:fillRect/>
+          </a:stretch>
+        </p:blipFill>
+        <p:spPr bwMode="auto">
+          <a:xfrm>
+            <a:off x="251520" y="1844824"/>
+            <a:ext cx="8615320" cy="3255044"/>
+          </a:xfrm>
+          <a:prstGeom prst="rect">
+            <a:avLst/>
+          </a:prstGeom>
+          <a:noFill/>
+          <a:ln>
+            <a:noFill/>
+          </a:ln>
+          <a:extLst>
+            <a:ext uri="{909E8E84-426E-40DD-AFC4-6F175D3DCCD1}">
+              <a14:hiddenFill xmlns:a14="http://schemas.microsoft.com/office/drawing/2010/main">
+                <a:solidFill>
+                  <a:schemeClr val="accent1"/>
+                </a:solidFill>
+              </a14:hiddenFill>
+            </a:ext>
+            <a:ext uri="{91240B29-F687-4F45-9708-019B960494DF}">
+              <a14:hiddenLine xmlns:a14="http://schemas.microsoft.com/office/drawing/2010/main" w="9525">
+                <a:solidFill>
+                  <a:schemeClr val="tx1"/>
+                </a:solidFill>
+                <a:miter lim="800000"/>
+                <a:headEnd/>
+                <a:tailEnd/>
+              </a14:hiddenLine>
+            </a:ext>
+          </a:extLst>
+        </p:spPr>
+      </p:pic>
+    </p:spTree>
+    <p:extLst>
+      <p:ext uri="{BB962C8B-B14F-4D97-AF65-F5344CB8AC3E}">
+        <p14:creationId xmlns:p14="http://schemas.microsoft.com/office/powerpoint/2010/main" val="4005482876"/>
+      </p:ext>
+    </p:extLst>
+  </p:cSld>
+  <p:clrMapOvr>
+    <a:masterClrMapping/>
+  </p:clrMapOvr>
+  <p:timing>
+    <p:tnLst>
+      <p:par>
+        <p:cTn id="1" dur="indefinite" restart="never" nodeType="tmRoot"/>
+      </p:par>
+    </p:tnLst>
+  </p:timing>
+</p:sld>
+</file>
+
+<file path=ppt/slides/slide32.xml><?xml version="1.0" encoding="utf-8"?>
+<p:sld xmlns:a="http://schemas.openxmlformats.org/drawingml/2006/main" xmlns:r="http://schemas.openxmlformats.org/officeDocument/2006/relationships" xmlns:p="http://schemas.openxmlformats.org/presentationml/2006/main">
+  <p:cSld>
+    <p:spTree>
+      <p:nvGrpSpPr>
+        <p:cNvPr id="1" name=""/>
+        <p:cNvGrpSpPr/>
+        <p:nvPr/>
+      </p:nvGrpSpPr>
+      <p:grpSpPr>
+        <a:xfrm>
+          <a:off x="0" y="0"/>
+          <a:ext cx="0" cy="0"/>
+          <a:chOff x="0" y="0"/>
+          <a:chExt cx="0" cy="0"/>
+        </a:xfrm>
+      </p:grpSpPr>
+      <p:sp>
+        <p:nvSpPr>
+          <p:cNvPr id="2" name="Título 1"/>
+          <p:cNvSpPr>
+            <a:spLocks noGrp="1"/>
+          </p:cNvSpPr>
+          <p:nvPr>
+            <p:ph type="title"/>
+          </p:nvPr>
+        </p:nvSpPr>
+        <p:spPr/>
+        <p:txBody>
+          <a:bodyPr>
+            <a:normAutofit fontScale="90000"/>
+          </a:bodyPr>
+          <a:lstStyle/>
+          <a:p>
+            <a:r>
+              <a:rPr lang="pt-BR" dirty="0"/>
+              <a:t>Desenvolvimento da Aplicação</a:t>
+            </a:r>
+            <a:br>
+              <a:rPr lang="pt-BR" dirty="0"/>
+            </a:br>
+            <a:r>
+              <a:rPr lang="pt-BR" sz="3100" dirty="0" smtClean="0"/>
+              <a:t>Gabarito FTL – Partes mais importantes</a:t>
+            </a:r>
+            <a:endParaRPr lang="pt-BR" sz="3100" dirty="0"/>
+          </a:p>
+        </p:txBody>
+      </p:sp>
+      <p:pic>
+        <p:nvPicPr>
+          <p:cNvPr id="3074" name="Picture 2"/>
+          <p:cNvPicPr>
+            <a:picLocks noChangeAspect="1" noChangeArrowheads="1"/>
+          </p:cNvPicPr>
+          <p:nvPr/>
+        </p:nvPicPr>
+        <p:blipFill>
+          <a:blip r:embed="rId2">
+            <a:extLst>
+              <a:ext uri="{28A0092B-C50C-407E-A947-70E740481C1C}">
+                <a14:useLocalDpi xmlns:a14="http://schemas.microsoft.com/office/drawing/2010/main" val="0"/>
+              </a:ext>
+            </a:extLst>
+          </a:blip>
+          <a:srcRect/>
+          <a:stretch>
+            <a:fillRect/>
+          </a:stretch>
+        </p:blipFill>
+        <p:spPr bwMode="auto">
+          <a:xfrm>
+            <a:off x="251520" y="1844824"/>
+            <a:ext cx="8615320" cy="2952328"/>
+          </a:xfrm>
+          <a:prstGeom prst="rect">
+            <a:avLst/>
+          </a:prstGeom>
+          <a:noFill/>
+          <a:ln>
+            <a:noFill/>
+          </a:ln>
+          <a:extLst>
+            <a:ext uri="{909E8E84-426E-40DD-AFC4-6F175D3DCCD1}">
+              <a14:hiddenFill xmlns:a14="http://schemas.microsoft.com/office/drawing/2010/main">
+                <a:solidFill>
+                  <a:schemeClr val="accent1"/>
+                </a:solidFill>
+              </a14:hiddenFill>
+            </a:ext>
+            <a:ext uri="{91240B29-F687-4F45-9708-019B960494DF}">
+              <a14:hiddenLine xmlns:a14="http://schemas.microsoft.com/office/drawing/2010/main" w="9525">
+                <a:solidFill>
+                  <a:schemeClr val="tx1"/>
+                </a:solidFill>
+                <a:miter lim="800000"/>
+                <a:headEnd/>
+                <a:tailEnd/>
+              </a14:hiddenLine>
+            </a:ext>
+          </a:extLst>
+        </p:spPr>
+      </p:pic>
+      <p:pic>
+        <p:nvPicPr>
+          <p:cNvPr id="4098" name="Picture 2"/>
+          <p:cNvPicPr>
+            <a:picLocks noChangeAspect="1" noChangeArrowheads="1"/>
+          </p:cNvPicPr>
+          <p:nvPr/>
+        </p:nvPicPr>
+        <p:blipFill>
+          <a:blip r:embed="rId3">
+            <a:extLst>
+              <a:ext uri="{28A0092B-C50C-407E-A947-70E740481C1C}">
+                <a14:useLocalDpi xmlns:a14="http://schemas.microsoft.com/office/drawing/2010/main" val="0"/>
+              </a:ext>
+            </a:extLst>
+          </a:blip>
+          <a:srcRect/>
+          <a:stretch>
+            <a:fillRect/>
+          </a:stretch>
+        </p:blipFill>
+        <p:spPr bwMode="auto">
+          <a:xfrm>
+            <a:off x="35496" y="5229200"/>
+            <a:ext cx="8789942" cy="991861"/>
+          </a:xfrm>
+          <a:prstGeom prst="rect">
+            <a:avLst/>
+          </a:prstGeom>
+          <a:noFill/>
+          <a:ln>
+            <a:noFill/>
+          </a:ln>
+          <a:extLst>
+            <a:ext uri="{909E8E84-426E-40DD-AFC4-6F175D3DCCD1}">
+              <a14:hiddenFill xmlns:a14="http://schemas.microsoft.com/office/drawing/2010/main">
+                <a:solidFill>
+                  <a:schemeClr val="accent1"/>
+                </a:solidFill>
+              </a14:hiddenFill>
+            </a:ext>
+            <a:ext uri="{91240B29-F687-4F45-9708-019B960494DF}">
+              <a14:hiddenLine xmlns:a14="http://schemas.microsoft.com/office/drawing/2010/main" w="9525">
+                <a:solidFill>
+                  <a:schemeClr val="tx1"/>
+                </a:solidFill>
+                <a:miter lim="800000"/>
+                <a:headEnd/>
+                <a:tailEnd/>
+              </a14:hiddenLine>
+            </a:ext>
+          </a:extLst>
+        </p:spPr>
+      </p:pic>
+    </p:spTree>
+    <p:extLst>
+      <p:ext uri="{BB962C8B-B14F-4D97-AF65-F5344CB8AC3E}">
+        <p14:creationId xmlns:p14="http://schemas.microsoft.com/office/powerpoint/2010/main" val="2703448726"/>
+      </p:ext>
+    </p:extLst>
+  </p:cSld>
+  <p:clrMapOvr>
+    <a:masterClrMapping/>
+  </p:clrMapOvr>
+  <p:timing>
+    <p:tnLst>
+      <p:par>
+        <p:cTn id="1" dur="indefinite" restart="never" nodeType="tmRoot"/>
+      </p:par>
+    </p:tnLst>
+  </p:timing>
+</p:sld>
+</file>
+
+<file path=ppt/slides/slide33.xml><?xml version="1.0" encoding="utf-8"?>
+<p:sld xmlns:a="http://schemas.openxmlformats.org/drawingml/2006/main" xmlns:r="http://schemas.openxmlformats.org/officeDocument/2006/relationships" xmlns:p="http://schemas.openxmlformats.org/presentationml/2006/main">
+  <p:cSld>
+    <p:spTree>
+      <p:nvGrpSpPr>
+        <p:cNvPr id="1" name=""/>
+        <p:cNvGrpSpPr/>
+        <p:nvPr/>
+      </p:nvGrpSpPr>
+      <p:grpSpPr>
+        <a:xfrm>
+          <a:off x="0" y="0"/>
+          <a:ext cx="0" cy="0"/>
+          <a:chOff x="0" y="0"/>
+          <a:chExt cx="0" cy="0"/>
+        </a:xfrm>
+      </p:grpSpPr>
+      <p:sp>
+        <p:nvSpPr>
+          <p:cNvPr id="2" name="Título 1"/>
+          <p:cNvSpPr>
+            <a:spLocks noGrp="1"/>
+          </p:cNvSpPr>
+          <p:nvPr>
+            <p:ph type="title"/>
+          </p:nvPr>
+        </p:nvSpPr>
+        <p:spPr/>
+        <p:txBody>
+          <a:bodyPr>
+            <a:normAutofit fontScale="90000"/>
+          </a:bodyPr>
+          <a:lstStyle/>
+          <a:p>
+            <a:r>
+              <a:rPr lang="pt-BR" dirty="0"/>
+              <a:t>Desenvolvimento da Aplicação</a:t>
+            </a:r>
+            <a:br>
+              <a:rPr lang="pt-BR" dirty="0"/>
+            </a:br>
+            <a:r>
+              <a:rPr lang="pt-BR" sz="3100" dirty="0" smtClean="0"/>
+              <a:t>Gabarito FTL – Partes mais importantes</a:t>
+            </a:r>
+            <a:endParaRPr lang="pt-BR" sz="3100" dirty="0"/>
+          </a:p>
+        </p:txBody>
+      </p:sp>
+      <p:pic>
+        <p:nvPicPr>
+          <p:cNvPr id="5122" name="Picture 2"/>
+          <p:cNvPicPr>
+            <a:picLocks noChangeAspect="1" noChangeArrowheads="1"/>
+          </p:cNvPicPr>
+          <p:nvPr/>
+        </p:nvPicPr>
+        <p:blipFill>
+          <a:blip r:embed="rId2">
+            <a:extLst>
+              <a:ext uri="{28A0092B-C50C-407E-A947-70E740481C1C}">
+                <a14:useLocalDpi xmlns:a14="http://schemas.microsoft.com/office/drawing/2010/main" val="0"/>
+              </a:ext>
+            </a:extLst>
+          </a:blip>
+          <a:srcRect/>
+          <a:stretch>
+            <a:fillRect/>
+          </a:stretch>
+        </p:blipFill>
+        <p:spPr bwMode="auto">
+          <a:xfrm>
+            <a:off x="323528" y="1772816"/>
+            <a:ext cx="8453571" cy="4248472"/>
+          </a:xfrm>
+          <a:prstGeom prst="rect">
+            <a:avLst/>
+          </a:prstGeom>
+          <a:noFill/>
+          <a:ln>
+            <a:noFill/>
+          </a:ln>
+          <a:extLst>
+            <a:ext uri="{909E8E84-426E-40DD-AFC4-6F175D3DCCD1}">
+              <a14:hiddenFill xmlns:a14="http://schemas.microsoft.com/office/drawing/2010/main">
+                <a:solidFill>
+                  <a:schemeClr val="accent1"/>
+                </a:solidFill>
+              </a14:hiddenFill>
+            </a:ext>
+            <a:ext uri="{91240B29-F687-4F45-9708-019B960494DF}">
+              <a14:hiddenLine xmlns:a14="http://schemas.microsoft.com/office/drawing/2010/main" w="9525">
+                <a:solidFill>
+                  <a:schemeClr val="tx1"/>
+                </a:solidFill>
+                <a:miter lim="800000"/>
+                <a:headEnd/>
+                <a:tailEnd/>
+              </a14:hiddenLine>
+            </a:ext>
+          </a:extLst>
+        </p:spPr>
+      </p:pic>
+    </p:spTree>
+    <p:extLst>
+      <p:ext uri="{BB962C8B-B14F-4D97-AF65-F5344CB8AC3E}">
+        <p14:creationId xmlns:p14="http://schemas.microsoft.com/office/powerpoint/2010/main" val="131747850"/>
+      </p:ext>
+    </p:extLst>
+  </p:cSld>
+  <p:clrMapOvr>
+    <a:masterClrMapping/>
+  </p:clrMapOvr>
+  <p:timing>
+    <p:tnLst>
+      <p:par>
+        <p:cTn id="1" dur="indefinite" restart="never" nodeType="tmRoot"/>
+      </p:par>
+    </p:tnLst>
+  </p:timing>
+</p:sld>
+</file>
+
+<file path=ppt/slides/slide34.xml><?xml version="1.0" encoding="utf-8"?>
+<p:sld xmlns:a="http://schemas.openxmlformats.org/drawingml/2006/main" xmlns:r="http://schemas.openxmlformats.org/officeDocument/2006/relationships" xmlns:p="http://schemas.openxmlformats.org/presentationml/2006/main">
+  <p:cSld>
+    <p:spTree>
+      <p:nvGrpSpPr>
+        <p:cNvPr id="1" name=""/>
+        <p:cNvGrpSpPr/>
+        <p:nvPr/>
+      </p:nvGrpSpPr>
+      <p:grpSpPr>
+        <a:xfrm>
+          <a:off x="0" y="0"/>
+          <a:ext cx="0" cy="0"/>
+          <a:chOff x="0" y="0"/>
+          <a:chExt cx="0" cy="0"/>
+        </a:xfrm>
+      </p:grpSpPr>
+      <p:sp>
+        <p:nvSpPr>
+          <p:cNvPr id="2" name="Título 1"/>
+          <p:cNvSpPr>
+            <a:spLocks noGrp="1"/>
+          </p:cNvSpPr>
+          <p:nvPr>
+            <p:ph type="title"/>
+          </p:nvPr>
+        </p:nvSpPr>
+        <p:spPr/>
+        <p:txBody>
+          <a:bodyPr>
+            <a:normAutofit fontScale="90000"/>
+          </a:bodyPr>
+          <a:lstStyle/>
+          <a:p>
+            <a:r>
+              <a:rPr lang="pt-BR" dirty="0"/>
+              <a:t>Desenvolvimento da Aplicação</a:t>
+            </a:r>
+            <a:br>
+              <a:rPr lang="pt-BR" dirty="0"/>
+            </a:br>
+            <a:r>
+              <a:rPr lang="pt-BR" sz="3100" dirty="0" smtClean="0"/>
+              <a:t>Gabarito FTL – Partes mais importantes</a:t>
+            </a:r>
+            <a:endParaRPr lang="pt-BR" sz="3100" dirty="0"/>
+          </a:p>
+        </p:txBody>
+      </p:sp>
+      <p:pic>
+        <p:nvPicPr>
+          <p:cNvPr id="6146" name="Picture 2"/>
+          <p:cNvPicPr>
+            <a:picLocks noChangeAspect="1" noChangeArrowheads="1"/>
+          </p:cNvPicPr>
+          <p:nvPr/>
+        </p:nvPicPr>
+        <p:blipFill>
+          <a:blip r:embed="rId2">
+            <a:extLst>
+              <a:ext uri="{28A0092B-C50C-407E-A947-70E740481C1C}">
+                <a14:useLocalDpi xmlns:a14="http://schemas.microsoft.com/office/drawing/2010/main" val="0"/>
+              </a:ext>
+            </a:extLst>
+          </a:blip>
+          <a:srcRect/>
+          <a:stretch>
+            <a:fillRect/>
+          </a:stretch>
+        </p:blipFill>
+        <p:spPr bwMode="auto">
+          <a:xfrm>
+            <a:off x="476250" y="2060848"/>
+            <a:ext cx="8191500" cy="4000500"/>
+          </a:xfrm>
+          <a:prstGeom prst="rect">
+            <a:avLst/>
+          </a:prstGeom>
+          <a:noFill/>
+          <a:ln>
+            <a:noFill/>
+          </a:ln>
+          <a:extLst>
+            <a:ext uri="{909E8E84-426E-40DD-AFC4-6F175D3DCCD1}">
+              <a14:hiddenFill xmlns:a14="http://schemas.microsoft.com/office/drawing/2010/main">
+                <a:solidFill>
+                  <a:schemeClr val="accent1"/>
+                </a:solidFill>
+              </a14:hiddenFill>
+            </a:ext>
+            <a:ext uri="{91240B29-F687-4F45-9708-019B960494DF}">
+              <a14:hiddenLine xmlns:a14="http://schemas.microsoft.com/office/drawing/2010/main" w="9525">
+                <a:solidFill>
+                  <a:schemeClr val="tx1"/>
+                </a:solidFill>
+                <a:miter lim="800000"/>
+                <a:headEnd/>
+                <a:tailEnd/>
+              </a14:hiddenLine>
+            </a:ext>
+          </a:extLst>
+        </p:spPr>
+      </p:pic>
+    </p:spTree>
+    <p:extLst>
+      <p:ext uri="{BB962C8B-B14F-4D97-AF65-F5344CB8AC3E}">
+        <p14:creationId xmlns:p14="http://schemas.microsoft.com/office/powerpoint/2010/main" val="1340158804"/>
+      </p:ext>
+    </p:extLst>
+  </p:cSld>
+  <p:clrMapOvr>
+    <a:masterClrMapping/>
+  </p:clrMapOvr>
+  <p:timing>
+    <p:tnLst>
+      <p:par>
+        <p:cTn id="1" dur="indefinite" restart="never" nodeType="tmRoot"/>
+      </p:par>
+    </p:tnLst>
+  </p:timing>
+</p:sld>
+</file>
+
+<file path=ppt/slides/slide35.xml><?xml version="1.0" encoding="utf-8"?>
+<p:sld xmlns:a="http://schemas.openxmlformats.org/drawingml/2006/main" xmlns:r="http://schemas.openxmlformats.org/officeDocument/2006/relationships" xmlns:p="http://schemas.openxmlformats.org/presentationml/2006/main">
+  <p:cSld>
+    <p:spTree>
+      <p:nvGrpSpPr>
+        <p:cNvPr id="1" name=""/>
+        <p:cNvGrpSpPr/>
+        <p:nvPr/>
+      </p:nvGrpSpPr>
+      <p:grpSpPr>
+        <a:xfrm>
+          <a:off x="0" y="0"/>
+          <a:ext cx="0" cy="0"/>
+          <a:chOff x="0" y="0"/>
+          <a:chExt cx="0" cy="0"/>
+        </a:xfrm>
+      </p:grpSpPr>
+      <p:sp>
+        <p:nvSpPr>
+          <p:cNvPr id="2" name="Título 1"/>
+          <p:cNvSpPr>
+            <a:spLocks noGrp="1"/>
+          </p:cNvSpPr>
+          <p:nvPr>
+            <p:ph type="title"/>
+          </p:nvPr>
+        </p:nvSpPr>
+        <p:spPr/>
+        <p:txBody>
+          <a:bodyPr>
+            <a:normAutofit fontScale="90000"/>
+          </a:bodyPr>
+          <a:lstStyle/>
+          <a:p>
+            <a:r>
+              <a:rPr lang="pt-BR" dirty="0"/>
+              <a:t>Desenvolvimento da Aplicação</a:t>
+            </a:r>
+            <a:br>
+              <a:rPr lang="pt-BR" dirty="0"/>
+            </a:br>
+            <a:r>
+              <a:rPr lang="pt-BR" sz="3100" dirty="0" smtClean="0"/>
+              <a:t>DashGen – Demonstração para Validação</a:t>
+            </a:r>
+            <a:endParaRPr lang="pt-BR" sz="3100" dirty="0"/>
+          </a:p>
+        </p:txBody>
+      </p:sp>
+      <p:sp>
+        <p:nvSpPr>
+          <p:cNvPr id="3" name="Retângulo 2"/>
+          <p:cNvSpPr/>
+          <p:nvPr/>
+        </p:nvSpPr>
+        <p:spPr>
+          <a:xfrm>
+            <a:off x="827584" y="1779686"/>
+            <a:ext cx="7560840" cy="3539430"/>
+          </a:xfrm>
+          <a:prstGeom prst="rect">
+            <a:avLst/>
+          </a:prstGeom>
+        </p:spPr>
+        <p:txBody>
+          <a:bodyPr wrap="square">
+            <a:spAutoFit/>
+          </a:bodyPr>
+          <a:lstStyle/>
+          <a:p>
+            <a:pPr marL="457200" lvl="0" indent="-457200">
+              <a:buFont typeface="Courier New" panose="02070309020205020404" pitchFamily="49" charset="0"/>
+              <a:buChar char="o"/>
+            </a:pPr>
+            <a:r>
+              <a:rPr lang="pt-BR" sz="2800" dirty="0"/>
+              <a:t>Arquivo CSV: “c:\</a:t>
+            </a:r>
+            <a:r>
+              <a:rPr lang="pt-BR" sz="2800" dirty="0" err="1"/>
+              <a:t>tccrepo</a:t>
+            </a:r>
+            <a:r>
+              <a:rPr lang="pt-BR" sz="2800" dirty="0"/>
+              <a:t>\</a:t>
+            </a:r>
+            <a:r>
+              <a:rPr lang="pt-BR" sz="2800" dirty="0" err="1"/>
+              <a:t>support</a:t>
+            </a:r>
+            <a:r>
+              <a:rPr lang="pt-BR" sz="2800" dirty="0"/>
+              <a:t>\teste_salario.csv”.</a:t>
+            </a:r>
+          </a:p>
+          <a:p>
+            <a:pPr marL="457200" lvl="0" indent="-457200">
+              <a:buFont typeface="Courier New" panose="02070309020205020404" pitchFamily="49" charset="0"/>
+              <a:buChar char="o"/>
+            </a:pPr>
+            <a:r>
+              <a:rPr lang="pt-BR" sz="2800" dirty="0"/>
+              <a:t>Pasta de destino: ”%USERPROFILE%\desktop\dashboard”</a:t>
+            </a:r>
+          </a:p>
+          <a:p>
+            <a:pPr marL="457200" lvl="0" indent="-457200">
+              <a:buFont typeface="Courier New" panose="02070309020205020404" pitchFamily="49" charset="0"/>
+              <a:buChar char="o"/>
+            </a:pPr>
+            <a:r>
+              <a:rPr lang="pt-BR" sz="2800" dirty="0"/>
+              <a:t>Título do dashboard: “Renda Bruta Brasil”.</a:t>
+            </a:r>
+          </a:p>
+          <a:p>
+            <a:pPr marL="457200" lvl="0" indent="-457200">
+              <a:buFont typeface="Courier New" panose="02070309020205020404" pitchFamily="49" charset="0"/>
+              <a:buChar char="o"/>
+            </a:pPr>
+            <a:r>
+              <a:rPr lang="pt-BR" sz="2800" dirty="0"/>
+              <a:t>Um gráfico tipo pizza com o atributo de dimensão SEXO - Redução por Contagem – Rótulo: “Sexo dos Entrevistados</a:t>
+            </a:r>
+            <a:r>
+              <a:rPr lang="pt-BR" sz="2800" dirty="0" smtClean="0"/>
+              <a:t>”.</a:t>
+            </a:r>
+            <a:endParaRPr lang="pt-BR" sz="2800" dirty="0"/>
+          </a:p>
+        </p:txBody>
+      </p:sp>
+    </p:spTree>
+    <p:extLst>
+      <p:ext uri="{BB962C8B-B14F-4D97-AF65-F5344CB8AC3E}">
+        <p14:creationId xmlns:p14="http://schemas.microsoft.com/office/powerpoint/2010/main" val="3319741778"/>
+      </p:ext>
+    </p:extLst>
+  </p:cSld>
+  <p:clrMapOvr>
+    <a:masterClrMapping/>
+  </p:clrMapOvr>
+  <p:timing>
+    <p:tnLst>
+      <p:par>
+        <p:cTn id="1" dur="indefinite" restart="never" nodeType="tmRoot"/>
+      </p:par>
+    </p:tnLst>
+  </p:timing>
+</p:sld>
+</file>
+
+<file path=ppt/slides/slide36.xml><?xml version="1.0" encoding="utf-8"?>
+<p:sld xmlns:a="http://schemas.openxmlformats.org/drawingml/2006/main" xmlns:r="http://schemas.openxmlformats.org/officeDocument/2006/relationships" xmlns:p="http://schemas.openxmlformats.org/presentationml/2006/main">
+  <p:cSld>
+    <p:spTree>
+      <p:nvGrpSpPr>
+        <p:cNvPr id="1" name=""/>
+        <p:cNvGrpSpPr/>
+        <p:nvPr/>
+      </p:nvGrpSpPr>
+      <p:grpSpPr>
+        <a:xfrm>
+          <a:off x="0" y="0"/>
+          <a:ext cx="0" cy="0"/>
+          <a:chOff x="0" y="0"/>
+          <a:chExt cx="0" cy="0"/>
+        </a:xfrm>
+      </p:grpSpPr>
+      <p:sp>
+        <p:nvSpPr>
+          <p:cNvPr id="2" name="Título 1"/>
+          <p:cNvSpPr>
+            <a:spLocks noGrp="1"/>
+          </p:cNvSpPr>
+          <p:nvPr>
+            <p:ph type="title"/>
+          </p:nvPr>
+        </p:nvSpPr>
+        <p:spPr/>
+        <p:txBody>
+          <a:bodyPr>
+            <a:normAutofit fontScale="90000"/>
+          </a:bodyPr>
+          <a:lstStyle/>
+          <a:p>
+            <a:r>
+              <a:rPr lang="pt-BR" dirty="0"/>
+              <a:t>Desenvolvimento da Aplicação</a:t>
+            </a:r>
+            <a:br>
+              <a:rPr lang="pt-BR" dirty="0"/>
+            </a:br>
+            <a:r>
+              <a:rPr lang="pt-BR" sz="3100" dirty="0" smtClean="0"/>
+              <a:t>DashGen – Demonstração para Validação</a:t>
+            </a:r>
+            <a:endParaRPr lang="pt-BR" sz="3100" dirty="0"/>
+          </a:p>
+        </p:txBody>
+      </p:sp>
+      <p:sp>
+        <p:nvSpPr>
+          <p:cNvPr id="3" name="Retângulo 2"/>
+          <p:cNvSpPr/>
+          <p:nvPr/>
+        </p:nvSpPr>
+        <p:spPr>
+          <a:xfrm>
+            <a:off x="827584" y="1779686"/>
+            <a:ext cx="7560840" cy="4832092"/>
+          </a:xfrm>
+          <a:prstGeom prst="rect">
+            <a:avLst/>
+          </a:prstGeom>
+        </p:spPr>
+        <p:txBody>
+          <a:bodyPr wrap="square">
+            <a:spAutoFit/>
+          </a:bodyPr>
+          <a:lstStyle/>
+          <a:p>
+            <a:pPr marL="285750" lvl="0" indent="-285750">
+              <a:buFont typeface="Arial" panose="020B0604020202020204" pitchFamily="34" charset="0"/>
+              <a:buChar char="•"/>
+            </a:pPr>
+            <a:r>
+              <a:rPr lang="pt-BR" sz="2800" dirty="0"/>
+              <a:t>Um gráfico tipo linha com o atributo de dimensão IDADE – Redução por Contagem – Rótulo: “Idade dos Entrevistados”.</a:t>
+            </a:r>
+          </a:p>
+          <a:p>
+            <a:pPr marL="285750" lvl="0" indent="-285750">
+              <a:buFont typeface="Arial" panose="020B0604020202020204" pitchFamily="34" charset="0"/>
+              <a:buChar char="•"/>
+            </a:pPr>
+            <a:r>
+              <a:rPr lang="pt-BR" sz="2800" dirty="0"/>
+              <a:t>Um gráfico tipo barras horizontais com o atributo de dimensão REGIAO – Redução por Contagem – Rótulo: “Região”.</a:t>
+            </a:r>
+          </a:p>
+          <a:p>
+            <a:pPr marL="285750" lvl="0" indent="-285750">
+              <a:buFont typeface="Arial" panose="020B0604020202020204" pitchFamily="34" charset="0"/>
+              <a:buChar char="•"/>
+            </a:pPr>
+            <a:r>
+              <a:rPr lang="pt-BR" sz="2800" dirty="0"/>
+              <a:t>Um gráfico tipo barras horizontais com o atributo de dimensão SEXO – Redução por Somatória – Atributo de medição SALARIO – Rótulo: “Renda Bruta X Sexo”.</a:t>
+            </a:r>
+          </a:p>
+          <a:p>
+            <a:pPr marL="285750" lvl="0" indent="-285750">
+              <a:buFont typeface="Arial" panose="020B0604020202020204" pitchFamily="34" charset="0"/>
+              <a:buChar char="•"/>
+            </a:pPr>
+            <a:endParaRPr lang="pt-BR" sz="2800" dirty="0"/>
+          </a:p>
+        </p:txBody>
+      </p:sp>
+    </p:spTree>
+    <p:extLst>
+      <p:ext uri="{BB962C8B-B14F-4D97-AF65-F5344CB8AC3E}">
+        <p14:creationId xmlns:p14="http://schemas.microsoft.com/office/powerpoint/2010/main" val="3141681786"/>
+      </p:ext>
+    </p:extLst>
+  </p:cSld>
+  <p:clrMapOvr>
+    <a:masterClrMapping/>
+  </p:clrMapOvr>
+  <p:timing>
+    <p:tnLst>
+      <p:par>
+        <p:cTn id="1" dur="indefinite" restart="never" nodeType="tmRoot"/>
+      </p:par>
+    </p:tnLst>
+  </p:timing>
+</p:sld>
+</file>
+
+<file path=ppt/slides/slide37.xml><?xml version="1.0" encoding="utf-8"?>
+<p:sld xmlns:a="http://schemas.openxmlformats.org/drawingml/2006/main" xmlns:r="http://schemas.openxmlformats.org/officeDocument/2006/relationships" xmlns:p="http://schemas.openxmlformats.org/presentationml/2006/main">
+  <p:cSld>
+    <p:spTree>
+      <p:nvGrpSpPr>
+        <p:cNvPr id="1" name=""/>
+        <p:cNvGrpSpPr/>
+        <p:nvPr/>
+      </p:nvGrpSpPr>
+      <p:grpSpPr>
+        <a:xfrm>
+          <a:off x="0" y="0"/>
+          <a:ext cx="0" cy="0"/>
+          <a:chOff x="0" y="0"/>
+          <a:chExt cx="0" cy="0"/>
+        </a:xfrm>
+      </p:grpSpPr>
+      <p:sp>
+        <p:nvSpPr>
+          <p:cNvPr id="2" name="Título 1"/>
+          <p:cNvSpPr>
+            <a:spLocks noGrp="1"/>
+          </p:cNvSpPr>
+          <p:nvPr>
+            <p:ph type="title"/>
+          </p:nvPr>
+        </p:nvSpPr>
+        <p:spPr/>
+        <p:txBody>
+          <a:bodyPr>
+            <a:normAutofit fontScale="90000"/>
+          </a:bodyPr>
+          <a:lstStyle/>
+          <a:p>
+            <a:r>
+              <a:rPr lang="pt-BR" dirty="0"/>
+              <a:t>Desenvolvimento da Aplicação</a:t>
+            </a:r>
+            <a:br>
+              <a:rPr lang="pt-BR" dirty="0"/>
+            </a:br>
+            <a:r>
+              <a:rPr lang="pt-BR" sz="3100" dirty="0" smtClean="0"/>
+              <a:t>DashGen – Demonstração para Validação</a:t>
+            </a:r>
+            <a:endParaRPr lang="pt-BR" sz="3100" dirty="0"/>
+          </a:p>
+        </p:txBody>
+      </p:sp>
+      <p:sp>
+        <p:nvSpPr>
+          <p:cNvPr id="3" name="Retângulo 2"/>
+          <p:cNvSpPr/>
+          <p:nvPr/>
+        </p:nvSpPr>
+        <p:spPr>
+          <a:xfrm>
+            <a:off x="827584" y="1779686"/>
+            <a:ext cx="7560840" cy="3539430"/>
+          </a:xfrm>
+          <a:prstGeom prst="rect">
+            <a:avLst/>
+          </a:prstGeom>
+        </p:spPr>
+        <p:txBody>
+          <a:bodyPr wrap="square">
+            <a:spAutoFit/>
+          </a:bodyPr>
+          <a:lstStyle/>
+          <a:p>
+            <a:pPr marL="285750" lvl="0" indent="-285750">
+              <a:buFont typeface="Arial" panose="020B0604020202020204" pitchFamily="34" charset="0"/>
+              <a:buChar char="•"/>
+            </a:pPr>
+            <a:r>
+              <a:rPr lang="pt-BR" sz="2800" dirty="0"/>
+              <a:t>Um gráfico tipo barras horizontais com o atributo de dimensão IDADE – Redução por Somatória – Atributo de medição SALARIO – Rótulo: “Renda Bruta X Idade”.</a:t>
+            </a:r>
+          </a:p>
+          <a:p>
+            <a:pPr marL="285750" lvl="0" indent="-285750">
+              <a:buFont typeface="Arial" panose="020B0604020202020204" pitchFamily="34" charset="0"/>
+              <a:buChar char="•"/>
+            </a:pPr>
+            <a:r>
+              <a:rPr lang="pt-BR" sz="2800" dirty="0"/>
+              <a:t>Um gráfico tipo barras horizontais com o atributo de dimensão REGIAO – Redução por Somatória – Atributo de medição SALARIO – Rótulo: “Renda Bruta X Região”.</a:t>
+            </a:r>
+            <a:endParaRPr lang="pt-BR" sz="2800" dirty="0"/>
+          </a:p>
+        </p:txBody>
+      </p:sp>
+    </p:spTree>
+    <p:extLst>
+      <p:ext uri="{BB962C8B-B14F-4D97-AF65-F5344CB8AC3E}">
+        <p14:creationId xmlns:p14="http://schemas.microsoft.com/office/powerpoint/2010/main" val="2852387423"/>
+      </p:ext>
+    </p:extLst>
+  </p:cSld>
+  <p:clrMapOvr>
+    <a:masterClrMapping/>
+  </p:clrMapOvr>
+  <p:timing>
+    <p:tnLst>
+      <p:par>
+        <p:cTn id="1" dur="indefinite" restart="never" nodeType="tmRoot"/>
+      </p:par>
+    </p:tnLst>
+  </p:timing>
+</p:sld>
+</file>
+
+<file path=ppt/slides/slide38.xml><?xml version="1.0" encoding="utf-8"?>
+<p:sld xmlns:a="http://schemas.openxmlformats.org/drawingml/2006/main" xmlns:r="http://schemas.openxmlformats.org/officeDocument/2006/relationships" xmlns:p="http://schemas.openxmlformats.org/presentationml/2006/main">
+  <p:cSld>
+    <p:spTree>
+      <p:nvGrpSpPr>
+        <p:cNvPr id="1" name=""/>
+        <p:cNvGrpSpPr/>
+        <p:nvPr/>
+      </p:nvGrpSpPr>
+      <p:grpSpPr>
+        <a:xfrm>
+          <a:off x="0" y="0"/>
+          <a:ext cx="0" cy="0"/>
+          <a:chOff x="0" y="0"/>
+          <a:chExt cx="0" cy="0"/>
+        </a:xfrm>
+      </p:grpSpPr>
+      <p:sp>
+        <p:nvSpPr>
+          <p:cNvPr id="2" name="Título 1"/>
+          <p:cNvSpPr>
+            <a:spLocks noGrp="1"/>
+          </p:cNvSpPr>
+          <p:nvPr>
+            <p:ph type="title"/>
+          </p:nvPr>
+        </p:nvSpPr>
+        <p:spPr/>
+        <p:txBody>
+          <a:bodyPr>
+            <a:normAutofit fontScale="90000"/>
+          </a:bodyPr>
+          <a:lstStyle/>
+          <a:p>
+            <a:r>
+              <a:rPr lang="pt-BR" dirty="0"/>
+              <a:t>Desenvolvimento da Aplicação</a:t>
+            </a:r>
+            <a:br>
+              <a:rPr lang="pt-BR" dirty="0"/>
+            </a:br>
+            <a:r>
+              <a:rPr lang="pt-BR" sz="3100" dirty="0" smtClean="0"/>
+              <a:t>DashGen – Demonstração para Validação</a:t>
+            </a:r>
+            <a:endParaRPr lang="pt-BR" sz="3100" dirty="0"/>
+          </a:p>
+        </p:txBody>
+      </p:sp>
+      <p:pic>
+        <p:nvPicPr>
+          <p:cNvPr id="4" name="Imagem 3"/>
+          <p:cNvPicPr/>
+          <p:nvPr/>
+        </p:nvPicPr>
+        <p:blipFill>
+          <a:blip r:embed="rId2"/>
+          <a:stretch>
+            <a:fillRect/>
+          </a:stretch>
+        </p:blipFill>
+        <p:spPr>
+          <a:xfrm>
+            <a:off x="1545170" y="1529292"/>
+            <a:ext cx="6124962" cy="4994548"/>
+          </a:xfrm>
+          <a:prstGeom prst="rect">
+            <a:avLst/>
+          </a:prstGeom>
+        </p:spPr>
+      </p:pic>
+    </p:spTree>
+    <p:extLst>
+      <p:ext uri="{BB962C8B-B14F-4D97-AF65-F5344CB8AC3E}">
+        <p14:creationId xmlns:p14="http://schemas.microsoft.com/office/powerpoint/2010/main" val="3251696865"/>
+      </p:ext>
+    </p:extLst>
+  </p:cSld>
+  <p:clrMapOvr>
+    <a:masterClrMapping/>
+  </p:clrMapOvr>
+  <p:timing>
+    <p:tnLst>
+      <p:par>
+        <p:cTn id="1" dur="indefinite" restart="never" nodeType="tmRoot"/>
+      </p:par>
+    </p:tnLst>
+  </p:timing>
+</p:sld>
+</file>
+
+<file path=ppt/slides/slide39.xml><?xml version="1.0" encoding="utf-8"?>
+<p:sld xmlns:a="http://schemas.openxmlformats.org/drawingml/2006/main" xmlns:r="http://schemas.openxmlformats.org/officeDocument/2006/relationships" xmlns:p="http://schemas.openxmlformats.org/presentationml/2006/main">
+  <p:cSld>
+    <p:spTree>
+      <p:nvGrpSpPr>
+        <p:cNvPr id="1" name=""/>
+        <p:cNvGrpSpPr/>
+        <p:nvPr/>
+      </p:nvGrpSpPr>
+      <p:grpSpPr>
+        <a:xfrm>
+          <a:off x="0" y="0"/>
+          <a:ext cx="0" cy="0"/>
+          <a:chOff x="0" y="0"/>
+          <a:chExt cx="0" cy="0"/>
+        </a:xfrm>
+      </p:grpSpPr>
+      <p:sp>
+        <p:nvSpPr>
+          <p:cNvPr id="2" name="Título 1"/>
+          <p:cNvSpPr>
+            <a:spLocks noGrp="1"/>
+          </p:cNvSpPr>
+          <p:nvPr>
+            <p:ph type="title"/>
+          </p:nvPr>
+        </p:nvSpPr>
+        <p:spPr/>
+        <p:txBody>
+          <a:bodyPr>
+            <a:normAutofit fontScale="90000"/>
+          </a:bodyPr>
+          <a:lstStyle/>
+          <a:p>
+            <a:r>
+              <a:rPr lang="pt-BR" dirty="0"/>
+              <a:t>Desenvolvimento da Aplicação</a:t>
+            </a:r>
+            <a:br>
+              <a:rPr lang="pt-BR" dirty="0"/>
+            </a:br>
+            <a:r>
+              <a:rPr lang="pt-BR" sz="3100" dirty="0" smtClean="0"/>
+              <a:t>DashGen – Considerações Finais</a:t>
+            </a:r>
+            <a:endParaRPr lang="pt-BR" sz="3100" dirty="0"/>
+          </a:p>
+        </p:txBody>
+      </p:sp>
+      <p:sp>
+        <p:nvSpPr>
+          <p:cNvPr id="3" name="Retângulo 2"/>
+          <p:cNvSpPr/>
+          <p:nvPr/>
+        </p:nvSpPr>
+        <p:spPr>
+          <a:xfrm>
+            <a:off x="827584" y="1779686"/>
+            <a:ext cx="7560840" cy="3970318"/>
+          </a:xfrm>
+          <a:prstGeom prst="rect">
+            <a:avLst/>
+          </a:prstGeom>
+        </p:spPr>
+        <p:txBody>
+          <a:bodyPr wrap="square">
+            <a:spAutoFit/>
+          </a:bodyPr>
+          <a:lstStyle/>
+          <a:p>
+            <a:pPr marL="285750" lvl="0" indent="-285750">
+              <a:buFont typeface="Arial" panose="020B0604020202020204" pitchFamily="34" charset="0"/>
+              <a:buChar char="•"/>
+            </a:pPr>
+            <a:r>
+              <a:rPr lang="pt-BR" sz="2800" dirty="0" smtClean="0"/>
+              <a:t>Aplicativo se provou eficaz para gerar </a:t>
+            </a:r>
+            <a:r>
+              <a:rPr lang="pt-BR" sz="2800" dirty="0" err="1" smtClean="0"/>
+              <a:t>paineis</a:t>
+            </a:r>
+            <a:r>
+              <a:rPr lang="pt-BR" sz="2800" dirty="0" smtClean="0"/>
+              <a:t> gráficos.</a:t>
+            </a:r>
+          </a:p>
+          <a:p>
+            <a:pPr marL="285750" lvl="0" indent="-285750">
+              <a:buFont typeface="Arial" panose="020B0604020202020204" pitchFamily="34" charset="0"/>
+              <a:buChar char="•"/>
+            </a:pPr>
+            <a:r>
+              <a:rPr lang="pt-BR" sz="2800" dirty="0" smtClean="0"/>
+              <a:t>Traz uma noção clara de aplicação usando motor Apache Freemarker</a:t>
+            </a:r>
+          </a:p>
+          <a:p>
+            <a:pPr marL="285750" lvl="0" indent="-285750">
+              <a:buFont typeface="Arial" panose="020B0604020202020204" pitchFamily="34" charset="0"/>
+              <a:buChar char="•"/>
+            </a:pPr>
+            <a:r>
+              <a:rPr lang="pt-BR" sz="2800" dirty="0" smtClean="0"/>
+              <a:t>Com algumas adaptações pode atender outros domínios e contextos.</a:t>
+            </a:r>
+          </a:p>
+          <a:p>
+            <a:pPr marL="285750" lvl="0" indent="-285750">
+              <a:buFont typeface="Arial" panose="020B0604020202020204" pitchFamily="34" charset="0"/>
+              <a:buChar char="•"/>
+            </a:pPr>
+            <a:r>
+              <a:rPr lang="pt-BR" sz="2800" dirty="0" smtClean="0"/>
+              <a:t>DC.js é uma ferramenta poderosa para gerar visualizações de dados.</a:t>
+            </a:r>
+          </a:p>
+          <a:p>
+            <a:pPr lvl="0"/>
+            <a:endParaRPr lang="pt-BR" sz="2800" dirty="0"/>
+          </a:p>
+        </p:txBody>
+      </p:sp>
+    </p:spTree>
+    <p:extLst>
+      <p:ext uri="{BB962C8B-B14F-4D97-AF65-F5344CB8AC3E}">
+        <p14:creationId xmlns:p14="http://schemas.microsoft.com/office/powerpoint/2010/main" val="3767888456"/>
+      </p:ext>
+    </p:extLst>
+  </p:cSld>
+  <p:clrMapOvr>
+    <a:masterClrMapping/>
+  </p:clrMapOvr>
+  <p:timing>
+    <p:tnLst>
+      <p:par>
+        <p:cTn id="1" dur="indefinite" restart="never" nodeType="tmRoot"/>
+      </p:par>
+    </p:tnLst>
+  </p:timing>
+</p:sld>
+</file>
+
 <file path=ppt/slides/slide4.xml><?xml version="1.0" encoding="utf-8"?>
 <p:sld xmlns:a="http://schemas.openxmlformats.org/drawingml/2006/main" xmlns:r="http://schemas.openxmlformats.org/officeDocument/2006/relationships" xmlns:p="http://schemas.openxmlformats.org/presentationml/2006/main">
   <p:cSld>
@@ -14243,6 +16020,2138 @@
             </p:seq>
           </p:childTnLst>
         </p:cTn>
+      </p:par>
+    </p:tnLst>
+  </p:timing>
+</p:sld>
+</file>
+
+<file path=ppt/slides/slide40.xml><?xml version="1.0" encoding="utf-8"?>
+<p:sld xmlns:a="http://schemas.openxmlformats.org/drawingml/2006/main" xmlns:r="http://schemas.openxmlformats.org/officeDocument/2006/relationships" xmlns:p="http://schemas.openxmlformats.org/presentationml/2006/main">
+  <p:cSld>
+    <p:spTree>
+      <p:nvGrpSpPr>
+        <p:cNvPr id="1" name=""/>
+        <p:cNvGrpSpPr/>
+        <p:nvPr/>
+      </p:nvGrpSpPr>
+      <p:grpSpPr>
+        <a:xfrm>
+          <a:off x="0" y="0"/>
+          <a:ext cx="0" cy="0"/>
+          <a:chOff x="0" y="0"/>
+          <a:chExt cx="0" cy="0"/>
+        </a:xfrm>
+      </p:grpSpPr>
+      <p:sp>
+        <p:nvSpPr>
+          <p:cNvPr id="2" name="Título 1"/>
+          <p:cNvSpPr>
+            <a:spLocks noGrp="1"/>
+          </p:cNvSpPr>
+          <p:nvPr>
+            <p:ph type="title"/>
+          </p:nvPr>
+        </p:nvSpPr>
+        <p:spPr/>
+        <p:txBody>
+          <a:bodyPr>
+            <a:normAutofit fontScale="90000"/>
+          </a:bodyPr>
+          <a:lstStyle/>
+          <a:p>
+            <a:r>
+              <a:rPr lang="pt-BR" dirty="0"/>
+              <a:t>Desenvolvimento da Aplicação</a:t>
+            </a:r>
+            <a:br>
+              <a:rPr lang="pt-BR" dirty="0"/>
+            </a:br>
+            <a:r>
+              <a:rPr lang="pt-BR" sz="3100" dirty="0" smtClean="0"/>
+              <a:t>DashGen – Considerações Finais</a:t>
+            </a:r>
+            <a:endParaRPr lang="pt-BR" sz="3100" dirty="0"/>
+          </a:p>
+        </p:txBody>
+      </p:sp>
+      <p:sp>
+        <p:nvSpPr>
+          <p:cNvPr id="3" name="Retângulo 2"/>
+          <p:cNvSpPr/>
+          <p:nvPr/>
+        </p:nvSpPr>
+        <p:spPr>
+          <a:xfrm>
+            <a:off x="827584" y="1779686"/>
+            <a:ext cx="7560840" cy="3970318"/>
+          </a:xfrm>
+          <a:prstGeom prst="rect">
+            <a:avLst/>
+          </a:prstGeom>
+        </p:spPr>
+        <p:txBody>
+          <a:bodyPr wrap="square">
+            <a:spAutoFit/>
+          </a:bodyPr>
+          <a:lstStyle/>
+          <a:p>
+            <a:pPr marL="285750" lvl="0" indent="-285750">
+              <a:buFont typeface="Arial" panose="020B0604020202020204" pitchFamily="34" charset="0"/>
+              <a:buChar char="•"/>
+            </a:pPr>
+            <a:r>
+              <a:rPr lang="pt-BR" sz="2800" dirty="0" smtClean="0"/>
+              <a:t>Aplicativo se provou eficaz para gerar </a:t>
+            </a:r>
+            <a:r>
+              <a:rPr lang="pt-BR" sz="2800" dirty="0" err="1" smtClean="0"/>
+              <a:t>paineis</a:t>
+            </a:r>
+            <a:r>
+              <a:rPr lang="pt-BR" sz="2800" dirty="0" smtClean="0"/>
+              <a:t> gráficos.</a:t>
+            </a:r>
+          </a:p>
+          <a:p>
+            <a:pPr marL="285750" lvl="0" indent="-285750">
+              <a:buFont typeface="Arial" panose="020B0604020202020204" pitchFamily="34" charset="0"/>
+              <a:buChar char="•"/>
+            </a:pPr>
+            <a:r>
+              <a:rPr lang="pt-BR" sz="2800" dirty="0" smtClean="0"/>
+              <a:t>Traz uma noção clara de aplicação usando motor Apache Freemarker</a:t>
+            </a:r>
+          </a:p>
+          <a:p>
+            <a:pPr marL="285750" lvl="0" indent="-285750">
+              <a:buFont typeface="Arial" panose="020B0604020202020204" pitchFamily="34" charset="0"/>
+              <a:buChar char="•"/>
+            </a:pPr>
+            <a:r>
+              <a:rPr lang="pt-BR" sz="2800" dirty="0" smtClean="0"/>
+              <a:t>Com algumas adaptações pode atender outros domínios e contextos.</a:t>
+            </a:r>
+          </a:p>
+          <a:p>
+            <a:pPr marL="285750" lvl="0" indent="-285750">
+              <a:buFont typeface="Arial" panose="020B0604020202020204" pitchFamily="34" charset="0"/>
+              <a:buChar char="•"/>
+            </a:pPr>
+            <a:r>
+              <a:rPr lang="pt-BR" sz="2800" dirty="0" smtClean="0"/>
+              <a:t>DC.js é uma ferramenta poderosa para gerar visualizações de dados.</a:t>
+            </a:r>
+          </a:p>
+          <a:p>
+            <a:pPr lvl="0"/>
+            <a:endParaRPr lang="pt-BR" sz="2800" dirty="0"/>
+          </a:p>
+        </p:txBody>
+      </p:sp>
+    </p:spTree>
+    <p:extLst>
+      <p:ext uri="{BB962C8B-B14F-4D97-AF65-F5344CB8AC3E}">
+        <p14:creationId xmlns:p14="http://schemas.microsoft.com/office/powerpoint/2010/main" val="2469554634"/>
+      </p:ext>
+    </p:extLst>
+  </p:cSld>
+  <p:clrMapOvr>
+    <a:masterClrMapping/>
+  </p:clrMapOvr>
+  <p:timing>
+    <p:tnLst>
+      <p:par>
+        <p:cTn id="1" dur="indefinite" restart="never" nodeType="tmRoot"/>
+      </p:par>
+    </p:tnLst>
+  </p:timing>
+</p:sld>
+</file>
+
+<file path=ppt/slides/slide41.xml><?xml version="1.0" encoding="utf-8"?>
+<p:sld xmlns:a="http://schemas.openxmlformats.org/drawingml/2006/main" xmlns:r="http://schemas.openxmlformats.org/officeDocument/2006/relationships" xmlns:p="http://schemas.openxmlformats.org/presentationml/2006/main">
+  <p:cSld>
+    <p:spTree>
+      <p:nvGrpSpPr>
+        <p:cNvPr id="1" name=""/>
+        <p:cNvGrpSpPr/>
+        <p:nvPr/>
+      </p:nvGrpSpPr>
+      <p:grpSpPr>
+        <a:xfrm>
+          <a:off x="0" y="0"/>
+          <a:ext cx="0" cy="0"/>
+          <a:chOff x="0" y="0"/>
+          <a:chExt cx="0" cy="0"/>
+        </a:xfrm>
+      </p:grpSpPr>
+      <p:sp>
+        <p:nvSpPr>
+          <p:cNvPr id="2" name="Título 1"/>
+          <p:cNvSpPr>
+            <a:spLocks noGrp="1"/>
+          </p:cNvSpPr>
+          <p:nvPr>
+            <p:ph type="title"/>
+          </p:nvPr>
+        </p:nvSpPr>
+        <p:spPr/>
+        <p:txBody>
+          <a:bodyPr>
+            <a:normAutofit fontScale="90000"/>
+          </a:bodyPr>
+          <a:lstStyle/>
+          <a:p>
+            <a:r>
+              <a:rPr lang="pt-BR" dirty="0"/>
+              <a:t>Desenvolvimento da Aplicação</a:t>
+            </a:r>
+            <a:br>
+              <a:rPr lang="pt-BR" dirty="0"/>
+            </a:br>
+            <a:r>
+              <a:rPr lang="pt-BR" sz="3100" dirty="0" smtClean="0"/>
+              <a:t>DashGen – Trabalhos Futuros</a:t>
+            </a:r>
+            <a:endParaRPr lang="pt-BR" sz="3100" dirty="0"/>
+          </a:p>
+        </p:txBody>
+      </p:sp>
+      <p:sp>
+        <p:nvSpPr>
+          <p:cNvPr id="3" name="Retângulo 2"/>
+          <p:cNvSpPr/>
+          <p:nvPr/>
+        </p:nvSpPr>
+        <p:spPr>
+          <a:xfrm>
+            <a:off x="827584" y="1779686"/>
+            <a:ext cx="7560840" cy="4524315"/>
+          </a:xfrm>
+          <a:prstGeom prst="rect">
+            <a:avLst/>
+          </a:prstGeom>
+        </p:spPr>
+        <p:txBody>
+          <a:bodyPr wrap="square">
+            <a:spAutoFit/>
+          </a:bodyPr>
+          <a:lstStyle/>
+          <a:p>
+            <a:pPr marL="514350" lvl="0" indent="-514350">
+              <a:buFont typeface="+mj-lt"/>
+              <a:buAutoNum type="alphaLcParenR"/>
+            </a:pPr>
+            <a:r>
+              <a:rPr lang="pt-BR" sz="2400" dirty="0"/>
+              <a:t>Refatoração do código fonte, para otimização das relações entre as classes, melhorando o desempenho da aplicação;</a:t>
+            </a:r>
+          </a:p>
+          <a:p>
+            <a:pPr marL="514350" lvl="0" indent="-514350">
+              <a:buFont typeface="+mj-lt"/>
+              <a:buAutoNum type="alphaLcParenR"/>
+            </a:pPr>
+            <a:r>
+              <a:rPr lang="pt-BR" sz="2400" dirty="0"/>
+              <a:t>Transformação do mecanismo de composição em uma biblioteca reutilizável em outros contextos além da geração de </a:t>
+            </a:r>
+            <a:r>
+              <a:rPr lang="pt-BR" sz="2400" i="1" dirty="0"/>
+              <a:t>dashboards</a:t>
+            </a:r>
+            <a:r>
+              <a:rPr lang="pt-BR" sz="2400" dirty="0"/>
+              <a:t>;</a:t>
+            </a:r>
+          </a:p>
+          <a:p>
+            <a:pPr marL="514350" lvl="0" indent="-514350">
+              <a:buFont typeface="+mj-lt"/>
+              <a:buAutoNum type="alphaLcParenR"/>
+            </a:pPr>
+            <a:r>
+              <a:rPr lang="pt-BR" sz="2400" dirty="0"/>
+              <a:t>Usando o DashGen como base, criar um artefato nos padrões do projeto Maven, a fim de disponibilizá-lo para a comunidade usuária de software livre, da mesma forma que as bibliotecas utilizadas neste projeto;</a:t>
+            </a:r>
+          </a:p>
+          <a:p>
+            <a:pPr marL="514350" lvl="0" indent="-514350">
+              <a:buFont typeface="+mj-lt"/>
+              <a:buAutoNum type="alphaLcParenR"/>
+            </a:pPr>
+            <a:endParaRPr lang="pt-BR" sz="2400" dirty="0"/>
+          </a:p>
+        </p:txBody>
+      </p:sp>
+    </p:spTree>
+    <p:extLst>
+      <p:ext uri="{BB962C8B-B14F-4D97-AF65-F5344CB8AC3E}">
+        <p14:creationId xmlns:p14="http://schemas.microsoft.com/office/powerpoint/2010/main" val="3851679903"/>
+      </p:ext>
+    </p:extLst>
+  </p:cSld>
+  <p:clrMapOvr>
+    <a:masterClrMapping/>
+  </p:clrMapOvr>
+  <p:timing>
+    <p:tnLst>
+      <p:par>
+        <p:cTn id="1" dur="indefinite" restart="never" nodeType="tmRoot"/>
+      </p:par>
+    </p:tnLst>
+  </p:timing>
+</p:sld>
+</file>
+
+<file path=ppt/slides/slide42.xml><?xml version="1.0" encoding="utf-8"?>
+<p:sld xmlns:a="http://schemas.openxmlformats.org/drawingml/2006/main" xmlns:r="http://schemas.openxmlformats.org/officeDocument/2006/relationships" xmlns:p="http://schemas.openxmlformats.org/presentationml/2006/main">
+  <p:cSld>
+    <p:spTree>
+      <p:nvGrpSpPr>
+        <p:cNvPr id="1" name=""/>
+        <p:cNvGrpSpPr/>
+        <p:nvPr/>
+      </p:nvGrpSpPr>
+      <p:grpSpPr>
+        <a:xfrm>
+          <a:off x="0" y="0"/>
+          <a:ext cx="0" cy="0"/>
+          <a:chOff x="0" y="0"/>
+          <a:chExt cx="0" cy="0"/>
+        </a:xfrm>
+      </p:grpSpPr>
+      <p:sp>
+        <p:nvSpPr>
+          <p:cNvPr id="2" name="Título 1"/>
+          <p:cNvSpPr>
+            <a:spLocks noGrp="1"/>
+          </p:cNvSpPr>
+          <p:nvPr>
+            <p:ph type="title"/>
+          </p:nvPr>
+        </p:nvSpPr>
+        <p:spPr/>
+        <p:txBody>
+          <a:bodyPr>
+            <a:normAutofit fontScale="90000"/>
+          </a:bodyPr>
+          <a:lstStyle/>
+          <a:p>
+            <a:r>
+              <a:rPr lang="pt-BR" dirty="0"/>
+              <a:t>Desenvolvimento da Aplicação</a:t>
+            </a:r>
+            <a:br>
+              <a:rPr lang="pt-BR" dirty="0"/>
+            </a:br>
+            <a:r>
+              <a:rPr lang="pt-BR" sz="3100" dirty="0" smtClean="0"/>
+              <a:t>DashGen – Trabalhos Futuros</a:t>
+            </a:r>
+            <a:endParaRPr lang="pt-BR" sz="3100" dirty="0"/>
+          </a:p>
+        </p:txBody>
+      </p:sp>
+      <p:sp>
+        <p:nvSpPr>
+          <p:cNvPr id="3" name="Retângulo 2"/>
+          <p:cNvSpPr/>
+          <p:nvPr/>
+        </p:nvSpPr>
+        <p:spPr>
+          <a:xfrm>
+            <a:off x="827584" y="1779686"/>
+            <a:ext cx="7560840" cy="4524315"/>
+          </a:xfrm>
+          <a:prstGeom prst="rect">
+            <a:avLst/>
+          </a:prstGeom>
+        </p:spPr>
+        <p:txBody>
+          <a:bodyPr wrap="square">
+            <a:spAutoFit/>
+          </a:bodyPr>
+          <a:lstStyle/>
+          <a:p>
+            <a:pPr marL="457200" lvl="0" indent="-457200">
+              <a:buFont typeface="+mj-lt"/>
+              <a:buAutoNum type="alphaLcParenR" startAt="4"/>
+            </a:pPr>
+            <a:r>
+              <a:rPr lang="pt-BR" sz="2400" dirty="0" smtClean="0"/>
+              <a:t>Aprimoramento do projeto, embarcando inteligência artificial capaz de analisar os dados constantes no arquivo CSV a fim de propor quais seriam as melhores representações gráficas para cada tipo de dado identificado;</a:t>
+            </a:r>
+          </a:p>
+          <a:p>
+            <a:pPr marL="457200" lvl="0" indent="-457200">
+              <a:buFont typeface="+mj-lt"/>
+              <a:buAutoNum type="alphaLcParenR" startAt="4"/>
+            </a:pPr>
+            <a:r>
+              <a:rPr lang="pt-BR" sz="2400" dirty="0" smtClean="0"/>
+              <a:t>Permitir maior personalização do Dashboard, como seleção de cores e modelos de tela pré-definidos;</a:t>
+            </a:r>
+          </a:p>
+          <a:p>
+            <a:pPr marL="457200" lvl="0" indent="-457200">
+              <a:buFont typeface="+mj-lt"/>
+              <a:buAutoNum type="alphaLcParenR" startAt="4"/>
+            </a:pPr>
+            <a:r>
+              <a:rPr lang="pt-BR" sz="2400" dirty="0" smtClean="0"/>
+              <a:t>Otimização da interface gráfica do usuário, trazendo maior interatividade e tornando-a mais intuitiva.</a:t>
+            </a:r>
+          </a:p>
+          <a:p>
+            <a:pPr lvl="0"/>
+            <a:endParaRPr lang="pt-BR" sz="2400" dirty="0"/>
+          </a:p>
+        </p:txBody>
+      </p:sp>
+    </p:spTree>
+    <p:extLst>
+      <p:ext uri="{BB962C8B-B14F-4D97-AF65-F5344CB8AC3E}">
+        <p14:creationId xmlns:p14="http://schemas.microsoft.com/office/powerpoint/2010/main" val="1343556591"/>
+      </p:ext>
+    </p:extLst>
+  </p:cSld>
+  <p:clrMapOvr>
+    <a:masterClrMapping/>
+  </p:clrMapOvr>
+  <p:timing>
+    <p:tnLst>
+      <p:par>
+        <p:cTn id="1" dur="indefinite" restart="never" nodeType="tmRoot"/>
+      </p:par>
+    </p:tnLst>
+  </p:timing>
+</p:sld>
+</file>
+
+<file path=ppt/slides/slide43.xml><?xml version="1.0" encoding="utf-8"?>
+<p:sld xmlns:a="http://schemas.openxmlformats.org/drawingml/2006/main" xmlns:r="http://schemas.openxmlformats.org/officeDocument/2006/relationships" xmlns:p="http://schemas.openxmlformats.org/presentationml/2006/main">
+  <p:cSld>
+    <p:spTree>
+      <p:nvGrpSpPr>
+        <p:cNvPr id="1" name=""/>
+        <p:cNvGrpSpPr/>
+        <p:nvPr/>
+      </p:nvGrpSpPr>
+      <p:grpSpPr>
+        <a:xfrm>
+          <a:off x="0" y="0"/>
+          <a:ext cx="0" cy="0"/>
+          <a:chOff x="0" y="0"/>
+          <a:chExt cx="0" cy="0"/>
+        </a:xfrm>
+      </p:grpSpPr>
+      <p:sp>
+        <p:nvSpPr>
+          <p:cNvPr id="2" name="Título 1"/>
+          <p:cNvSpPr>
+            <a:spLocks noGrp="1"/>
+          </p:cNvSpPr>
+          <p:nvPr>
+            <p:ph type="title"/>
+          </p:nvPr>
+        </p:nvSpPr>
+        <p:spPr>
+          <a:xfrm>
+            <a:off x="457200" y="332656"/>
+            <a:ext cx="8229600" cy="990600"/>
+          </a:xfrm>
+        </p:spPr>
+        <p:txBody>
+          <a:bodyPr>
+            <a:normAutofit fontScale="90000"/>
+          </a:bodyPr>
+          <a:lstStyle/>
+          <a:p>
+            <a:r>
+              <a:rPr lang="pt-BR" dirty="0"/>
+              <a:t>Desenvolvimento da Aplicação</a:t>
+            </a:r>
+            <a:br>
+              <a:rPr lang="pt-BR" dirty="0"/>
+            </a:br>
+            <a:r>
+              <a:rPr lang="pt-BR" sz="3100" dirty="0" smtClean="0"/>
+              <a:t>Referencias</a:t>
+            </a:r>
+            <a:endParaRPr lang="pt-BR" sz="3100" dirty="0"/>
+          </a:p>
+        </p:txBody>
+      </p:sp>
+      <p:sp>
+        <p:nvSpPr>
+          <p:cNvPr id="3" name="Retângulo 2"/>
+          <p:cNvSpPr/>
+          <p:nvPr/>
+        </p:nvSpPr>
+        <p:spPr>
+          <a:xfrm>
+            <a:off x="827584" y="1412776"/>
+            <a:ext cx="7560840" cy="5432256"/>
+          </a:xfrm>
+          <a:prstGeom prst="rect">
+            <a:avLst/>
+          </a:prstGeom>
+        </p:spPr>
+        <p:txBody>
+          <a:bodyPr wrap="square">
+            <a:spAutoFit/>
+          </a:bodyPr>
+          <a:lstStyle/>
+          <a:p>
+            <a:r>
+              <a:rPr lang="pt-BR" sz="1600" dirty="0"/>
+              <a:t>ACADEMIAIN. </a:t>
+            </a:r>
+            <a:r>
+              <a:rPr lang="pt-BR" sz="1600" b="1" dirty="0"/>
+              <a:t>QLIK SENSE: O QUE É, COMO FUNCIONA E QUAIS AS VANTAGENS?</a:t>
+            </a:r>
+            <a:r>
+              <a:rPr lang="pt-BR" sz="1600" dirty="0"/>
+              <a:t> Disponível em: &lt;https://blog.academiain1.com.br/qlik-sense-o-que-e-como-funciona-e-quais-as-vantagens/&gt;. Acesso em: 10 jan. 2020. </a:t>
+            </a:r>
+            <a:endParaRPr lang="pt-BR" sz="1600" dirty="0" smtClean="0"/>
+          </a:p>
+          <a:p>
+            <a:endParaRPr lang="pt-BR" sz="1600" dirty="0"/>
+          </a:p>
+          <a:p>
+            <a:r>
+              <a:rPr lang="pt-BR" sz="1600" dirty="0"/>
+              <a:t>APACHE.ORG. </a:t>
+            </a:r>
+            <a:r>
+              <a:rPr lang="pt-BR" sz="1600" b="1" dirty="0"/>
+              <a:t>The Apache Velocity Project</a:t>
+            </a:r>
+            <a:r>
+              <a:rPr lang="pt-BR" sz="1600" dirty="0"/>
+              <a:t>. Disponível em: &lt;https://velocity.apache.org/&gt;. Acesso em: 7 jan. 2019a. </a:t>
+            </a:r>
+            <a:endParaRPr lang="pt-BR" sz="1600" dirty="0" smtClean="0"/>
+          </a:p>
+          <a:p>
+            <a:endParaRPr lang="pt-BR" sz="1600" dirty="0"/>
+          </a:p>
+          <a:p>
+            <a:r>
+              <a:rPr lang="pt-BR" sz="1600" dirty="0"/>
+              <a:t>APACHE.ORG. </a:t>
+            </a:r>
+            <a:r>
+              <a:rPr lang="pt-BR" sz="1600" b="1" dirty="0" err="1"/>
+              <a:t>Changes</a:t>
+            </a:r>
+            <a:r>
+              <a:rPr lang="pt-BR" sz="1600" b="1" dirty="0"/>
+              <a:t> </a:t>
+            </a:r>
+            <a:r>
+              <a:rPr lang="pt-BR" sz="1600" b="1" dirty="0" err="1"/>
+              <a:t>Report</a:t>
+            </a:r>
+            <a:r>
+              <a:rPr lang="pt-BR" sz="1600" b="1" dirty="0"/>
+              <a:t> - Apache Velocity</a:t>
+            </a:r>
+            <a:r>
+              <a:rPr lang="pt-BR" sz="1600" dirty="0"/>
+              <a:t>. Disponível em: &lt;https://velocity.apache.org/engine/devel/changes.html&gt;. Acesso em: 22 ago. 2019b. </a:t>
+            </a:r>
+            <a:endParaRPr lang="pt-BR" sz="1600" dirty="0" smtClean="0"/>
+          </a:p>
+          <a:p>
+            <a:endParaRPr lang="pt-BR" sz="1600" dirty="0"/>
+          </a:p>
+          <a:p>
+            <a:r>
+              <a:rPr lang="pt-BR" sz="1600" dirty="0"/>
+              <a:t>APACHE.ORG. </a:t>
+            </a:r>
+            <a:r>
+              <a:rPr lang="pt-BR" sz="1600" b="1" dirty="0" err="1"/>
+              <a:t>Version</a:t>
+            </a:r>
+            <a:r>
+              <a:rPr lang="pt-BR" sz="1600" b="1" dirty="0"/>
+              <a:t> </a:t>
+            </a:r>
+            <a:r>
+              <a:rPr lang="pt-BR" sz="1600" b="1" dirty="0" err="1"/>
+              <a:t>History</a:t>
+            </a:r>
+            <a:r>
+              <a:rPr lang="pt-BR" sz="1600" b="1" dirty="0"/>
+              <a:t> - Apache Freemarker</a:t>
+            </a:r>
+            <a:r>
+              <a:rPr lang="pt-BR" sz="1600" dirty="0"/>
+              <a:t>. Disponível em: &lt;https://freemarker.apache.org/docs/app_versions.html&gt;. Acesso em: 25 ago. 2019c. </a:t>
+            </a:r>
+            <a:endParaRPr lang="pt-BR" sz="1600" dirty="0" smtClean="0"/>
+          </a:p>
+          <a:p>
+            <a:endParaRPr lang="pt-BR" sz="1600" dirty="0"/>
+          </a:p>
+          <a:p>
+            <a:r>
+              <a:rPr lang="pt-BR" sz="1600" dirty="0"/>
+              <a:t>APACHE.ORG. </a:t>
+            </a:r>
+            <a:r>
+              <a:rPr lang="pt-BR" sz="1600" b="1" dirty="0" err="1"/>
+              <a:t>What</a:t>
+            </a:r>
+            <a:r>
+              <a:rPr lang="pt-BR" sz="1600" b="1" dirty="0"/>
+              <a:t> </a:t>
+            </a:r>
+            <a:r>
+              <a:rPr lang="pt-BR" sz="1600" b="1" dirty="0" err="1"/>
+              <a:t>is</a:t>
+            </a:r>
+            <a:r>
+              <a:rPr lang="pt-BR" sz="1600" b="1" dirty="0"/>
+              <a:t> Maven</a:t>
+            </a:r>
+            <a:r>
+              <a:rPr lang="pt-BR" sz="1600" dirty="0"/>
+              <a:t>. Disponível em: &lt;https://maven.apache.org/what-is-maven.html&gt;. Acesso em: 1 ago. 2019d. </a:t>
+            </a:r>
+            <a:endParaRPr lang="pt-BR" sz="1600" dirty="0" smtClean="0"/>
+          </a:p>
+          <a:p>
+            <a:endParaRPr lang="pt-BR" sz="1600" dirty="0"/>
+          </a:p>
+          <a:p>
+            <a:r>
+              <a:rPr lang="pt-BR" sz="1600" dirty="0"/>
+              <a:t>APACHE.ORG. </a:t>
+            </a:r>
+            <a:r>
+              <a:rPr lang="pt-BR" sz="1600" b="1" dirty="0"/>
+              <a:t>Apache Commons CSV</a:t>
+            </a:r>
+            <a:r>
+              <a:rPr lang="pt-BR" sz="1600" dirty="0"/>
+              <a:t>. Disponível em: &lt;https://commons.apache.org/proper/commons-csv/index.html&gt;. Acesso em: 2 nov. 2019e. </a:t>
+            </a:r>
+          </a:p>
+          <a:p>
+            <a:pPr lvl="0"/>
+            <a:endParaRPr lang="pt-BR" sz="1100" dirty="0"/>
+          </a:p>
+        </p:txBody>
+      </p:sp>
+    </p:spTree>
+    <p:extLst>
+      <p:ext uri="{BB962C8B-B14F-4D97-AF65-F5344CB8AC3E}">
+        <p14:creationId xmlns:p14="http://schemas.microsoft.com/office/powerpoint/2010/main" val="2518243544"/>
+      </p:ext>
+    </p:extLst>
+  </p:cSld>
+  <p:clrMapOvr>
+    <a:masterClrMapping/>
+  </p:clrMapOvr>
+  <p:timing>
+    <p:tnLst>
+      <p:par>
+        <p:cTn id="1" dur="indefinite" restart="never" nodeType="tmRoot"/>
+      </p:par>
+    </p:tnLst>
+  </p:timing>
+</p:sld>
+</file>
+
+<file path=ppt/slides/slide44.xml><?xml version="1.0" encoding="utf-8"?>
+<p:sld xmlns:a="http://schemas.openxmlformats.org/drawingml/2006/main" xmlns:r="http://schemas.openxmlformats.org/officeDocument/2006/relationships" xmlns:p="http://schemas.openxmlformats.org/presentationml/2006/main">
+  <p:cSld>
+    <p:spTree>
+      <p:nvGrpSpPr>
+        <p:cNvPr id="1" name=""/>
+        <p:cNvGrpSpPr/>
+        <p:nvPr/>
+      </p:nvGrpSpPr>
+      <p:grpSpPr>
+        <a:xfrm>
+          <a:off x="0" y="0"/>
+          <a:ext cx="0" cy="0"/>
+          <a:chOff x="0" y="0"/>
+          <a:chExt cx="0" cy="0"/>
+        </a:xfrm>
+      </p:grpSpPr>
+      <p:sp>
+        <p:nvSpPr>
+          <p:cNvPr id="2" name="Título 1"/>
+          <p:cNvSpPr>
+            <a:spLocks noGrp="1"/>
+          </p:cNvSpPr>
+          <p:nvPr>
+            <p:ph type="title"/>
+          </p:nvPr>
+        </p:nvSpPr>
+        <p:spPr>
+          <a:xfrm>
+            <a:off x="457200" y="260648"/>
+            <a:ext cx="8229600" cy="990600"/>
+          </a:xfrm>
+        </p:spPr>
+        <p:txBody>
+          <a:bodyPr>
+            <a:normAutofit fontScale="90000"/>
+          </a:bodyPr>
+          <a:lstStyle/>
+          <a:p>
+            <a:r>
+              <a:rPr lang="pt-BR" dirty="0"/>
+              <a:t>Desenvolvimento da Aplicação</a:t>
+            </a:r>
+            <a:br>
+              <a:rPr lang="pt-BR" dirty="0"/>
+            </a:br>
+            <a:r>
+              <a:rPr lang="pt-BR" sz="3100" dirty="0" smtClean="0"/>
+              <a:t>Referencias</a:t>
+            </a:r>
+            <a:endParaRPr lang="pt-BR" sz="3100" dirty="0"/>
+          </a:p>
+        </p:txBody>
+      </p:sp>
+      <p:sp>
+        <p:nvSpPr>
+          <p:cNvPr id="3" name="Retângulo 2"/>
+          <p:cNvSpPr/>
+          <p:nvPr/>
+        </p:nvSpPr>
+        <p:spPr>
+          <a:xfrm>
+            <a:off x="821757" y="1278914"/>
+            <a:ext cx="7560840" cy="5678478"/>
+          </a:xfrm>
+          <a:prstGeom prst="rect">
+            <a:avLst/>
+          </a:prstGeom>
+        </p:spPr>
+        <p:txBody>
+          <a:bodyPr wrap="square">
+            <a:spAutoFit/>
+          </a:bodyPr>
+          <a:lstStyle/>
+          <a:p>
+            <a:r>
+              <a:rPr lang="pt-BR" sz="1600" dirty="0"/>
+              <a:t>APACHE.ORG. </a:t>
+            </a:r>
+            <a:r>
+              <a:rPr lang="pt-BR" sz="1600" b="1" dirty="0"/>
+              <a:t>Apache Commons IO</a:t>
+            </a:r>
+            <a:r>
+              <a:rPr lang="pt-BR" sz="1600" dirty="0"/>
+              <a:t>. Disponível em: &lt;https://commons.apache.org/proper/commons-io/&gt;. Acesso em: 10 nov. 2019f</a:t>
+            </a:r>
+            <a:r>
+              <a:rPr lang="pt-BR" sz="1600" dirty="0" smtClean="0"/>
+              <a:t>.</a:t>
+            </a:r>
+          </a:p>
+          <a:p>
+            <a:r>
+              <a:rPr lang="pt-BR" sz="1600" dirty="0" smtClean="0"/>
+              <a:t> </a:t>
+            </a:r>
+            <a:endParaRPr lang="pt-BR" sz="1600" dirty="0"/>
+          </a:p>
+          <a:p>
+            <a:r>
+              <a:rPr lang="pt-BR" sz="1600" dirty="0"/>
+              <a:t>APACHE.ORG. </a:t>
+            </a:r>
+            <a:r>
+              <a:rPr lang="pt-BR" sz="1600" b="1" dirty="0"/>
+              <a:t>Apache </a:t>
+            </a:r>
+            <a:r>
+              <a:rPr lang="pt-BR" sz="1600" b="1" dirty="0" err="1"/>
+              <a:t>Netbeans</a:t>
+            </a:r>
+            <a:r>
+              <a:rPr lang="pt-BR" sz="1600" dirty="0"/>
+              <a:t>. Disponível em: &lt;https://netbeans.org/&gt;. Acesso em: 12 jan. 2019g. </a:t>
+            </a:r>
+            <a:endParaRPr lang="pt-BR" sz="1600" dirty="0" smtClean="0"/>
+          </a:p>
+          <a:p>
+            <a:endParaRPr lang="pt-BR" sz="1600" dirty="0"/>
+          </a:p>
+          <a:p>
+            <a:r>
+              <a:rPr lang="pt-BR" sz="1600" dirty="0"/>
+              <a:t>APACHE.ORG. </a:t>
+            </a:r>
+            <a:r>
+              <a:rPr lang="pt-BR" sz="1600" b="1" dirty="0"/>
+              <a:t>FreeMarker Java Template </a:t>
+            </a:r>
+            <a:r>
+              <a:rPr lang="pt-BR" sz="1600" b="1" dirty="0" err="1"/>
+              <a:t>Engine</a:t>
+            </a:r>
+            <a:r>
+              <a:rPr lang="pt-BR" sz="1600" dirty="0"/>
+              <a:t>. Disponível em: &lt;https://freemarker.apache.org/index.html&gt;. Acesso em: 1 jun. 2019. </a:t>
+            </a:r>
+            <a:endParaRPr lang="pt-BR" sz="1600" dirty="0" smtClean="0"/>
+          </a:p>
+          <a:p>
+            <a:endParaRPr lang="pt-BR" sz="1600" dirty="0"/>
+          </a:p>
+          <a:p>
+            <a:r>
+              <a:rPr lang="pt-BR" sz="1600" dirty="0"/>
+              <a:t>ASTAH. </a:t>
+            </a:r>
+            <a:r>
+              <a:rPr lang="pt-BR" sz="1600" b="1" dirty="0"/>
+              <a:t>Astah UML</a:t>
+            </a:r>
+            <a:r>
+              <a:rPr lang="pt-BR" sz="1600" dirty="0"/>
+              <a:t>. Disponível em: &lt;http://astah.net/editions/uml-new&gt;. Acesso em: 10 jan. 2020. </a:t>
+            </a:r>
+            <a:endParaRPr lang="pt-BR" sz="1600" dirty="0" smtClean="0"/>
+          </a:p>
+          <a:p>
+            <a:endParaRPr lang="pt-BR" sz="1600" dirty="0"/>
+          </a:p>
+          <a:p>
+            <a:r>
+              <a:rPr lang="pt-BR" sz="1600" dirty="0"/>
+              <a:t>BAELDUNG.COM. </a:t>
+            </a:r>
+            <a:r>
+              <a:rPr lang="pt-BR" sz="1600" b="1" dirty="0" err="1"/>
+              <a:t>Introduction</a:t>
+            </a:r>
+            <a:r>
+              <a:rPr lang="pt-BR" sz="1600" b="1" dirty="0"/>
+              <a:t> </a:t>
+            </a:r>
+            <a:r>
+              <a:rPr lang="pt-BR" sz="1600" b="1" dirty="0" err="1"/>
+              <a:t>to</a:t>
+            </a:r>
+            <a:r>
+              <a:rPr lang="pt-BR" sz="1600" b="1" dirty="0"/>
+              <a:t> Apache Velocity</a:t>
+            </a:r>
+            <a:r>
+              <a:rPr lang="pt-BR" sz="1600" dirty="0"/>
+              <a:t>. Disponível em: &lt;https://www.baeldung.com/apache-velocity&gt;. Acesso em: 7 jan. 2019. </a:t>
+            </a:r>
+            <a:endParaRPr lang="pt-BR" sz="1600" dirty="0" smtClean="0"/>
+          </a:p>
+          <a:p>
+            <a:endParaRPr lang="pt-BR" sz="1600" dirty="0"/>
+          </a:p>
+          <a:p>
+            <a:r>
+              <a:rPr lang="pt-BR" sz="1600" dirty="0"/>
+              <a:t>BERGEN, J. VAN. </a:t>
+            </a:r>
+            <a:r>
+              <a:rPr lang="pt-BR" sz="1600" b="1" dirty="0"/>
+              <a:t>Velocity </a:t>
+            </a:r>
+            <a:r>
+              <a:rPr lang="pt-BR" sz="1600" b="1" dirty="0" err="1"/>
+              <a:t>or</a:t>
+            </a:r>
+            <a:r>
+              <a:rPr lang="pt-BR" sz="1600" b="1" dirty="0"/>
+              <a:t> FreeMarker? </a:t>
+            </a:r>
+            <a:r>
+              <a:rPr lang="pt-BR" sz="1600" b="1" dirty="0" err="1"/>
+              <a:t>Two</a:t>
+            </a:r>
+            <a:r>
+              <a:rPr lang="pt-BR" sz="1600" b="1" dirty="0"/>
+              <a:t> open </a:t>
+            </a:r>
+            <a:r>
+              <a:rPr lang="pt-BR" sz="1600" b="1" dirty="0" err="1"/>
+              <a:t>source</a:t>
+            </a:r>
+            <a:r>
+              <a:rPr lang="pt-BR" sz="1600" b="1" dirty="0"/>
+              <a:t> Java-</a:t>
+            </a:r>
+            <a:r>
+              <a:rPr lang="pt-BR" sz="1600" b="1" dirty="0" err="1"/>
+              <a:t>based</a:t>
+            </a:r>
+            <a:r>
+              <a:rPr lang="pt-BR" sz="1600" b="1" dirty="0"/>
+              <a:t> </a:t>
+            </a:r>
+            <a:r>
+              <a:rPr lang="pt-BR" sz="1600" b="1" dirty="0" err="1"/>
+              <a:t>template</a:t>
+            </a:r>
+            <a:r>
+              <a:rPr lang="pt-BR" sz="1600" b="1" dirty="0"/>
+              <a:t> </a:t>
+            </a:r>
+            <a:r>
+              <a:rPr lang="pt-BR" sz="1600" b="1" dirty="0" err="1"/>
+              <a:t>engines</a:t>
+            </a:r>
+            <a:r>
+              <a:rPr lang="pt-BR" sz="1600" b="1" dirty="0"/>
+              <a:t> </a:t>
+            </a:r>
+            <a:r>
+              <a:rPr lang="pt-BR" sz="1600" b="1" dirty="0" err="1"/>
+              <a:t>compared</a:t>
+            </a:r>
+            <a:r>
+              <a:rPr lang="pt-BR" sz="1600" dirty="0"/>
+              <a:t>. Disponível em: &lt;https://www.javaworld.com/article/2077797/open-source-tools/velocity-or-freemarker.html&gt;. Acesso em: 29 ago. 2018. </a:t>
+            </a:r>
+            <a:endParaRPr lang="pt-BR" sz="1600" dirty="0" smtClean="0"/>
+          </a:p>
+          <a:p>
+            <a:endParaRPr lang="pt-BR" sz="1600" dirty="0"/>
+          </a:p>
+          <a:p>
+            <a:r>
+              <a:rPr lang="pt-BR" sz="1600" dirty="0"/>
+              <a:t>BEZERRA, E. </a:t>
+            </a:r>
+            <a:r>
+              <a:rPr lang="pt-BR" sz="1600" b="1" dirty="0"/>
+              <a:t>Princípios de Análise e Projeto de Sistemas com UML</a:t>
+            </a:r>
+            <a:r>
+              <a:rPr lang="pt-BR" sz="1600" dirty="0"/>
+              <a:t>. 3. ed. Rio de Janeiro: </a:t>
+            </a:r>
+            <a:r>
+              <a:rPr lang="pt-BR" sz="1600" dirty="0" err="1"/>
+              <a:t>Elsevier</a:t>
+            </a:r>
+            <a:r>
+              <a:rPr lang="pt-BR" sz="1600" dirty="0"/>
+              <a:t>, 2015. </a:t>
+            </a:r>
+          </a:p>
+          <a:p>
+            <a:pPr lvl="0"/>
+            <a:endParaRPr lang="pt-BR" sz="1100" dirty="0"/>
+          </a:p>
+        </p:txBody>
+      </p:sp>
+    </p:spTree>
+    <p:extLst>
+      <p:ext uri="{BB962C8B-B14F-4D97-AF65-F5344CB8AC3E}">
+        <p14:creationId xmlns:p14="http://schemas.microsoft.com/office/powerpoint/2010/main" val="448647290"/>
+      </p:ext>
+    </p:extLst>
+  </p:cSld>
+  <p:clrMapOvr>
+    <a:masterClrMapping/>
+  </p:clrMapOvr>
+  <p:timing>
+    <p:tnLst>
+      <p:par>
+        <p:cTn id="1" dur="indefinite" restart="never" nodeType="tmRoot"/>
+      </p:par>
+    </p:tnLst>
+  </p:timing>
+</p:sld>
+</file>
+
+<file path=ppt/slides/slide45.xml><?xml version="1.0" encoding="utf-8"?>
+<p:sld xmlns:a="http://schemas.openxmlformats.org/drawingml/2006/main" xmlns:r="http://schemas.openxmlformats.org/officeDocument/2006/relationships" xmlns:p="http://schemas.openxmlformats.org/presentationml/2006/main">
+  <p:cSld>
+    <p:spTree>
+      <p:nvGrpSpPr>
+        <p:cNvPr id="1" name=""/>
+        <p:cNvGrpSpPr/>
+        <p:nvPr/>
+      </p:nvGrpSpPr>
+      <p:grpSpPr>
+        <a:xfrm>
+          <a:off x="0" y="0"/>
+          <a:ext cx="0" cy="0"/>
+          <a:chOff x="0" y="0"/>
+          <a:chExt cx="0" cy="0"/>
+        </a:xfrm>
+      </p:grpSpPr>
+      <p:sp>
+        <p:nvSpPr>
+          <p:cNvPr id="2" name="Título 1"/>
+          <p:cNvSpPr>
+            <a:spLocks noGrp="1"/>
+          </p:cNvSpPr>
+          <p:nvPr>
+            <p:ph type="title"/>
+          </p:nvPr>
+        </p:nvSpPr>
+        <p:spPr/>
+        <p:txBody>
+          <a:bodyPr>
+            <a:normAutofit fontScale="90000"/>
+          </a:bodyPr>
+          <a:lstStyle/>
+          <a:p>
+            <a:r>
+              <a:rPr lang="pt-BR" dirty="0"/>
+              <a:t>Desenvolvimento da Aplicação</a:t>
+            </a:r>
+            <a:br>
+              <a:rPr lang="pt-BR" dirty="0"/>
+            </a:br>
+            <a:r>
+              <a:rPr lang="pt-BR" sz="3100" dirty="0" smtClean="0"/>
+              <a:t>Referencias</a:t>
+            </a:r>
+            <a:endParaRPr lang="pt-BR" sz="3100" dirty="0"/>
+          </a:p>
+        </p:txBody>
+      </p:sp>
+      <p:sp>
+        <p:nvSpPr>
+          <p:cNvPr id="3" name="Retângulo 2"/>
+          <p:cNvSpPr/>
+          <p:nvPr/>
+        </p:nvSpPr>
+        <p:spPr>
+          <a:xfrm>
+            <a:off x="826871" y="1556792"/>
+            <a:ext cx="7560840" cy="5016758"/>
+          </a:xfrm>
+          <a:prstGeom prst="rect">
+            <a:avLst/>
+          </a:prstGeom>
+        </p:spPr>
+        <p:txBody>
+          <a:bodyPr wrap="square">
+            <a:spAutoFit/>
+          </a:bodyPr>
+          <a:lstStyle/>
+          <a:p>
+            <a:r>
+              <a:rPr lang="pt-BR" sz="1600" dirty="0"/>
+              <a:t>BOSTOCK, M. et al. </a:t>
+            </a:r>
+            <a:r>
+              <a:rPr lang="pt-BR" sz="1600" b="1" dirty="0"/>
+              <a:t>D3.js - Data </a:t>
+            </a:r>
+            <a:r>
+              <a:rPr lang="pt-BR" sz="1600" b="1" dirty="0" err="1"/>
+              <a:t>Driven</a:t>
+            </a:r>
+            <a:r>
+              <a:rPr lang="pt-BR" sz="1600" b="1" dirty="0"/>
+              <a:t> </a:t>
+            </a:r>
+            <a:r>
+              <a:rPr lang="pt-BR" sz="1600" b="1" dirty="0" err="1"/>
+              <a:t>Documents</a:t>
+            </a:r>
+            <a:r>
+              <a:rPr lang="pt-BR" sz="1600" dirty="0"/>
+              <a:t>. Disponível em: &lt;https://d3js.org/&gt;. Acesso em: 10 nov. 2018</a:t>
+            </a:r>
+            <a:r>
+              <a:rPr lang="pt-BR" sz="1600" dirty="0" smtClean="0"/>
+              <a:t>.</a:t>
+            </a:r>
+          </a:p>
+          <a:p>
+            <a:r>
+              <a:rPr lang="pt-BR" sz="1600" dirty="0" smtClean="0"/>
+              <a:t> </a:t>
+            </a:r>
+            <a:endParaRPr lang="pt-BR" sz="1600" dirty="0"/>
+          </a:p>
+          <a:p>
+            <a:r>
+              <a:rPr lang="pt-BR" sz="1600" dirty="0"/>
+              <a:t>COSTA, H. M. K. et al. Grandes Massas de Dados na Nuvem: Desafios e </a:t>
+            </a:r>
+            <a:r>
+              <a:rPr lang="pt-BR" sz="1600" dirty="0" err="1"/>
+              <a:t>Tecnicas</a:t>
+            </a:r>
+            <a:r>
+              <a:rPr lang="pt-BR" sz="1600" dirty="0"/>
+              <a:t> para Inovação. </a:t>
+            </a:r>
+            <a:r>
+              <a:rPr lang="pt-BR" sz="1600" b="1" dirty="0" err="1"/>
+              <a:t>Sbrc</a:t>
+            </a:r>
+            <a:r>
+              <a:rPr lang="pt-BR" sz="1600" b="1" dirty="0"/>
+              <a:t> 2012</a:t>
+            </a:r>
+            <a:r>
+              <a:rPr lang="pt-BR" sz="1600" dirty="0"/>
+              <a:t>, n. Ouro Preto, MG, Brasil, 2012. </a:t>
+            </a:r>
+            <a:endParaRPr lang="pt-BR" sz="1600" dirty="0" smtClean="0"/>
+          </a:p>
+          <a:p>
+            <a:endParaRPr lang="pt-BR" sz="1600" dirty="0"/>
+          </a:p>
+          <a:p>
+            <a:r>
+              <a:rPr lang="pt-BR" sz="1600" dirty="0"/>
+              <a:t>CROSSFILTER ORGANIZATION. </a:t>
+            </a:r>
+            <a:r>
+              <a:rPr lang="pt-BR" sz="1600" b="1" dirty="0" err="1"/>
+              <a:t>Crossfilter</a:t>
+            </a:r>
+            <a:r>
+              <a:rPr lang="pt-BR" sz="1600" b="1" dirty="0"/>
+              <a:t> js </a:t>
+            </a:r>
+            <a:r>
+              <a:rPr lang="pt-BR" sz="1600" b="1" dirty="0" err="1"/>
+              <a:t>library</a:t>
+            </a:r>
+            <a:r>
+              <a:rPr lang="pt-BR" sz="1600" dirty="0"/>
+              <a:t>. Disponível em: &lt;https://github.com/crossfilter/crossfilter&gt;. Acesso em: 2 nov. 2019. </a:t>
+            </a:r>
+            <a:endParaRPr lang="pt-BR" sz="1600" dirty="0" smtClean="0"/>
+          </a:p>
+          <a:p>
+            <a:endParaRPr lang="pt-BR" sz="1600" dirty="0"/>
+          </a:p>
+          <a:p>
+            <a:r>
+              <a:rPr lang="pt-BR" sz="1600" dirty="0"/>
+              <a:t>CRUZ, S. A. B.; MOURA, M. F. </a:t>
+            </a:r>
+            <a:r>
+              <a:rPr lang="pt-BR" sz="1600" b="1" dirty="0"/>
+              <a:t>Formatação de Dados Usando a Ferramenta </a:t>
+            </a:r>
+            <a:r>
+              <a:rPr lang="pt-BR" sz="1600" b="1" dirty="0" err="1"/>
+              <a:t>Velocity</a:t>
+            </a:r>
+            <a:r>
+              <a:rPr lang="pt-BR" sz="1600" dirty="0" err="1"/>
+              <a:t>Campinas</a:t>
+            </a:r>
+            <a:r>
+              <a:rPr lang="pt-BR" sz="1600" dirty="0"/>
+              <a:t>, 2002. </a:t>
+            </a:r>
+            <a:endParaRPr lang="pt-BR" sz="1600" dirty="0" smtClean="0"/>
+          </a:p>
+          <a:p>
+            <a:endParaRPr lang="pt-BR" sz="1600" dirty="0"/>
+          </a:p>
+          <a:p>
+            <a:r>
+              <a:rPr lang="pt-BR" sz="1600" dirty="0"/>
+              <a:t>JETBRAINS. </a:t>
+            </a:r>
+            <a:r>
+              <a:rPr lang="pt-BR" sz="1600" b="1" dirty="0"/>
+              <a:t>IntelliJ IDEA</a:t>
+            </a:r>
+            <a:r>
+              <a:rPr lang="pt-BR" sz="1600" dirty="0"/>
+              <a:t>. Disponível em: &lt;https://www.jetbrains.com/idea/&gt;. Acesso em: 12 jan. 2020. </a:t>
+            </a:r>
+            <a:endParaRPr lang="pt-BR" sz="1600" dirty="0" smtClean="0"/>
+          </a:p>
+          <a:p>
+            <a:endParaRPr lang="pt-BR" sz="1600" dirty="0"/>
+          </a:p>
+          <a:p>
+            <a:r>
+              <a:rPr lang="pt-BR" sz="1600" dirty="0"/>
+              <a:t>KRUEGER, C. W. Software reuse. </a:t>
+            </a:r>
+            <a:r>
+              <a:rPr lang="pt-BR" sz="1600" b="1" dirty="0"/>
+              <a:t>ACM </a:t>
+            </a:r>
+            <a:r>
+              <a:rPr lang="pt-BR" sz="1600" b="1" dirty="0" err="1"/>
+              <a:t>Computing</a:t>
+            </a:r>
+            <a:r>
+              <a:rPr lang="pt-BR" sz="1600" b="1" dirty="0"/>
+              <a:t> </a:t>
+            </a:r>
+            <a:r>
+              <a:rPr lang="pt-BR" sz="1600" b="1" dirty="0" err="1"/>
+              <a:t>Surveys</a:t>
+            </a:r>
+            <a:r>
+              <a:rPr lang="pt-BR" sz="1600" dirty="0"/>
+              <a:t>, v. 24, n. 2, p. 131–183, 1992. </a:t>
+            </a:r>
+            <a:endParaRPr lang="pt-BR" sz="1600" dirty="0" smtClean="0"/>
+          </a:p>
+          <a:p>
+            <a:endParaRPr lang="pt-BR" sz="1600" dirty="0"/>
+          </a:p>
+          <a:p>
+            <a:r>
+              <a:rPr lang="pt-BR" sz="1600" dirty="0"/>
+              <a:t>LUCRÉDIO, D. Uma Abordagem Orientada a Modelos para Reutilização de Software. p. 277, 2009.</a:t>
+            </a:r>
+            <a:endParaRPr lang="pt-BR" sz="1100" dirty="0"/>
+          </a:p>
+        </p:txBody>
+      </p:sp>
+    </p:spTree>
+    <p:extLst>
+      <p:ext uri="{BB962C8B-B14F-4D97-AF65-F5344CB8AC3E}">
+        <p14:creationId xmlns:p14="http://schemas.microsoft.com/office/powerpoint/2010/main" val="3448715097"/>
+      </p:ext>
+    </p:extLst>
+  </p:cSld>
+  <p:clrMapOvr>
+    <a:masterClrMapping/>
+  </p:clrMapOvr>
+  <p:timing>
+    <p:tnLst>
+      <p:par>
+        <p:cTn id="1" dur="indefinite" restart="never" nodeType="tmRoot"/>
+      </p:par>
+    </p:tnLst>
+  </p:timing>
+</p:sld>
+</file>
+
+<file path=ppt/slides/slide46.xml><?xml version="1.0" encoding="utf-8"?>
+<p:sld xmlns:a="http://schemas.openxmlformats.org/drawingml/2006/main" xmlns:r="http://schemas.openxmlformats.org/officeDocument/2006/relationships" xmlns:p="http://schemas.openxmlformats.org/presentationml/2006/main">
+  <p:cSld>
+    <p:spTree>
+      <p:nvGrpSpPr>
+        <p:cNvPr id="1" name=""/>
+        <p:cNvGrpSpPr/>
+        <p:nvPr/>
+      </p:nvGrpSpPr>
+      <p:grpSpPr>
+        <a:xfrm>
+          <a:off x="0" y="0"/>
+          <a:ext cx="0" cy="0"/>
+          <a:chOff x="0" y="0"/>
+          <a:chExt cx="0" cy="0"/>
+        </a:xfrm>
+      </p:grpSpPr>
+      <p:sp>
+        <p:nvSpPr>
+          <p:cNvPr id="2" name="Título 1"/>
+          <p:cNvSpPr>
+            <a:spLocks noGrp="1"/>
+          </p:cNvSpPr>
+          <p:nvPr>
+            <p:ph type="title"/>
+          </p:nvPr>
+        </p:nvSpPr>
+        <p:spPr/>
+        <p:txBody>
+          <a:bodyPr>
+            <a:normAutofit fontScale="90000"/>
+          </a:bodyPr>
+          <a:lstStyle/>
+          <a:p>
+            <a:r>
+              <a:rPr lang="pt-BR" dirty="0"/>
+              <a:t>Desenvolvimento da Aplicação</a:t>
+            </a:r>
+            <a:br>
+              <a:rPr lang="pt-BR" dirty="0"/>
+            </a:br>
+            <a:r>
+              <a:rPr lang="pt-BR" sz="3100" dirty="0" smtClean="0"/>
+              <a:t>Referencias</a:t>
+            </a:r>
+            <a:endParaRPr lang="pt-BR" sz="3100" dirty="0"/>
+          </a:p>
+        </p:txBody>
+      </p:sp>
+      <p:sp>
+        <p:nvSpPr>
+          <p:cNvPr id="3" name="Retângulo 2"/>
+          <p:cNvSpPr/>
+          <p:nvPr/>
+        </p:nvSpPr>
+        <p:spPr>
+          <a:xfrm>
+            <a:off x="827584" y="1556792"/>
+            <a:ext cx="7560840" cy="4832092"/>
+          </a:xfrm>
+          <a:prstGeom prst="rect">
+            <a:avLst/>
+          </a:prstGeom>
+        </p:spPr>
+        <p:txBody>
+          <a:bodyPr wrap="square">
+            <a:spAutoFit/>
+          </a:bodyPr>
+          <a:lstStyle/>
+          <a:p>
+            <a:r>
+              <a:rPr lang="pt-BR" sz="1400" dirty="0"/>
+              <a:t>LUIZ, A. </a:t>
+            </a:r>
+            <a:r>
+              <a:rPr lang="pt-BR" sz="1400" b="1" dirty="0"/>
+              <a:t>Visualização dos dados estatísticos da UERJ : proposta de dashboards baseados no trabalho de Jacques </a:t>
+            </a:r>
+            <a:r>
+              <a:rPr lang="pt-BR" sz="1400" b="1" dirty="0" err="1"/>
+              <a:t>Bertin</a:t>
+            </a:r>
+            <a:r>
+              <a:rPr lang="pt-BR" sz="1400" dirty="0"/>
+              <a:t>. [</a:t>
+            </a:r>
+            <a:r>
+              <a:rPr lang="pt-BR" sz="1400" dirty="0" err="1"/>
+              <a:t>s.l</a:t>
+            </a:r>
+            <a:r>
+              <a:rPr lang="pt-BR" sz="1400" dirty="0"/>
+              <a:t>.] UERJ, 2013</a:t>
+            </a:r>
+            <a:r>
+              <a:rPr lang="pt-BR" sz="1400" dirty="0" smtClean="0"/>
+              <a:t>.</a:t>
+            </a:r>
+          </a:p>
+          <a:p>
+            <a:endParaRPr lang="pt-BR" sz="1400" dirty="0"/>
+          </a:p>
+          <a:p>
+            <a:r>
+              <a:rPr lang="pt-BR" sz="1400" dirty="0"/>
+              <a:t>MAVENREPOSITORY. </a:t>
+            </a:r>
+            <a:r>
+              <a:rPr lang="pt-BR" sz="1400" b="1" dirty="0" err="1"/>
+              <a:t>Mavenrepository</a:t>
+            </a:r>
+            <a:r>
+              <a:rPr lang="pt-BR" sz="1400" b="1" dirty="0"/>
+              <a:t> Apache Velocity</a:t>
+            </a:r>
+            <a:r>
+              <a:rPr lang="pt-BR" sz="1400" dirty="0"/>
+              <a:t>. Disponível em: &lt;https://mvnrepository.com/artifact/org.apache.velocity/velocity&gt;. Acesso em: 10 fev. 2019a. </a:t>
+            </a:r>
+            <a:endParaRPr lang="pt-BR" sz="1400" dirty="0" smtClean="0"/>
+          </a:p>
+          <a:p>
+            <a:endParaRPr lang="pt-BR" sz="1400" dirty="0"/>
+          </a:p>
+          <a:p>
+            <a:r>
+              <a:rPr lang="pt-BR" sz="1400" dirty="0"/>
+              <a:t>MAVENREPOSITORY. </a:t>
+            </a:r>
+            <a:r>
+              <a:rPr lang="pt-BR" sz="1400" b="1" dirty="0" err="1"/>
+              <a:t>Mavenrepository</a:t>
+            </a:r>
+            <a:r>
+              <a:rPr lang="pt-BR" sz="1400" b="1" dirty="0"/>
+              <a:t> Apache Freemarker</a:t>
+            </a:r>
+            <a:r>
+              <a:rPr lang="pt-BR" sz="1400" dirty="0"/>
+              <a:t>. Disponível em: &lt;https://mvnrepository.com/artifact/org.freemarker/freemarker&gt;. Acesso em: 10 jan. 2019b</a:t>
+            </a:r>
+            <a:r>
+              <a:rPr lang="pt-BR" sz="1400" dirty="0" smtClean="0"/>
+              <a:t>.</a:t>
+            </a:r>
+          </a:p>
+          <a:p>
+            <a:r>
+              <a:rPr lang="pt-BR" sz="1400" dirty="0" smtClean="0"/>
+              <a:t> </a:t>
+            </a:r>
+            <a:endParaRPr lang="pt-BR" sz="1400" dirty="0"/>
+          </a:p>
+          <a:p>
+            <a:r>
+              <a:rPr lang="pt-BR" sz="1400" dirty="0"/>
+              <a:t>MICROSOFT. </a:t>
+            </a:r>
+            <a:r>
+              <a:rPr lang="pt-BR" sz="1400" b="1" dirty="0"/>
+              <a:t>O que é o </a:t>
+            </a:r>
+            <a:r>
+              <a:rPr lang="pt-BR" sz="1400" b="1" dirty="0" err="1"/>
+              <a:t>PowerBI</a:t>
+            </a:r>
+            <a:r>
+              <a:rPr lang="pt-BR" sz="1400" b="1" dirty="0"/>
+              <a:t> desktop</a:t>
+            </a:r>
+            <a:r>
+              <a:rPr lang="pt-BR" sz="1400" dirty="0"/>
+              <a:t>. Disponível em: &lt;https://docs.microsoft.com/pt-br/power-bi/desktop-what-is-desktop&gt;. Acesso em: 12 out. 2019. </a:t>
+            </a:r>
+            <a:endParaRPr lang="pt-BR" sz="1400" dirty="0" smtClean="0"/>
+          </a:p>
+          <a:p>
+            <a:endParaRPr lang="pt-BR" sz="1400" dirty="0"/>
+          </a:p>
+          <a:p>
+            <a:r>
+              <a:rPr lang="pt-BR" sz="1400" dirty="0"/>
+              <a:t>MOURA, M. F. et al. </a:t>
+            </a:r>
+            <a:r>
+              <a:rPr lang="pt-BR" sz="1400" b="1" dirty="0"/>
+              <a:t>Comunicado Técnico Uma Análise Comparativa das Soluções Tecnológicas Utilizadas nas Apresentações de Dados da Agência de Informação Embrapa</a:t>
+            </a:r>
+            <a:r>
+              <a:rPr lang="pt-BR" sz="1400" dirty="0"/>
+              <a:t>. [</a:t>
+            </a:r>
+            <a:r>
+              <a:rPr lang="pt-BR" sz="1400" dirty="0" err="1"/>
+              <a:t>s.l</a:t>
+            </a:r>
+            <a:r>
+              <a:rPr lang="pt-BR" sz="1400" dirty="0"/>
+              <a:t>.] Embrapa, 2004</a:t>
+            </a:r>
+            <a:r>
+              <a:rPr lang="pt-BR" sz="1400" dirty="0" smtClean="0"/>
+              <a:t>.</a:t>
+            </a:r>
+          </a:p>
+          <a:p>
+            <a:endParaRPr lang="pt-BR" sz="1400" dirty="0"/>
+          </a:p>
+          <a:p>
+            <a:r>
+              <a:rPr lang="pt-BR" sz="1400" dirty="0"/>
+              <a:t>ORACLE. </a:t>
+            </a:r>
+            <a:r>
+              <a:rPr lang="pt-BR" sz="1400" b="1" dirty="0"/>
+              <a:t>Oracle - JavaFX Overview(Release 8)</a:t>
+            </a:r>
+            <a:r>
+              <a:rPr lang="pt-BR" sz="1400" dirty="0"/>
+              <a:t>. Disponível em: &lt;https://docs.oracle.com/javase/8/javafx/get-started-tutorial/jfx-overview.htm&gt;. Acesso em: 2 dez. 2019. </a:t>
+            </a:r>
+            <a:endParaRPr lang="pt-BR" sz="1400" dirty="0" smtClean="0"/>
+          </a:p>
+          <a:p>
+            <a:endParaRPr lang="pt-BR" sz="1400" dirty="0"/>
+          </a:p>
+          <a:p>
+            <a:r>
+              <a:rPr lang="pt-BR" sz="1400" dirty="0"/>
+              <a:t>POTENCIER, F. </a:t>
+            </a:r>
+            <a:r>
+              <a:rPr lang="pt-BR" sz="1400" b="1" dirty="0"/>
+              <a:t>The </a:t>
+            </a:r>
+            <a:r>
+              <a:rPr lang="pt-BR" sz="1400" b="1" dirty="0" err="1"/>
+              <a:t>flexible</a:t>
+            </a:r>
+            <a:r>
+              <a:rPr lang="pt-BR" sz="1400" b="1" dirty="0"/>
+              <a:t>, </a:t>
+            </a:r>
+            <a:r>
+              <a:rPr lang="pt-BR" sz="1400" b="1" dirty="0" err="1"/>
+              <a:t>fast</a:t>
+            </a:r>
+            <a:r>
+              <a:rPr lang="pt-BR" sz="1400" b="1" dirty="0"/>
+              <a:t>, </a:t>
+            </a:r>
+            <a:r>
+              <a:rPr lang="pt-BR" sz="1400" b="1" dirty="0" err="1"/>
+              <a:t>and</a:t>
+            </a:r>
+            <a:r>
+              <a:rPr lang="pt-BR" sz="1400" b="1" dirty="0"/>
+              <a:t> </a:t>
+            </a:r>
+            <a:r>
+              <a:rPr lang="pt-BR" sz="1400" b="1" dirty="0" err="1"/>
+              <a:t>secure</a:t>
+            </a:r>
+            <a:r>
+              <a:rPr lang="pt-BR" sz="1400" b="1" dirty="0"/>
+              <a:t> </a:t>
+            </a:r>
+            <a:r>
+              <a:rPr lang="pt-BR" sz="1400" b="1" dirty="0" err="1"/>
+              <a:t>template</a:t>
+            </a:r>
+            <a:r>
+              <a:rPr lang="pt-BR" sz="1400" b="1" dirty="0"/>
+              <a:t> </a:t>
+            </a:r>
+            <a:r>
+              <a:rPr lang="pt-BR" sz="1400" b="1" dirty="0" err="1"/>
+              <a:t>engine</a:t>
+            </a:r>
+            <a:r>
+              <a:rPr lang="pt-BR" sz="1400" b="1" dirty="0"/>
+              <a:t> for PHP</a:t>
+            </a:r>
+            <a:r>
+              <a:rPr lang="pt-BR" sz="1400" dirty="0"/>
+              <a:t>. Disponível em: &lt;https://twig.symfony.com/&gt;. Acesso em: 10 jan. 2020. </a:t>
+            </a:r>
+          </a:p>
+        </p:txBody>
+      </p:sp>
+    </p:spTree>
+    <p:extLst>
+      <p:ext uri="{BB962C8B-B14F-4D97-AF65-F5344CB8AC3E}">
+        <p14:creationId xmlns:p14="http://schemas.microsoft.com/office/powerpoint/2010/main" val="4279112136"/>
+      </p:ext>
+    </p:extLst>
+  </p:cSld>
+  <p:clrMapOvr>
+    <a:masterClrMapping/>
+  </p:clrMapOvr>
+  <p:timing>
+    <p:tnLst>
+      <p:par>
+        <p:cTn id="1" dur="indefinite" restart="never" nodeType="tmRoot"/>
+      </p:par>
+    </p:tnLst>
+  </p:timing>
+</p:sld>
+</file>
+
+<file path=ppt/slides/slide47.xml><?xml version="1.0" encoding="utf-8"?>
+<p:sld xmlns:a="http://schemas.openxmlformats.org/drawingml/2006/main" xmlns:r="http://schemas.openxmlformats.org/officeDocument/2006/relationships" xmlns:p="http://schemas.openxmlformats.org/presentationml/2006/main">
+  <p:cSld>
+    <p:spTree>
+      <p:nvGrpSpPr>
+        <p:cNvPr id="1" name=""/>
+        <p:cNvGrpSpPr/>
+        <p:nvPr/>
+      </p:nvGrpSpPr>
+      <p:grpSpPr>
+        <a:xfrm>
+          <a:off x="0" y="0"/>
+          <a:ext cx="0" cy="0"/>
+          <a:chOff x="0" y="0"/>
+          <a:chExt cx="0" cy="0"/>
+        </a:xfrm>
+      </p:grpSpPr>
+      <p:sp>
+        <p:nvSpPr>
+          <p:cNvPr id="2" name="Título 1"/>
+          <p:cNvSpPr>
+            <a:spLocks noGrp="1"/>
+          </p:cNvSpPr>
+          <p:nvPr>
+            <p:ph type="title"/>
+          </p:nvPr>
+        </p:nvSpPr>
+        <p:spPr/>
+        <p:txBody>
+          <a:bodyPr>
+            <a:normAutofit fontScale="90000"/>
+          </a:bodyPr>
+          <a:lstStyle/>
+          <a:p>
+            <a:r>
+              <a:rPr lang="pt-BR" dirty="0"/>
+              <a:t>Desenvolvimento da Aplicação</a:t>
+            </a:r>
+            <a:br>
+              <a:rPr lang="pt-BR" dirty="0"/>
+            </a:br>
+            <a:r>
+              <a:rPr lang="pt-BR" sz="3100" dirty="0" smtClean="0"/>
+              <a:t>Referencias</a:t>
+            </a:r>
+            <a:endParaRPr lang="pt-BR" sz="3100" dirty="0"/>
+          </a:p>
+        </p:txBody>
+      </p:sp>
+      <p:sp>
+        <p:nvSpPr>
+          <p:cNvPr id="3" name="Retângulo 2"/>
+          <p:cNvSpPr/>
+          <p:nvPr/>
+        </p:nvSpPr>
+        <p:spPr>
+          <a:xfrm>
+            <a:off x="827584" y="1556792"/>
+            <a:ext cx="7560840" cy="4832092"/>
+          </a:xfrm>
+          <a:prstGeom prst="rect">
+            <a:avLst/>
+          </a:prstGeom>
+        </p:spPr>
+        <p:txBody>
+          <a:bodyPr wrap="square">
+            <a:spAutoFit/>
+          </a:bodyPr>
+          <a:lstStyle/>
+          <a:p>
+            <a:r>
+              <a:rPr lang="pt-BR" sz="1400" dirty="0"/>
+              <a:t>QLIK. </a:t>
+            </a:r>
+            <a:r>
+              <a:rPr lang="pt-BR" sz="1400" b="1" dirty="0"/>
+              <a:t>Qlik Sense - Plataforma de análise de dados</a:t>
+            </a:r>
+            <a:r>
+              <a:rPr lang="pt-BR" sz="1400" dirty="0"/>
+              <a:t>. Disponível em: &lt;https://www.qlik.com/pt-br/products/qlik-sense&gt;. Acesso em: 10 jan. 2020. </a:t>
+            </a:r>
+            <a:endParaRPr lang="pt-BR" sz="1400" dirty="0" smtClean="0"/>
+          </a:p>
+          <a:p>
+            <a:endParaRPr lang="pt-BR" sz="1400" dirty="0"/>
+          </a:p>
+          <a:p>
+            <a:r>
+              <a:rPr lang="pt-BR" sz="1400" dirty="0"/>
+              <a:t>RAUDJÄRV, R. </a:t>
+            </a:r>
+            <a:r>
+              <a:rPr lang="pt-BR" sz="1400" b="1" dirty="0"/>
+              <a:t>ZT-ZIP</a:t>
+            </a:r>
+            <a:r>
+              <a:rPr lang="pt-BR" sz="1400" dirty="0"/>
+              <a:t>. Disponível em: &lt;https://github.com/zeroturnaround/zt-zip&gt;. Acesso em: 10 nov. 2019. </a:t>
+            </a:r>
+            <a:endParaRPr lang="pt-BR" sz="1400" dirty="0" smtClean="0"/>
+          </a:p>
+          <a:p>
+            <a:endParaRPr lang="pt-BR" sz="1400" dirty="0"/>
+          </a:p>
+          <a:p>
+            <a:r>
+              <a:rPr lang="pt-BR" sz="1400" dirty="0"/>
+              <a:t>SHIMABUKURO JUNIOR, E. K. Um Gerador de aplicações configurável. 2006. </a:t>
+            </a:r>
+          </a:p>
+          <a:p>
+            <a:r>
+              <a:rPr lang="pt-BR" sz="1400" dirty="0"/>
+              <a:t>SOMATIVA. </a:t>
+            </a:r>
+            <a:r>
+              <a:rPr lang="pt-BR" sz="1400" b="1" dirty="0"/>
+              <a:t>Tableau Desktop</a:t>
+            </a:r>
+            <a:r>
+              <a:rPr lang="pt-BR" sz="1400" dirty="0"/>
+              <a:t>. Disponível em: &lt;http://www.somativa.com.br/tableau-desktop&gt;. Acesso em: 12 out. 2019. </a:t>
+            </a:r>
+            <a:endParaRPr lang="pt-BR" sz="1400" dirty="0" smtClean="0"/>
+          </a:p>
+          <a:p>
+            <a:endParaRPr lang="pt-BR" sz="1400" dirty="0"/>
+          </a:p>
+          <a:p>
+            <a:r>
+              <a:rPr lang="pt-BR" sz="1400" dirty="0"/>
+              <a:t>SOMMERVILLE, I. </a:t>
+            </a:r>
+            <a:r>
+              <a:rPr lang="pt-BR" sz="1400" b="1" dirty="0"/>
+              <a:t>Engenharia de Software</a:t>
+            </a:r>
+            <a:r>
+              <a:rPr lang="pt-BR" sz="1400" dirty="0"/>
+              <a:t>. 3. ed. </a:t>
+            </a:r>
+            <a:r>
+              <a:rPr lang="pt-BR" sz="1400" dirty="0" err="1"/>
+              <a:t>Sao</a:t>
+            </a:r>
+            <a:r>
+              <a:rPr lang="pt-BR" sz="1400" dirty="0"/>
+              <a:t> Paulo: Pearson, 2013. </a:t>
+            </a:r>
+            <a:endParaRPr lang="pt-BR" sz="1400" dirty="0" smtClean="0"/>
+          </a:p>
+          <a:p>
+            <a:endParaRPr lang="pt-BR" sz="1400" dirty="0"/>
+          </a:p>
+          <a:p>
+            <a:r>
+              <a:rPr lang="pt-BR" sz="1400" dirty="0"/>
+              <a:t>SYRIANI, E.; LUHUNU, L.; SAHRAOUI, H. </a:t>
+            </a:r>
+            <a:r>
+              <a:rPr lang="pt-BR" sz="1400" dirty="0" err="1"/>
+              <a:t>Systematic</a:t>
+            </a:r>
+            <a:r>
+              <a:rPr lang="pt-BR" sz="1400" dirty="0"/>
+              <a:t> </a:t>
+            </a:r>
+            <a:r>
+              <a:rPr lang="pt-BR" sz="1400" dirty="0" err="1"/>
+              <a:t>mapping</a:t>
+            </a:r>
+            <a:r>
+              <a:rPr lang="pt-BR" sz="1400" dirty="0"/>
+              <a:t> </a:t>
+            </a:r>
+            <a:r>
+              <a:rPr lang="pt-BR" sz="1400" dirty="0" err="1"/>
+              <a:t>study</a:t>
+            </a:r>
+            <a:r>
+              <a:rPr lang="pt-BR" sz="1400" dirty="0"/>
+              <a:t> </a:t>
+            </a:r>
+            <a:r>
+              <a:rPr lang="pt-BR" sz="1400" dirty="0" err="1"/>
+              <a:t>of</a:t>
+            </a:r>
+            <a:r>
+              <a:rPr lang="pt-BR" sz="1400" dirty="0"/>
+              <a:t> </a:t>
+            </a:r>
+            <a:r>
+              <a:rPr lang="pt-BR" sz="1400" dirty="0" err="1"/>
+              <a:t>template-based</a:t>
+            </a:r>
+            <a:r>
+              <a:rPr lang="pt-BR" sz="1400" dirty="0"/>
+              <a:t> </a:t>
+            </a:r>
+            <a:r>
+              <a:rPr lang="pt-BR" sz="1400" dirty="0" err="1"/>
+              <a:t>code</a:t>
+            </a:r>
+            <a:r>
+              <a:rPr lang="pt-BR" sz="1400" dirty="0"/>
+              <a:t> </a:t>
+            </a:r>
+            <a:r>
+              <a:rPr lang="pt-BR" sz="1400" dirty="0" err="1"/>
+              <a:t>generation</a:t>
+            </a:r>
+            <a:r>
+              <a:rPr lang="pt-BR" sz="1400" dirty="0"/>
+              <a:t>. </a:t>
+            </a:r>
+            <a:r>
+              <a:rPr lang="pt-BR" sz="1400" b="1" dirty="0"/>
+              <a:t>Computer </a:t>
+            </a:r>
+            <a:r>
+              <a:rPr lang="pt-BR" sz="1400" b="1" dirty="0" err="1"/>
+              <a:t>Languages</a:t>
+            </a:r>
+            <a:r>
+              <a:rPr lang="pt-BR" sz="1400" b="1" dirty="0"/>
+              <a:t>, Systems </a:t>
+            </a:r>
+            <a:r>
+              <a:rPr lang="pt-BR" sz="1400" b="1" dirty="0" err="1"/>
+              <a:t>and</a:t>
+            </a:r>
+            <a:r>
+              <a:rPr lang="pt-BR" sz="1400" b="1" dirty="0"/>
+              <a:t> </a:t>
+            </a:r>
+            <a:r>
+              <a:rPr lang="pt-BR" sz="1400" b="1" dirty="0" err="1"/>
+              <a:t>Structures</a:t>
+            </a:r>
+            <a:r>
+              <a:rPr lang="pt-BR" sz="1400" dirty="0"/>
+              <a:t>, v. 52, p. 43–62, 2018. </a:t>
+            </a:r>
+          </a:p>
+          <a:p>
+            <a:r>
+              <a:rPr lang="pt-BR" sz="1400" dirty="0"/>
+              <a:t>TABLEAU. </a:t>
+            </a:r>
+            <a:r>
+              <a:rPr lang="pt-BR" sz="1400" b="1" dirty="0"/>
+              <a:t>Tableau Desktop</a:t>
+            </a:r>
+            <a:r>
+              <a:rPr lang="pt-BR" sz="1400" dirty="0"/>
+              <a:t>. Disponível em: &lt;https://www.tableau.com/pt-br/products/desktop&gt;. Acesso em: 12 dez. 2019. </a:t>
+            </a:r>
+            <a:endParaRPr lang="pt-BR" sz="1400" dirty="0" smtClean="0"/>
+          </a:p>
+          <a:p>
+            <a:endParaRPr lang="pt-BR" sz="1400" dirty="0"/>
+          </a:p>
+          <a:p>
+            <a:r>
+              <a:rPr lang="pt-BR" sz="1400" dirty="0"/>
+              <a:t>TEAM DC.JS. </a:t>
+            </a:r>
+            <a:r>
+              <a:rPr lang="pt-BR" sz="1400" b="1" dirty="0"/>
+              <a:t>dc.js - Dimensional </a:t>
+            </a:r>
+            <a:r>
+              <a:rPr lang="pt-BR" sz="1400" b="1" dirty="0" err="1"/>
+              <a:t>Charting</a:t>
+            </a:r>
+            <a:r>
+              <a:rPr lang="pt-BR" sz="1400" b="1" dirty="0"/>
+              <a:t> Javascript Library</a:t>
+            </a:r>
+            <a:r>
+              <a:rPr lang="pt-BR" sz="1400" dirty="0"/>
+              <a:t>. Disponível em: &lt;https://dc-js.github.io/dc.js/&gt;. Acesso em: 10 nov. 2019. </a:t>
+            </a:r>
+            <a:endParaRPr lang="pt-BR" sz="1400" dirty="0" smtClean="0"/>
+          </a:p>
+          <a:p>
+            <a:endParaRPr lang="pt-BR" sz="1400" dirty="0"/>
+          </a:p>
+          <a:p>
+            <a:r>
+              <a:rPr lang="pt-BR" sz="1400" dirty="0"/>
+              <a:t>TUTORIALSPOINT. </a:t>
+            </a:r>
+            <a:r>
+              <a:rPr lang="pt-BR" sz="1400" b="1" dirty="0" err="1"/>
+              <a:t>Tutorialspoint</a:t>
+            </a:r>
+            <a:r>
+              <a:rPr lang="pt-BR" sz="1400" b="1" dirty="0"/>
+              <a:t> - DC.js </a:t>
+            </a:r>
+            <a:r>
+              <a:rPr lang="pt-BR" sz="1400" b="1" dirty="0" err="1"/>
+              <a:t>tutorials</a:t>
+            </a:r>
+            <a:r>
+              <a:rPr lang="pt-BR" sz="1400" dirty="0"/>
+              <a:t>. Disponível em: &lt;https://www.tutorialspoint.com/dcjs/&gt;. Acesso em: 11 nov. 2018. </a:t>
+            </a:r>
+          </a:p>
+        </p:txBody>
+      </p:sp>
+    </p:spTree>
+    <p:extLst>
+      <p:ext uri="{BB962C8B-B14F-4D97-AF65-F5344CB8AC3E}">
+        <p14:creationId xmlns:p14="http://schemas.microsoft.com/office/powerpoint/2010/main" val="1863120352"/>
+      </p:ext>
+    </p:extLst>
+  </p:cSld>
+  <p:clrMapOvr>
+    <a:masterClrMapping/>
+  </p:clrMapOvr>
+  <p:timing>
+    <p:tnLst>
+      <p:par>
+        <p:cTn id="1" dur="indefinite" restart="never" nodeType="tmRoot"/>
+      </p:par>
+    </p:tnLst>
+  </p:timing>
+</p:sld>
+</file>
+
+<file path=ppt/slides/slide48.xml><?xml version="1.0" encoding="utf-8"?>
+<p:sld xmlns:a="http://schemas.openxmlformats.org/drawingml/2006/main" xmlns:r="http://schemas.openxmlformats.org/officeDocument/2006/relationships" xmlns:p="http://schemas.openxmlformats.org/presentationml/2006/main">
+  <p:cSld>
+    <p:spTree>
+      <p:nvGrpSpPr>
+        <p:cNvPr id="1" name=""/>
+        <p:cNvGrpSpPr/>
+        <p:nvPr/>
+      </p:nvGrpSpPr>
+      <p:grpSpPr>
+        <a:xfrm>
+          <a:off x="0" y="0"/>
+          <a:ext cx="0" cy="0"/>
+          <a:chOff x="0" y="0"/>
+          <a:chExt cx="0" cy="0"/>
+        </a:xfrm>
+      </p:grpSpPr>
+      <p:sp>
+        <p:nvSpPr>
+          <p:cNvPr id="2" name="Título 1"/>
+          <p:cNvSpPr>
+            <a:spLocks noGrp="1"/>
+          </p:cNvSpPr>
+          <p:nvPr>
+            <p:ph type="title"/>
+          </p:nvPr>
+        </p:nvSpPr>
+        <p:spPr/>
+        <p:txBody>
+          <a:bodyPr>
+            <a:normAutofit fontScale="90000"/>
+          </a:bodyPr>
+          <a:lstStyle/>
+          <a:p>
+            <a:r>
+              <a:rPr lang="pt-BR" dirty="0"/>
+              <a:t>Desenvolvimento da Aplicação</a:t>
+            </a:r>
+            <a:br>
+              <a:rPr lang="pt-BR" dirty="0"/>
+            </a:br>
+            <a:r>
+              <a:rPr lang="pt-BR" sz="3100" dirty="0" smtClean="0"/>
+              <a:t>Referencias</a:t>
+            </a:r>
+            <a:endParaRPr lang="pt-BR" sz="3100" dirty="0"/>
+          </a:p>
+        </p:txBody>
+      </p:sp>
+      <p:sp>
+        <p:nvSpPr>
+          <p:cNvPr id="3" name="Retângulo 2"/>
+          <p:cNvSpPr/>
+          <p:nvPr/>
+        </p:nvSpPr>
+        <p:spPr>
+          <a:xfrm>
+            <a:off x="820447" y="1484784"/>
+            <a:ext cx="7560840" cy="5047536"/>
+          </a:xfrm>
+          <a:prstGeom prst="rect">
+            <a:avLst/>
+          </a:prstGeom>
+        </p:spPr>
+        <p:txBody>
+          <a:bodyPr wrap="square">
+            <a:spAutoFit/>
+          </a:bodyPr>
+          <a:lstStyle/>
+          <a:p>
+            <a:r>
+              <a:rPr lang="pt-BR" sz="1400" dirty="0"/>
+              <a:t>WIKIPEDIA.ORG. </a:t>
+            </a:r>
+            <a:r>
+              <a:rPr lang="pt-BR" sz="1400" b="1" dirty="0"/>
+              <a:t>Apache FreeMarker</a:t>
+            </a:r>
+            <a:r>
+              <a:rPr lang="pt-BR" sz="1400" dirty="0"/>
+              <a:t>. Disponível em: &lt;https://en.wikipedia.org/wiki/Apache_FreeMarker&gt;. Acesso em: 25 nov. 2018</a:t>
+            </a:r>
+            <a:r>
+              <a:rPr lang="pt-BR" sz="1400" dirty="0" smtClean="0"/>
+              <a:t>.</a:t>
+            </a:r>
+          </a:p>
+          <a:p>
+            <a:r>
+              <a:rPr lang="pt-BR" sz="1400" dirty="0" smtClean="0"/>
+              <a:t> </a:t>
+            </a:r>
+            <a:endParaRPr lang="pt-BR" sz="1400" dirty="0"/>
+          </a:p>
+          <a:p>
+            <a:r>
+              <a:rPr lang="pt-BR" sz="1400" dirty="0"/>
+              <a:t>WIKIPEDIA.ORG. </a:t>
+            </a:r>
+            <a:r>
+              <a:rPr lang="pt-BR" sz="1400" b="1" dirty="0"/>
+              <a:t>Apache Velocity</a:t>
+            </a:r>
+            <a:r>
+              <a:rPr lang="pt-BR" sz="1400" dirty="0"/>
+              <a:t>. Disponível em: &lt;https://en.wikipedia.org/wiki/Apache_Velocity&gt;. Acesso em: 10 fev. 2019a. </a:t>
+            </a:r>
+            <a:endParaRPr lang="pt-BR" sz="1400" dirty="0" smtClean="0"/>
+          </a:p>
+          <a:p>
+            <a:endParaRPr lang="pt-BR" sz="1400" dirty="0"/>
+          </a:p>
+          <a:p>
+            <a:r>
+              <a:rPr lang="pt-BR" sz="1400" dirty="0"/>
+              <a:t>WIKIPEDIA.ORG. </a:t>
+            </a:r>
+            <a:r>
+              <a:rPr lang="pt-BR" sz="1400" b="1" dirty="0"/>
+              <a:t>Apache Maven</a:t>
+            </a:r>
+            <a:r>
+              <a:rPr lang="pt-BR" sz="1400" dirty="0"/>
+              <a:t>. Disponível em: &lt;https://pt.wikipedia.org/wiki/Apache_Maven&gt;. Acesso em: 22 ago. 2019b</a:t>
+            </a:r>
+            <a:r>
+              <a:rPr lang="pt-BR" sz="1400" dirty="0" smtClean="0"/>
+              <a:t>.</a:t>
+            </a:r>
+          </a:p>
+          <a:p>
+            <a:r>
+              <a:rPr lang="pt-BR" sz="1400" dirty="0" smtClean="0"/>
+              <a:t> </a:t>
+            </a:r>
+            <a:endParaRPr lang="pt-BR" sz="1400" dirty="0"/>
+          </a:p>
+          <a:p>
+            <a:r>
+              <a:rPr lang="pt-BR" sz="1400" dirty="0"/>
+              <a:t>WIKIPEDIA.ORG. </a:t>
+            </a:r>
+            <a:r>
+              <a:rPr lang="pt-BR" sz="1400" b="1" dirty="0"/>
+              <a:t>JavaFX</a:t>
+            </a:r>
+            <a:r>
+              <a:rPr lang="pt-BR" sz="1400" dirty="0"/>
+              <a:t>. Disponível em: &lt;https://en.wikipedia.org/wiki/JavaFX&gt;. Acesso em: 11 nov. </a:t>
+            </a:r>
+            <a:r>
+              <a:rPr lang="pt-BR" sz="1400" dirty="0" smtClean="0"/>
+              <a:t>2019c</a:t>
+            </a:r>
+          </a:p>
+          <a:p>
+            <a:r>
+              <a:rPr lang="pt-BR" sz="1400" dirty="0" smtClean="0"/>
+              <a:t>. </a:t>
+            </a:r>
+            <a:endParaRPr lang="pt-BR" sz="1400" dirty="0"/>
+          </a:p>
+          <a:p>
+            <a:r>
+              <a:rPr lang="pt-BR" sz="1400" dirty="0"/>
+              <a:t>WIKIPEDIA.ORG. </a:t>
+            </a:r>
+            <a:r>
+              <a:rPr lang="pt-BR" sz="1400" b="1" dirty="0"/>
+              <a:t>MVC</a:t>
+            </a:r>
+            <a:r>
+              <a:rPr lang="pt-BR" sz="1400" dirty="0"/>
+              <a:t>. Disponível em: &lt;https://pt.wikipedia.org/wiki/MVC&gt;. Acesso em: 11 dez. 2019d. </a:t>
+            </a:r>
+            <a:endParaRPr lang="pt-BR" sz="1400" dirty="0" smtClean="0"/>
+          </a:p>
+          <a:p>
+            <a:endParaRPr lang="pt-BR" sz="1400" dirty="0"/>
+          </a:p>
+          <a:p>
+            <a:r>
+              <a:rPr lang="pt-BR" sz="1400" dirty="0"/>
+              <a:t>WIKIPEDIA.ORG. </a:t>
+            </a:r>
+            <a:r>
+              <a:rPr lang="pt-BR" sz="1400" b="1" dirty="0"/>
+              <a:t>JAR (file </a:t>
+            </a:r>
+            <a:r>
+              <a:rPr lang="pt-BR" sz="1400" b="1" dirty="0" err="1"/>
+              <a:t>format</a:t>
+            </a:r>
+            <a:r>
+              <a:rPr lang="pt-BR" sz="1400" b="1" dirty="0"/>
+              <a:t>)</a:t>
+            </a:r>
+            <a:r>
+              <a:rPr lang="pt-BR" sz="1400" dirty="0"/>
+              <a:t>. Disponível em: &lt;https://en.wikipedia.org/wiki/JAR_(file_format)&gt;. Acesso em: 10 jan. 2020e</a:t>
+            </a:r>
+            <a:r>
+              <a:rPr lang="pt-BR" sz="1400" dirty="0" smtClean="0"/>
+              <a:t>.</a:t>
+            </a:r>
+          </a:p>
+          <a:p>
+            <a:r>
+              <a:rPr lang="pt-BR" sz="1400" dirty="0" smtClean="0"/>
+              <a:t> </a:t>
+            </a:r>
+            <a:endParaRPr lang="pt-BR" sz="1400" dirty="0"/>
+          </a:p>
+          <a:p>
+            <a:r>
+              <a:rPr lang="pt-BR" sz="1400" dirty="0"/>
+              <a:t>WIKIPEDIA.ORG. </a:t>
+            </a:r>
+            <a:r>
+              <a:rPr lang="pt-BR" sz="1400" b="1" dirty="0"/>
+              <a:t>Template Processor</a:t>
+            </a:r>
+            <a:r>
+              <a:rPr lang="pt-BR" sz="1400" dirty="0"/>
+              <a:t>. Disponível em: &lt;https://en.wikipedia.org/wiki/Template_processor&gt;. Acesso em: 6 fev. 2020. </a:t>
+            </a:r>
+            <a:endParaRPr lang="pt-BR" sz="1400" dirty="0" smtClean="0"/>
+          </a:p>
+          <a:p>
+            <a:endParaRPr lang="pt-BR" sz="1400" dirty="0"/>
+          </a:p>
+          <a:p>
+            <a:r>
+              <a:rPr lang="pt-BR" sz="1400" dirty="0"/>
+              <a:t>XNAT.ORG. </a:t>
+            </a:r>
+            <a:r>
+              <a:rPr lang="pt-BR" sz="1400" b="1" dirty="0"/>
+              <a:t>Apache Velocity </a:t>
+            </a:r>
+            <a:r>
+              <a:rPr lang="pt-BR" sz="1400" b="1" dirty="0" err="1"/>
+              <a:t>Cheatsheet</a:t>
+            </a:r>
+            <a:r>
+              <a:rPr lang="pt-BR" sz="1400" dirty="0"/>
+              <a:t>. Disponível em: &lt;https://wiki.xnat.org/docs16/4-developer-documentation/xnat-codex/velocity-cheat-sheet&gt;. Acesso em: 7 ago. 2019.</a:t>
+            </a:r>
+          </a:p>
+        </p:txBody>
+      </p:sp>
+    </p:spTree>
+    <p:extLst>
+      <p:ext uri="{BB962C8B-B14F-4D97-AF65-F5344CB8AC3E}">
+        <p14:creationId xmlns:p14="http://schemas.microsoft.com/office/powerpoint/2010/main" val="1571623878"/>
+      </p:ext>
+    </p:extLst>
+  </p:cSld>
+  <p:clrMapOvr>
+    <a:masterClrMapping/>
+  </p:clrMapOvr>
+  <p:timing>
+    <p:tnLst>
+      <p:par>
+        <p:cTn id="1" dur="indefinite" restart="never" nodeType="tmRoot"/>
       </p:par>
     </p:tnLst>
   </p:timing>

</xml_diff>